<commit_message>
Add Neuron Data Flow Pic
Update in the report.
</commit_message>
<xml_diff>
--- a/trunk/pic/pic.pptx
+++ b/trunk/pic/pic.pptx
@@ -11,6 +11,7 @@
     <p:sldId id="259" r:id="rId5"/>
     <p:sldId id="260" r:id="rId6"/>
     <p:sldId id="261" r:id="rId7"/>
+    <p:sldId id="262" r:id="rId8"/>
   </p:sldIdLst>
   <p:sldSz cx="9144000" cy="6858000" type="screen4x3"/>
   <p:notesSz cx="6858000" cy="9144000"/>
@@ -294,7 +295,7 @@
             <a:fld id="{1D8BD707-D9CF-40AE-B4C6-C98DA3205C09}" type="datetimeFigureOut">
               <a:rPr lang="en-US" smtClean="0"/>
               <a:pPr/>
-              <a:t>8/31/2014</a:t>
+              <a:t>9/1/2014</a:t>
             </a:fld>
             <a:endParaRPr lang="en-US"/>
           </a:p>
@@ -461,7 +462,7 @@
             <a:fld id="{1D8BD707-D9CF-40AE-B4C6-C98DA3205C09}" type="datetimeFigureOut">
               <a:rPr lang="en-US" smtClean="0"/>
               <a:pPr/>
-              <a:t>8/31/2014</a:t>
+              <a:t>9/1/2014</a:t>
             </a:fld>
             <a:endParaRPr lang="en-US"/>
           </a:p>
@@ -638,7 +639,7 @@
             <a:fld id="{1D8BD707-D9CF-40AE-B4C6-C98DA3205C09}" type="datetimeFigureOut">
               <a:rPr lang="en-US" smtClean="0"/>
               <a:pPr/>
-              <a:t>8/31/2014</a:t>
+              <a:t>9/1/2014</a:t>
             </a:fld>
             <a:endParaRPr lang="en-US"/>
           </a:p>
@@ -805,7 +806,7 @@
             <a:fld id="{1D8BD707-D9CF-40AE-B4C6-C98DA3205C09}" type="datetimeFigureOut">
               <a:rPr lang="en-US" smtClean="0"/>
               <a:pPr/>
-              <a:t>8/31/2014</a:t>
+              <a:t>9/1/2014</a:t>
             </a:fld>
             <a:endParaRPr lang="en-US"/>
           </a:p>
@@ -1048,7 +1049,7 @@
             <a:fld id="{1D8BD707-D9CF-40AE-B4C6-C98DA3205C09}" type="datetimeFigureOut">
               <a:rPr lang="en-US" smtClean="0"/>
               <a:pPr/>
-              <a:t>8/31/2014</a:t>
+              <a:t>9/1/2014</a:t>
             </a:fld>
             <a:endParaRPr lang="en-US"/>
           </a:p>
@@ -1333,7 +1334,7 @@
             <a:fld id="{1D8BD707-D9CF-40AE-B4C6-C98DA3205C09}" type="datetimeFigureOut">
               <a:rPr lang="en-US" smtClean="0"/>
               <a:pPr/>
-              <a:t>8/31/2014</a:t>
+              <a:t>9/1/2014</a:t>
             </a:fld>
             <a:endParaRPr lang="en-US"/>
           </a:p>
@@ -1752,7 +1753,7 @@
             <a:fld id="{1D8BD707-D9CF-40AE-B4C6-C98DA3205C09}" type="datetimeFigureOut">
               <a:rPr lang="en-US" smtClean="0"/>
               <a:pPr/>
-              <a:t>8/31/2014</a:t>
+              <a:t>9/1/2014</a:t>
             </a:fld>
             <a:endParaRPr lang="en-US"/>
           </a:p>
@@ -1867,7 +1868,7 @@
             <a:fld id="{1D8BD707-D9CF-40AE-B4C6-C98DA3205C09}" type="datetimeFigureOut">
               <a:rPr lang="en-US" smtClean="0"/>
               <a:pPr/>
-              <a:t>8/31/2014</a:t>
+              <a:t>9/1/2014</a:t>
             </a:fld>
             <a:endParaRPr lang="en-US"/>
           </a:p>
@@ -1959,7 +1960,7 @@
             <a:fld id="{1D8BD707-D9CF-40AE-B4C6-C98DA3205C09}" type="datetimeFigureOut">
               <a:rPr lang="en-US" smtClean="0"/>
               <a:pPr/>
-              <a:t>8/31/2014</a:t>
+              <a:t>9/1/2014</a:t>
             </a:fld>
             <a:endParaRPr lang="en-US"/>
           </a:p>
@@ -2233,7 +2234,7 @@
             <a:fld id="{1D8BD707-D9CF-40AE-B4C6-C98DA3205C09}" type="datetimeFigureOut">
               <a:rPr lang="en-US" smtClean="0"/>
               <a:pPr/>
-              <a:t>8/31/2014</a:t>
+              <a:t>9/1/2014</a:t>
             </a:fld>
             <a:endParaRPr lang="en-US"/>
           </a:p>
@@ -2483,7 +2484,7 @@
             <a:fld id="{1D8BD707-D9CF-40AE-B4C6-C98DA3205C09}" type="datetimeFigureOut">
               <a:rPr lang="en-US" smtClean="0"/>
               <a:pPr/>
-              <a:t>8/31/2014</a:t>
+              <a:t>9/1/2014</a:t>
             </a:fld>
             <a:endParaRPr lang="en-US"/>
           </a:p>
@@ -2693,7 +2694,7 @@
             <a:fld id="{1D8BD707-D9CF-40AE-B4C6-C98DA3205C09}" type="datetimeFigureOut">
               <a:rPr lang="en-US" smtClean="0"/>
               <a:pPr/>
-              <a:t>8/31/2014</a:t>
+              <a:t>9/1/2014</a:t>
             </a:fld>
             <a:endParaRPr lang="en-US"/>
           </a:p>
@@ -10229,8 +10230,8 @@
             </a:p>
           </p:txBody>
         </p:sp>
-        <mc:AlternateContent xmlns:mc="http://schemas.openxmlformats.org/markup-compatibility/2006">
-          <mc:Choice xmlns:a14="http://schemas.microsoft.com/office/drawing/2010/main" Requires="a14">
+        <mc:AlternateContent xmlns:mc="http://schemas.openxmlformats.org/markup-compatibility/2006" xmlns:a14="http://schemas.microsoft.com/office/drawing/2010/main">
+          <mc:Choice Requires="a14">
             <p:sp>
               <p:nvSpPr>
                 <p:cNvPr id="15" name="Oval 14"/>
@@ -10291,7 +10292,7 @@
               </p:txBody>
             </p:sp>
           </mc:Choice>
-          <mc:Fallback>
+          <mc:Fallback xmlns="">
             <p:sp>
               <p:nvSpPr>
                 <p:cNvPr id="15" name="Oval 14"/>
@@ -10461,8 +10462,8 @@
             </a:fontRef>
           </p:style>
         </p:cxnSp>
-        <mc:AlternateContent xmlns:mc="http://schemas.openxmlformats.org/markup-compatibility/2006">
-          <mc:Choice xmlns:a14="http://schemas.microsoft.com/office/drawing/2010/main" Requires="a14">
+        <mc:AlternateContent xmlns:mc="http://schemas.openxmlformats.org/markup-compatibility/2006" xmlns:a14="http://schemas.microsoft.com/office/drawing/2010/main">
+          <mc:Choice Requires="a14">
             <p:sp>
               <p:nvSpPr>
                 <p:cNvPr id="27" name="Oval 26"/>
@@ -10523,7 +10524,7 @@
               </p:txBody>
             </p:sp>
           </mc:Choice>
-          <mc:Fallback>
+          <mc:Fallback xmlns="">
             <p:sp>
               <p:nvSpPr>
                 <p:cNvPr id="27" name="Oval 26"/>
@@ -10563,8 +10564,8 @@
             </p:sp>
           </mc:Fallback>
         </mc:AlternateContent>
-        <mc:AlternateContent xmlns:mc="http://schemas.openxmlformats.org/markup-compatibility/2006">
-          <mc:Choice xmlns:a14="http://schemas.microsoft.com/office/drawing/2010/main" Requires="a14">
+        <mc:AlternateContent xmlns:mc="http://schemas.openxmlformats.org/markup-compatibility/2006" xmlns:a14="http://schemas.microsoft.com/office/drawing/2010/main">
+          <mc:Choice Requires="a14">
             <p:sp>
               <p:nvSpPr>
                 <p:cNvPr id="28" name="Oval 27"/>
@@ -10625,7 +10626,7 @@
               </p:txBody>
             </p:sp>
           </mc:Choice>
-          <mc:Fallback>
+          <mc:Fallback xmlns="">
             <p:sp>
               <p:nvSpPr>
                 <p:cNvPr id="28" name="Oval 27"/>
@@ -11541,8 +11542,8 @@
             </a:p>
           </p:txBody>
         </p:sp>
-        <mc:AlternateContent xmlns:mc="http://schemas.openxmlformats.org/markup-compatibility/2006">
-          <mc:Choice xmlns:a14="http://schemas.microsoft.com/office/drawing/2010/main" Requires="a14">
+        <mc:AlternateContent xmlns:mc="http://schemas.openxmlformats.org/markup-compatibility/2006" xmlns:a14="http://schemas.microsoft.com/office/drawing/2010/main">
+          <mc:Choice Requires="a14">
             <p:sp>
               <p:nvSpPr>
                 <p:cNvPr id="77" name="Oval 76"/>
@@ -11603,7 +11604,7 @@
               </p:txBody>
             </p:sp>
           </mc:Choice>
-          <mc:Fallback>
+          <mc:Fallback xmlns="">
             <p:sp>
               <p:nvSpPr>
                 <p:cNvPr id="77" name="Oval 76"/>
@@ -11773,8 +11774,8 @@
             </a:fontRef>
           </p:style>
         </p:cxnSp>
-        <mc:AlternateContent xmlns:mc="http://schemas.openxmlformats.org/markup-compatibility/2006">
-          <mc:Choice xmlns:a14="http://schemas.microsoft.com/office/drawing/2010/main" Requires="a14">
+        <mc:AlternateContent xmlns:mc="http://schemas.openxmlformats.org/markup-compatibility/2006" xmlns:a14="http://schemas.microsoft.com/office/drawing/2010/main">
+          <mc:Choice Requires="a14">
             <p:sp>
               <p:nvSpPr>
                 <p:cNvPr id="82" name="Oval 81"/>
@@ -11835,7 +11836,7 @@
               </p:txBody>
             </p:sp>
           </mc:Choice>
-          <mc:Fallback>
+          <mc:Fallback xmlns="">
             <p:sp>
               <p:nvSpPr>
                 <p:cNvPr id="82" name="Oval 81"/>
@@ -11875,8 +11876,8 @@
             </p:sp>
           </mc:Fallback>
         </mc:AlternateContent>
-        <mc:AlternateContent xmlns:mc="http://schemas.openxmlformats.org/markup-compatibility/2006">
-          <mc:Choice xmlns:a14="http://schemas.microsoft.com/office/drawing/2010/main" Requires="a14">
+        <mc:AlternateContent xmlns:mc="http://schemas.openxmlformats.org/markup-compatibility/2006" xmlns:a14="http://schemas.microsoft.com/office/drawing/2010/main">
+          <mc:Choice Requires="a14">
             <p:sp>
               <p:nvSpPr>
                 <p:cNvPr id="83" name="Oval 82"/>
@@ -11937,7 +11938,7 @@
               </p:txBody>
             </p:sp>
           </mc:Choice>
-          <mc:Fallback>
+          <mc:Fallback xmlns="">
             <p:sp>
               <p:nvSpPr>
                 <p:cNvPr id="83" name="Oval 82"/>
@@ -12610,8 +12611,8 @@
             </a:p>
           </p:txBody>
         </p:sp>
-        <mc:AlternateContent xmlns:mc="http://schemas.openxmlformats.org/markup-compatibility/2006">
-          <mc:Choice xmlns:a14="http://schemas.microsoft.com/office/drawing/2010/main" Requires="a14">
+        <mc:AlternateContent xmlns:mc="http://schemas.openxmlformats.org/markup-compatibility/2006" xmlns:a14="http://schemas.microsoft.com/office/drawing/2010/main">
+          <mc:Choice Requires="a14">
             <p:sp>
               <p:nvSpPr>
                 <p:cNvPr id="119" name="Oval 118"/>
@@ -12672,7 +12673,7 @@
               </p:txBody>
             </p:sp>
           </mc:Choice>
-          <mc:Fallback>
+          <mc:Fallback xmlns="">
             <p:sp>
               <p:nvSpPr>
                 <p:cNvPr id="119" name="Oval 118"/>
@@ -12842,8 +12843,8 @@
             </a:fontRef>
           </p:style>
         </p:cxnSp>
-        <mc:AlternateContent xmlns:mc="http://schemas.openxmlformats.org/markup-compatibility/2006">
-          <mc:Choice xmlns:a14="http://schemas.microsoft.com/office/drawing/2010/main" Requires="a14">
+        <mc:AlternateContent xmlns:mc="http://schemas.openxmlformats.org/markup-compatibility/2006" xmlns:a14="http://schemas.microsoft.com/office/drawing/2010/main">
+          <mc:Choice Requires="a14">
             <p:sp>
               <p:nvSpPr>
                 <p:cNvPr id="124" name="Oval 123"/>
@@ -12904,7 +12905,7 @@
               </p:txBody>
             </p:sp>
           </mc:Choice>
-          <mc:Fallback>
+          <mc:Fallback xmlns="">
             <p:sp>
               <p:nvSpPr>
                 <p:cNvPr id="124" name="Oval 123"/>
@@ -12944,8 +12945,8 @@
             </p:sp>
           </mc:Fallback>
         </mc:AlternateContent>
-        <mc:AlternateContent xmlns:mc="http://schemas.openxmlformats.org/markup-compatibility/2006">
-          <mc:Choice xmlns:a14="http://schemas.microsoft.com/office/drawing/2010/main" Requires="a14">
+        <mc:AlternateContent xmlns:mc="http://schemas.openxmlformats.org/markup-compatibility/2006" xmlns:a14="http://schemas.microsoft.com/office/drawing/2010/main">
+          <mc:Choice Requires="a14">
             <p:sp>
               <p:nvSpPr>
                 <p:cNvPr id="125" name="Oval 124"/>
@@ -13006,7 +13007,7 @@
               </p:txBody>
             </p:sp>
           </mc:Choice>
-          <mc:Fallback>
+          <mc:Fallback xmlns="">
             <p:sp>
               <p:nvSpPr>
                 <p:cNvPr id="125" name="Oval 124"/>
@@ -13781,8 +13782,8 @@
             <a:chExt cx="6934200" cy="2111277"/>
           </a:xfrm>
         </p:grpSpPr>
-        <mc:AlternateContent xmlns:mc="http://schemas.openxmlformats.org/markup-compatibility/2006">
-          <mc:Choice xmlns:a14="http://schemas.microsoft.com/office/drawing/2010/main" Requires="a14">
+        <mc:AlternateContent xmlns:mc="http://schemas.openxmlformats.org/markup-compatibility/2006" xmlns:a14="http://schemas.microsoft.com/office/drawing/2010/main">
+          <mc:Choice Requires="a14">
             <p:sp>
               <p:nvSpPr>
                 <p:cNvPr id="421" name="TextBox 420"/>
@@ -13805,6 +13806,7 @@
                 </a:bodyPr>
                 <a:lstStyle/>
                 <a:p>
+                  <a:pPr/>
                   <a14:m>
                     <m:oMathPara xmlns:m="http://schemas.openxmlformats.org/officeDocument/2006/math">
                       <m:oMathParaPr>
@@ -13857,7 +13859,7 @@
               </p:txBody>
             </p:sp>
           </mc:Choice>
-          <mc:Fallback>
+          <mc:Fallback xmlns="">
             <p:sp>
               <p:nvSpPr>
                 <p:cNvPr id="421" name="TextBox 420"/>
@@ -13896,8 +13898,8 @@
             </p:sp>
           </mc:Fallback>
         </mc:AlternateContent>
-        <mc:AlternateContent xmlns:mc="http://schemas.openxmlformats.org/markup-compatibility/2006">
-          <mc:Choice xmlns:a14="http://schemas.microsoft.com/office/drawing/2010/main" Requires="a14">
+        <mc:AlternateContent xmlns:mc="http://schemas.openxmlformats.org/markup-compatibility/2006" xmlns:a14="http://schemas.microsoft.com/office/drawing/2010/main">
+          <mc:Choice Requires="a14">
             <p:sp>
               <p:nvSpPr>
                 <p:cNvPr id="420" name="TextBox 419"/>
@@ -13920,6 +13922,7 @@
                 </a:bodyPr>
                 <a:lstStyle/>
                 <a:p>
+                  <a:pPr/>
                   <a14:m>
                     <m:oMathPara xmlns:m="http://schemas.openxmlformats.org/officeDocument/2006/math">
                       <m:oMathParaPr>
@@ -13972,7 +13975,7 @@
               </p:txBody>
             </p:sp>
           </mc:Choice>
-          <mc:Fallback>
+          <mc:Fallback xmlns="">
             <p:sp>
               <p:nvSpPr>
                 <p:cNvPr id="420" name="TextBox 419"/>
@@ -14111,8 +14114,8 @@
             </a:p>
           </p:txBody>
         </p:sp>
-        <mc:AlternateContent xmlns:mc="http://schemas.openxmlformats.org/markup-compatibility/2006">
-          <mc:Choice xmlns:a14="http://schemas.microsoft.com/office/drawing/2010/main" Requires="a14">
+        <mc:AlternateContent xmlns:mc="http://schemas.openxmlformats.org/markup-compatibility/2006" xmlns:a14="http://schemas.microsoft.com/office/drawing/2010/main">
+          <mc:Choice Requires="a14">
             <p:sp>
               <p:nvSpPr>
                 <p:cNvPr id="203" name="Rectangle 202"/>
@@ -14207,7 +14210,7 @@
               </p:txBody>
             </p:sp>
           </mc:Choice>
-          <mc:Fallback>
+          <mc:Fallback xmlns="">
             <p:sp>
               <p:nvSpPr>
                 <p:cNvPr id="203" name="Rectangle 202"/>
@@ -14247,8 +14250,8 @@
             </p:sp>
           </mc:Fallback>
         </mc:AlternateContent>
-        <mc:AlternateContent xmlns:mc="http://schemas.openxmlformats.org/markup-compatibility/2006">
-          <mc:Choice xmlns:a14="http://schemas.microsoft.com/office/drawing/2010/main" Requires="a14">
+        <mc:AlternateContent xmlns:mc="http://schemas.openxmlformats.org/markup-compatibility/2006" xmlns:a14="http://schemas.microsoft.com/office/drawing/2010/main">
+          <mc:Choice Requires="a14">
             <p:sp>
               <p:nvSpPr>
                 <p:cNvPr id="204" name="Rectangle 203"/>
@@ -14343,7 +14346,7 @@
               </p:txBody>
             </p:sp>
           </mc:Choice>
-          <mc:Fallback>
+          <mc:Fallback xmlns="">
             <p:sp>
               <p:nvSpPr>
                 <p:cNvPr id="204" name="Rectangle 203"/>
@@ -14383,8 +14386,8 @@
             </p:sp>
           </mc:Fallback>
         </mc:AlternateContent>
-        <mc:AlternateContent xmlns:mc="http://schemas.openxmlformats.org/markup-compatibility/2006">
-          <mc:Choice xmlns:a14="http://schemas.microsoft.com/office/drawing/2010/main" Requires="a14">
+        <mc:AlternateContent xmlns:mc="http://schemas.openxmlformats.org/markup-compatibility/2006" xmlns:a14="http://schemas.microsoft.com/office/drawing/2010/main">
+          <mc:Choice Requires="a14">
             <p:sp>
               <p:nvSpPr>
                 <p:cNvPr id="207" name="Oval 206"/>
@@ -14445,7 +14448,7 @@
               </p:txBody>
             </p:sp>
           </mc:Choice>
-          <mc:Fallback>
+          <mc:Fallback xmlns="">
             <p:sp>
               <p:nvSpPr>
                 <p:cNvPr id="207" name="Oval 206"/>
@@ -14552,8 +14555,8 @@
             </a:fontRef>
           </p:style>
         </p:cxnSp>
-        <mc:AlternateContent xmlns:mc="http://schemas.openxmlformats.org/markup-compatibility/2006">
-          <mc:Choice xmlns:a14="http://schemas.microsoft.com/office/drawing/2010/main" Requires="a14">
+        <mc:AlternateContent xmlns:mc="http://schemas.openxmlformats.org/markup-compatibility/2006" xmlns:a14="http://schemas.microsoft.com/office/drawing/2010/main">
+          <mc:Choice Requires="a14">
             <p:sp>
               <p:nvSpPr>
                 <p:cNvPr id="212" name="Oval 211"/>
@@ -14614,7 +14617,7 @@
               </p:txBody>
             </p:sp>
           </mc:Choice>
-          <mc:Fallback>
+          <mc:Fallback xmlns="">
             <p:sp>
               <p:nvSpPr>
                 <p:cNvPr id="212" name="Oval 211"/>
@@ -14685,8 +14688,8 @@
             </a:p>
           </p:txBody>
         </p:sp>
-        <mc:AlternateContent xmlns:mc="http://schemas.openxmlformats.org/markup-compatibility/2006">
-          <mc:Choice xmlns:a14="http://schemas.microsoft.com/office/drawing/2010/main" Requires="a14">
+        <mc:AlternateContent xmlns:mc="http://schemas.openxmlformats.org/markup-compatibility/2006" xmlns:a14="http://schemas.microsoft.com/office/drawing/2010/main">
+          <mc:Choice Requires="a14">
             <p:sp>
               <p:nvSpPr>
                 <p:cNvPr id="225" name="Rectangle 224"/>
@@ -14781,7 +14784,7 @@
               </p:txBody>
             </p:sp>
           </mc:Choice>
-          <mc:Fallback>
+          <mc:Fallback xmlns="">
             <p:sp>
               <p:nvSpPr>
                 <p:cNvPr id="225" name="Rectangle 224"/>
@@ -14821,8 +14824,8 @@
             </p:sp>
           </mc:Fallback>
         </mc:AlternateContent>
-        <mc:AlternateContent xmlns:mc="http://schemas.openxmlformats.org/markup-compatibility/2006">
-          <mc:Choice xmlns:a14="http://schemas.microsoft.com/office/drawing/2010/main" Requires="a14">
+        <mc:AlternateContent xmlns:mc="http://schemas.openxmlformats.org/markup-compatibility/2006" xmlns:a14="http://schemas.microsoft.com/office/drawing/2010/main">
+          <mc:Choice Requires="a14">
             <p:sp>
               <p:nvSpPr>
                 <p:cNvPr id="226" name="Rectangle 225"/>
@@ -14917,7 +14920,7 @@
               </p:txBody>
             </p:sp>
           </mc:Choice>
-          <mc:Fallback>
+          <mc:Fallback xmlns="">
             <p:sp>
               <p:nvSpPr>
                 <p:cNvPr id="226" name="Rectangle 225"/>
@@ -14988,8 +14991,8 @@
             </a:p>
           </p:txBody>
         </p:sp>
-        <mc:AlternateContent xmlns:mc="http://schemas.openxmlformats.org/markup-compatibility/2006">
-          <mc:Choice xmlns:a14="http://schemas.microsoft.com/office/drawing/2010/main" Requires="a14">
+        <mc:AlternateContent xmlns:mc="http://schemas.openxmlformats.org/markup-compatibility/2006" xmlns:a14="http://schemas.microsoft.com/office/drawing/2010/main">
+          <mc:Choice Requires="a14">
             <p:sp>
               <p:nvSpPr>
                 <p:cNvPr id="303" name="Rectangle 302"/>
@@ -15084,7 +15087,7 @@
               </p:txBody>
             </p:sp>
           </mc:Choice>
-          <mc:Fallback>
+          <mc:Fallback xmlns="">
             <p:sp>
               <p:nvSpPr>
                 <p:cNvPr id="303" name="Rectangle 302"/>
@@ -15124,8 +15127,8 @@
             </p:sp>
           </mc:Fallback>
         </mc:AlternateContent>
-        <mc:AlternateContent xmlns:mc="http://schemas.openxmlformats.org/markup-compatibility/2006">
-          <mc:Choice xmlns:a14="http://schemas.microsoft.com/office/drawing/2010/main" Requires="a14">
+        <mc:AlternateContent xmlns:mc="http://schemas.openxmlformats.org/markup-compatibility/2006" xmlns:a14="http://schemas.microsoft.com/office/drawing/2010/main">
+          <mc:Choice Requires="a14">
             <p:sp>
               <p:nvSpPr>
                 <p:cNvPr id="304" name="Rectangle 303"/>
@@ -15220,7 +15223,7 @@
               </p:txBody>
             </p:sp>
           </mc:Choice>
-          <mc:Fallback>
+          <mc:Fallback xmlns="">
             <p:sp>
               <p:nvSpPr>
                 <p:cNvPr id="304" name="Rectangle 303"/>
@@ -15310,8 +15313,8 @@
             </a:p>
           </p:txBody>
         </p:sp>
-        <mc:AlternateContent xmlns:mc="http://schemas.openxmlformats.org/markup-compatibility/2006">
-          <mc:Choice xmlns:a14="http://schemas.microsoft.com/office/drawing/2010/main" Requires="a14">
+        <mc:AlternateContent xmlns:mc="http://schemas.openxmlformats.org/markup-compatibility/2006" xmlns:a14="http://schemas.microsoft.com/office/drawing/2010/main">
+          <mc:Choice Requires="a14">
             <p:sp>
               <p:nvSpPr>
                 <p:cNvPr id="323" name="Rectangle 322"/>
@@ -15406,7 +15409,7 @@
               </p:txBody>
             </p:sp>
           </mc:Choice>
-          <mc:Fallback>
+          <mc:Fallback xmlns="">
             <p:sp>
               <p:nvSpPr>
                 <p:cNvPr id="323" name="Rectangle 322"/>
@@ -15446,8 +15449,8 @@
             </p:sp>
           </mc:Fallback>
         </mc:AlternateContent>
-        <mc:AlternateContent xmlns:mc="http://schemas.openxmlformats.org/markup-compatibility/2006">
-          <mc:Choice xmlns:a14="http://schemas.microsoft.com/office/drawing/2010/main" Requires="a14">
+        <mc:AlternateContent xmlns:mc="http://schemas.openxmlformats.org/markup-compatibility/2006" xmlns:a14="http://schemas.microsoft.com/office/drawing/2010/main">
+          <mc:Choice Requires="a14">
             <p:sp>
               <p:nvSpPr>
                 <p:cNvPr id="324" name="Rectangle 323"/>
@@ -15542,7 +15545,7 @@
               </p:txBody>
             </p:sp>
           </mc:Choice>
-          <mc:Fallback>
+          <mc:Fallback xmlns="">
             <p:sp>
               <p:nvSpPr>
                 <p:cNvPr id="324" name="Rectangle 323"/>
@@ -15663,8 +15666,8 @@
             </a:p>
           </p:txBody>
         </p:sp>
-        <mc:AlternateContent xmlns:mc="http://schemas.openxmlformats.org/markup-compatibility/2006">
-          <mc:Choice xmlns:a14="http://schemas.microsoft.com/office/drawing/2010/main" Requires="a14">
+        <mc:AlternateContent xmlns:mc="http://schemas.openxmlformats.org/markup-compatibility/2006" xmlns:a14="http://schemas.microsoft.com/office/drawing/2010/main">
+          <mc:Choice Requires="a14">
             <p:sp>
               <p:nvSpPr>
                 <p:cNvPr id="331" name="Rectangle 330"/>
@@ -15759,7 +15762,7 @@
               </p:txBody>
             </p:sp>
           </mc:Choice>
-          <mc:Fallback>
+          <mc:Fallback xmlns="">
             <p:sp>
               <p:nvSpPr>
                 <p:cNvPr id="331" name="Rectangle 330"/>
@@ -15799,8 +15802,8 @@
             </p:sp>
           </mc:Fallback>
         </mc:AlternateContent>
-        <mc:AlternateContent xmlns:mc="http://schemas.openxmlformats.org/markup-compatibility/2006">
-          <mc:Choice xmlns:a14="http://schemas.microsoft.com/office/drawing/2010/main" Requires="a14">
+        <mc:AlternateContent xmlns:mc="http://schemas.openxmlformats.org/markup-compatibility/2006" xmlns:a14="http://schemas.microsoft.com/office/drawing/2010/main">
+          <mc:Choice Requires="a14">
             <p:sp>
               <p:nvSpPr>
                 <p:cNvPr id="332" name="Rectangle 331"/>
@@ -15895,7 +15898,7 @@
               </p:txBody>
             </p:sp>
           </mc:Choice>
-          <mc:Fallback>
+          <mc:Fallback xmlns="">
             <p:sp>
               <p:nvSpPr>
                 <p:cNvPr id="332" name="Rectangle 331"/>
@@ -15935,8 +15938,8 @@
             </p:sp>
           </mc:Fallback>
         </mc:AlternateContent>
-        <mc:AlternateContent xmlns:mc="http://schemas.openxmlformats.org/markup-compatibility/2006">
-          <mc:Choice xmlns:a14="http://schemas.microsoft.com/office/drawing/2010/main" Requires="a14">
+        <mc:AlternateContent xmlns:mc="http://schemas.openxmlformats.org/markup-compatibility/2006" xmlns:a14="http://schemas.microsoft.com/office/drawing/2010/main">
+          <mc:Choice Requires="a14">
             <p:sp>
               <p:nvSpPr>
                 <p:cNvPr id="333" name="Oval 332"/>
@@ -15994,7 +15997,7 @@
               </p:txBody>
             </p:sp>
           </mc:Choice>
-          <mc:Fallback>
+          <mc:Fallback xmlns="">
             <p:sp>
               <p:nvSpPr>
                 <p:cNvPr id="333" name="Oval 332"/>
@@ -16101,8 +16104,8 @@
             </a:fontRef>
           </p:style>
         </p:cxnSp>
-        <mc:AlternateContent xmlns:mc="http://schemas.openxmlformats.org/markup-compatibility/2006">
-          <mc:Choice xmlns:a14="http://schemas.microsoft.com/office/drawing/2010/main" Requires="a14">
+        <mc:AlternateContent xmlns:mc="http://schemas.openxmlformats.org/markup-compatibility/2006" xmlns:a14="http://schemas.microsoft.com/office/drawing/2010/main">
+          <mc:Choice Requires="a14">
             <p:sp>
               <p:nvSpPr>
                 <p:cNvPr id="336" name="Oval 335"/>
@@ -16160,7 +16163,7 @@
               </p:txBody>
             </p:sp>
           </mc:Choice>
-          <mc:Fallback>
+          <mc:Fallback xmlns="">
             <p:sp>
               <p:nvSpPr>
                 <p:cNvPr id="336" name="Oval 335"/>
@@ -16571,8 +16574,8 @@
             </a:fontRef>
           </p:style>
         </p:cxnSp>
-        <mc:AlternateContent xmlns:mc="http://schemas.openxmlformats.org/markup-compatibility/2006">
-          <mc:Choice xmlns:a14="http://schemas.microsoft.com/office/drawing/2010/main" Requires="a14">
+        <mc:AlternateContent xmlns:mc="http://schemas.openxmlformats.org/markup-compatibility/2006" xmlns:a14="http://schemas.microsoft.com/office/drawing/2010/main">
+          <mc:Choice Requires="a14">
             <p:sp>
               <p:nvSpPr>
                 <p:cNvPr id="362" name="Oval 361"/>
@@ -16630,7 +16633,7 @@
               </p:txBody>
             </p:sp>
           </mc:Choice>
-          <mc:Fallback>
+          <mc:Fallback xmlns="">
             <p:sp>
               <p:nvSpPr>
                 <p:cNvPr id="362" name="Oval 361"/>
@@ -16670,8 +16673,8 @@
             </p:sp>
           </mc:Fallback>
         </mc:AlternateContent>
-        <mc:AlternateContent xmlns:mc="http://schemas.openxmlformats.org/markup-compatibility/2006">
-          <mc:Choice xmlns:a14="http://schemas.microsoft.com/office/drawing/2010/main" Requires="a14">
+        <mc:AlternateContent xmlns:mc="http://schemas.openxmlformats.org/markup-compatibility/2006" xmlns:a14="http://schemas.microsoft.com/office/drawing/2010/main">
+          <mc:Choice Requires="a14">
             <p:sp>
               <p:nvSpPr>
                 <p:cNvPr id="363" name="Oval 362"/>
@@ -16729,7 +16732,7 @@
               </p:txBody>
             </p:sp>
           </mc:Choice>
-          <mc:Fallback>
+          <mc:Fallback xmlns="">
             <p:sp>
               <p:nvSpPr>
                 <p:cNvPr id="363" name="Oval 362"/>
@@ -16837,8 +16840,8 @@
             </a:fontRef>
           </p:style>
         </p:cxnSp>
-        <mc:AlternateContent xmlns:mc="http://schemas.openxmlformats.org/markup-compatibility/2006">
-          <mc:Choice xmlns:a14="http://schemas.microsoft.com/office/drawing/2010/main" Requires="a14">
+        <mc:AlternateContent xmlns:mc="http://schemas.openxmlformats.org/markup-compatibility/2006" xmlns:a14="http://schemas.microsoft.com/office/drawing/2010/main">
+          <mc:Choice Requires="a14">
             <p:sp>
               <p:nvSpPr>
                 <p:cNvPr id="373" name="TextBox 372"/>
@@ -16861,6 +16864,7 @@
                 </a:bodyPr>
                 <a:lstStyle/>
                 <a:p>
+                  <a:pPr/>
                   <a14:m>
                     <m:oMathPara xmlns:m="http://schemas.openxmlformats.org/officeDocument/2006/math">
                       <m:oMathParaPr>
@@ -16913,7 +16917,7 @@
               </p:txBody>
             </p:sp>
           </mc:Choice>
-          <mc:Fallback>
+          <mc:Fallback xmlns="">
             <p:sp>
               <p:nvSpPr>
                 <p:cNvPr id="373" name="TextBox 372"/>
@@ -16952,8 +16956,8 @@
             </p:sp>
           </mc:Fallback>
         </mc:AlternateContent>
-        <mc:AlternateContent xmlns:mc="http://schemas.openxmlformats.org/markup-compatibility/2006">
-          <mc:Choice xmlns:a14="http://schemas.microsoft.com/office/drawing/2010/main" Requires="a14">
+        <mc:AlternateContent xmlns:mc="http://schemas.openxmlformats.org/markup-compatibility/2006" xmlns:a14="http://schemas.microsoft.com/office/drawing/2010/main">
+          <mc:Choice Requires="a14">
             <p:sp>
               <p:nvSpPr>
                 <p:cNvPr id="392" name="TextBox 391"/>
@@ -16976,6 +16980,7 @@
                 </a:bodyPr>
                 <a:lstStyle/>
                 <a:p>
+                  <a:pPr/>
                   <a14:m>
                     <m:oMathPara xmlns:m="http://schemas.openxmlformats.org/officeDocument/2006/math">
                       <m:oMathParaPr>
@@ -17028,7 +17033,7 @@
               </p:txBody>
             </p:sp>
           </mc:Choice>
-          <mc:Fallback>
+          <mc:Fallback xmlns="">
             <p:sp>
               <p:nvSpPr>
                 <p:cNvPr id="392" name="TextBox 391"/>
@@ -17135,8 +17140,8 @@
             </a:fontRef>
           </p:style>
         </p:cxnSp>
-        <mc:AlternateContent xmlns:mc="http://schemas.openxmlformats.org/markup-compatibility/2006">
-          <mc:Choice xmlns:a14="http://schemas.microsoft.com/office/drawing/2010/main" Requires="a14">
+        <mc:AlternateContent xmlns:mc="http://schemas.openxmlformats.org/markup-compatibility/2006" xmlns:a14="http://schemas.microsoft.com/office/drawing/2010/main">
+          <mc:Choice Requires="a14">
             <p:sp>
               <p:nvSpPr>
                 <p:cNvPr id="398" name="TextBox 397"/>
@@ -17159,6 +17164,7 @@
                 </a:bodyPr>
                 <a:lstStyle/>
                 <a:p>
+                  <a:pPr/>
                   <a14:m>
                     <m:oMathPara xmlns:m="http://schemas.openxmlformats.org/officeDocument/2006/math">
                       <m:oMathParaPr>
@@ -17211,7 +17217,7 @@
               </p:txBody>
             </p:sp>
           </mc:Choice>
-          <mc:Fallback>
+          <mc:Fallback xmlns="">
             <p:sp>
               <p:nvSpPr>
                 <p:cNvPr id="398" name="TextBox 397"/>
@@ -17512,8 +17518,8 @@
             </a:fontRef>
           </p:style>
         </p:cxnSp>
-        <mc:AlternateContent xmlns:mc="http://schemas.openxmlformats.org/markup-compatibility/2006">
-          <mc:Choice xmlns:a14="http://schemas.microsoft.com/office/drawing/2010/main" Requires="a14">
+        <mc:AlternateContent xmlns:mc="http://schemas.openxmlformats.org/markup-compatibility/2006" xmlns:a14="http://schemas.microsoft.com/office/drawing/2010/main">
+          <mc:Choice Requires="a14">
             <p:sp>
               <p:nvSpPr>
                 <p:cNvPr id="431" name="TextBox 430"/>
@@ -17536,6 +17542,7 @@
                 </a:bodyPr>
                 <a:lstStyle/>
                 <a:p>
+                  <a:pPr/>
                   <a14:m>
                     <m:oMathPara xmlns:m="http://schemas.openxmlformats.org/officeDocument/2006/math">
                       <m:oMathParaPr>
@@ -17588,7 +17595,7 @@
               </p:txBody>
             </p:sp>
           </mc:Choice>
-          <mc:Fallback>
+          <mc:Fallback xmlns="">
             <p:sp>
               <p:nvSpPr>
                 <p:cNvPr id="431" name="TextBox 430"/>
@@ -17632,6 +17639,1703 @@
     <p:extLst>
       <p:ext uri="{BB962C8B-B14F-4D97-AF65-F5344CB8AC3E}">
         <p14:creationId xmlns:p14="http://schemas.microsoft.com/office/powerpoint/2010/main" val="1678360878"/>
+      </p:ext>
+    </p:extLst>
+  </p:cSld>
+  <p:clrMapOvr>
+    <a:masterClrMapping/>
+  </p:clrMapOvr>
+</p:sld>
+</file>
+
+<file path=ppt/slides/slide7.xml><?xml version="1.0" encoding="utf-8"?>
+<p:sld xmlns:a="http://schemas.openxmlformats.org/drawingml/2006/main" xmlns:r="http://schemas.openxmlformats.org/officeDocument/2006/relationships" xmlns:p="http://schemas.openxmlformats.org/presentationml/2006/main">
+  <p:cSld>
+    <p:spTree>
+      <p:nvGrpSpPr>
+        <p:cNvPr id="1" name=""/>
+        <p:cNvGrpSpPr/>
+        <p:nvPr/>
+      </p:nvGrpSpPr>
+      <p:grpSpPr>
+        <a:xfrm>
+          <a:off x="0" y="0"/>
+          <a:ext cx="0" cy="0"/>
+          <a:chOff x="0" y="0"/>
+          <a:chExt cx="0" cy="0"/>
+        </a:xfrm>
+      </p:grpSpPr>
+      <p:grpSp>
+        <p:nvGrpSpPr>
+          <p:cNvPr id="255" name="Group 254"/>
+          <p:cNvGrpSpPr/>
+          <p:nvPr/>
+        </p:nvGrpSpPr>
+        <p:grpSpPr>
+          <a:xfrm>
+            <a:off x="1789430" y="2012752"/>
+            <a:ext cx="5359385" cy="1204159"/>
+            <a:chOff x="1789430" y="2012752"/>
+            <a:chExt cx="5359385" cy="1204159"/>
+          </a:xfrm>
+        </p:grpSpPr>
+        <mc:AlternateContent xmlns:mc="http://schemas.openxmlformats.org/markup-compatibility/2006">
+          <mc:Choice xmlns:a14="http://schemas.microsoft.com/office/drawing/2010/main" Requires="a14">
+            <p:sp>
+              <p:nvSpPr>
+                <p:cNvPr id="101" name="Rounded Rectangle 100"/>
+                <p:cNvSpPr/>
+                <p:nvPr/>
+              </p:nvSpPr>
+              <p:spPr>
+                <a:xfrm>
+                  <a:off x="5349879" y="2637056"/>
+                  <a:ext cx="419100" cy="228600"/>
+                </a:xfrm>
+                <a:prstGeom prst="roundRect">
+                  <a:avLst>
+                    <a:gd name="adj" fmla="val 50000"/>
+                  </a:avLst>
+                </a:prstGeom>
+                <a:ln w="12700"/>
+              </p:spPr>
+              <p:style>
+                <a:lnRef idx="2">
+                  <a:schemeClr val="accent6">
+                    <a:shade val="50000"/>
+                  </a:schemeClr>
+                </a:lnRef>
+                <a:fillRef idx="1">
+                  <a:schemeClr val="accent6"/>
+                </a:fillRef>
+                <a:effectRef idx="0">
+                  <a:schemeClr val="accent6"/>
+                </a:effectRef>
+                <a:fontRef idx="minor">
+                  <a:schemeClr val="lt1"/>
+                </a:fontRef>
+              </p:style>
+              <p:txBody>
+                <a:bodyPr rtlCol="0" anchor="ctr"/>
+                <a:lstStyle/>
+                <a:p>
+                  <a:pPr algn="ctr"/>
+                  <a14:m>
+                    <m:oMathPara xmlns:m="http://schemas.openxmlformats.org/officeDocument/2006/math">
+                      <m:oMathParaPr>
+                        <m:jc m:val="centerGroup"/>
+                      </m:oMathParaPr>
+                      <m:oMath xmlns:m="http://schemas.openxmlformats.org/officeDocument/2006/math">
+                        <m:r>
+                          <a:rPr lang="en-US" sz="1600" b="0" i="0" smtClean="0">
+                            <a:latin typeface="Cambria Math"/>
+                          </a:rPr>
+                          <m:t>  </m:t>
+                        </m:r>
+                        <m:r>
+                          <m:rPr>
+                            <m:sty m:val="p"/>
+                          </m:rPr>
+                          <a:rPr lang="en-US" sz="1600" b="0" i="0" smtClean="0">
+                            <a:latin typeface="Cambria Math"/>
+                          </a:rPr>
+                          <m:t>Σ</m:t>
+                        </m:r>
+                      </m:oMath>
+                    </m:oMathPara>
+                  </a14:m>
+                  <a:endParaRPr lang="en-US" sz="1600" dirty="0"/>
+                </a:p>
+              </p:txBody>
+            </p:sp>
+          </mc:Choice>
+          <mc:Fallback>
+            <p:sp>
+              <p:nvSpPr>
+                <p:cNvPr id="101" name="Rounded Rectangle 100"/>
+                <p:cNvSpPr>
+                  <a:spLocks noRot="1" noChangeAspect="1" noMove="1" noResize="1" noEditPoints="1" noAdjustHandles="1" noChangeArrowheads="1" noChangeShapeType="1" noTextEdit="1"/>
+                </p:cNvSpPr>
+                <p:nvPr/>
+              </p:nvSpPr>
+              <p:spPr>
+                <a:xfrm>
+                  <a:off x="5349879" y="2637056"/>
+                  <a:ext cx="419100" cy="228600"/>
+                </a:xfrm>
+                <a:prstGeom prst="roundRect">
+                  <a:avLst>
+                    <a:gd name="adj" fmla="val 50000"/>
+                  </a:avLst>
+                </a:prstGeom>
+                <a:blipFill rotWithShape="1">
+                  <a:blip r:embed="rId2"/>
+                  <a:stretch>
+                    <a:fillRect b="-7692"/>
+                  </a:stretch>
+                </a:blipFill>
+                <a:ln w="12700"/>
+              </p:spPr>
+              <p:txBody>
+                <a:bodyPr/>
+                <a:lstStyle/>
+                <a:p>
+                  <a:r>
+                    <a:rPr lang="en-US">
+                      <a:noFill/>
+                    </a:rPr>
+                    <a:t> </a:t>
+                  </a:r>
+                </a:p>
+              </p:txBody>
+            </p:sp>
+          </mc:Fallback>
+        </mc:AlternateContent>
+        <p:sp>
+          <p:nvSpPr>
+            <p:cNvPr id="65" name="Rounded Rectangle 64"/>
+            <p:cNvSpPr/>
+            <p:nvPr/>
+          </p:nvSpPr>
+          <p:spPr>
+            <a:xfrm>
+              <a:off x="3178179" y="2637062"/>
+              <a:ext cx="1117604" cy="228600"/>
+            </a:xfrm>
+            <a:prstGeom prst="roundRect">
+              <a:avLst>
+                <a:gd name="adj" fmla="val 50000"/>
+              </a:avLst>
+            </a:prstGeom>
+            <a:ln w="12700"/>
+          </p:spPr>
+          <p:style>
+            <a:lnRef idx="2">
+              <a:schemeClr val="accent6">
+                <a:shade val="50000"/>
+              </a:schemeClr>
+            </a:lnRef>
+            <a:fillRef idx="1">
+              <a:schemeClr val="accent6"/>
+            </a:fillRef>
+            <a:effectRef idx="0">
+              <a:schemeClr val="accent6"/>
+            </a:effectRef>
+            <a:fontRef idx="minor">
+              <a:schemeClr val="lt1"/>
+            </a:fontRef>
+          </p:style>
+          <p:txBody>
+            <a:bodyPr rtlCol="0" anchor="ctr"/>
+            <a:lstStyle/>
+            <a:p>
+              <a:pPr algn="ctr"/>
+              <a:r>
+                <a:rPr lang="en-US" sz="1600" dirty="0" smtClean="0"/>
+                <a:t>Output</a:t>
+              </a:r>
+              <a:endParaRPr lang="en-US" sz="1600" dirty="0"/>
+            </a:p>
+          </p:txBody>
+        </p:sp>
+        <mc:AlternateContent xmlns:mc="http://schemas.openxmlformats.org/markup-compatibility/2006">
+          <mc:Choice xmlns:a14="http://schemas.microsoft.com/office/drawing/2010/main" Requires="a14">
+            <p:sp>
+              <p:nvSpPr>
+                <p:cNvPr id="63" name="Rounded Rectangle 62"/>
+                <p:cNvSpPr/>
+                <p:nvPr/>
+              </p:nvSpPr>
+              <p:spPr>
+                <a:xfrm>
+                  <a:off x="3178179" y="2351306"/>
+                  <a:ext cx="419100" cy="228600"/>
+                </a:xfrm>
+                <a:prstGeom prst="roundRect">
+                  <a:avLst>
+                    <a:gd name="adj" fmla="val 50000"/>
+                  </a:avLst>
+                </a:prstGeom>
+                <a:ln w="12700"/>
+              </p:spPr>
+              <p:style>
+                <a:lnRef idx="2">
+                  <a:schemeClr val="accent1">
+                    <a:shade val="50000"/>
+                  </a:schemeClr>
+                </a:lnRef>
+                <a:fillRef idx="1">
+                  <a:schemeClr val="accent1"/>
+                </a:fillRef>
+                <a:effectRef idx="0">
+                  <a:schemeClr val="accent1"/>
+                </a:effectRef>
+                <a:fontRef idx="minor">
+                  <a:schemeClr val="lt1"/>
+                </a:fontRef>
+              </p:style>
+              <p:txBody>
+                <a:bodyPr rtlCol="0" anchor="ctr"/>
+                <a:lstStyle/>
+                <a:p>
+                  <a:pPr algn="ctr"/>
+                  <a14:m>
+                    <m:oMathPara xmlns:m="http://schemas.openxmlformats.org/officeDocument/2006/math">
+                      <m:oMathParaPr>
+                        <m:jc m:val="centerGroup"/>
+                      </m:oMathParaPr>
+                      <m:oMath xmlns:m="http://schemas.openxmlformats.org/officeDocument/2006/math">
+                        <m:r>
+                          <m:rPr>
+                            <m:sty m:val="p"/>
+                          </m:rPr>
+                          <a:rPr lang="en-US" sz="1600" b="0" i="0" smtClean="0">
+                            <a:latin typeface="Cambria Math"/>
+                          </a:rPr>
+                          <m:t>Σ</m:t>
+                        </m:r>
+                      </m:oMath>
+                    </m:oMathPara>
+                  </a14:m>
+                  <a:endParaRPr lang="en-US" sz="1600" dirty="0"/>
+                </a:p>
+              </p:txBody>
+            </p:sp>
+          </mc:Choice>
+          <mc:Fallback>
+            <p:sp>
+              <p:nvSpPr>
+                <p:cNvPr id="63" name="Rounded Rectangle 62"/>
+                <p:cNvSpPr>
+                  <a:spLocks noRot="1" noChangeAspect="1" noMove="1" noResize="1" noEditPoints="1" noAdjustHandles="1" noChangeArrowheads="1" noChangeShapeType="1" noTextEdit="1"/>
+                </p:cNvSpPr>
+                <p:nvPr/>
+              </p:nvSpPr>
+              <p:spPr>
+                <a:xfrm>
+                  <a:off x="3178179" y="2351306"/>
+                  <a:ext cx="419100" cy="228600"/>
+                </a:xfrm>
+                <a:prstGeom prst="roundRect">
+                  <a:avLst>
+                    <a:gd name="adj" fmla="val 50000"/>
+                  </a:avLst>
+                </a:prstGeom>
+                <a:blipFill rotWithShape="1">
+                  <a:blip r:embed="rId3"/>
+                  <a:stretch>
+                    <a:fillRect b="-7692"/>
+                  </a:stretch>
+                </a:blipFill>
+                <a:ln w="12700"/>
+              </p:spPr>
+              <p:txBody>
+                <a:bodyPr/>
+                <a:lstStyle/>
+                <a:p>
+                  <a:r>
+                    <a:rPr lang="en-US">
+                      <a:noFill/>
+                    </a:rPr>
+                    <a:t> </a:t>
+                  </a:r>
+                </a:p>
+              </p:txBody>
+            </p:sp>
+          </mc:Fallback>
+        </mc:AlternateContent>
+        <p:sp>
+          <p:nvSpPr>
+            <p:cNvPr id="6" name="Rounded Rectangle 5"/>
+            <p:cNvSpPr/>
+            <p:nvPr/>
+          </p:nvSpPr>
+          <p:spPr>
+            <a:xfrm>
+              <a:off x="4670429" y="2351306"/>
+              <a:ext cx="1098550" cy="228600"/>
+            </a:xfrm>
+            <a:prstGeom prst="roundRect">
+              <a:avLst>
+                <a:gd name="adj" fmla="val 50000"/>
+              </a:avLst>
+            </a:prstGeom>
+            <a:ln w="12700"/>
+          </p:spPr>
+          <p:style>
+            <a:lnRef idx="2">
+              <a:schemeClr val="accent1">
+                <a:shade val="50000"/>
+              </a:schemeClr>
+            </a:lnRef>
+            <a:fillRef idx="1">
+              <a:schemeClr val="accent1"/>
+            </a:fillRef>
+            <a:effectRef idx="0">
+              <a:schemeClr val="accent1"/>
+            </a:effectRef>
+            <a:fontRef idx="minor">
+              <a:schemeClr val="lt1"/>
+            </a:fontRef>
+          </p:style>
+          <p:txBody>
+            <a:bodyPr rtlCol="0" anchor="ctr"/>
+            <a:lstStyle/>
+            <a:p>
+              <a:pPr algn="ctr"/>
+              <a:r>
+                <a:rPr lang="en-US" sz="1600" dirty="0" smtClean="0"/>
+                <a:t>Output</a:t>
+              </a:r>
+              <a:endParaRPr lang="en-US" sz="1600" dirty="0"/>
+            </a:p>
+          </p:txBody>
+        </p:sp>
+        <mc:AlternateContent xmlns:mc="http://schemas.openxmlformats.org/markup-compatibility/2006">
+          <mc:Choice xmlns:a14="http://schemas.microsoft.com/office/drawing/2010/main" Requires="a14">
+            <p:sp>
+              <p:nvSpPr>
+                <p:cNvPr id="4" name="Rectangle 3"/>
+                <p:cNvSpPr/>
+                <p:nvPr/>
+              </p:nvSpPr>
+              <p:spPr>
+                <a:xfrm>
+                  <a:off x="4181479" y="2351306"/>
+                  <a:ext cx="609600" cy="228600"/>
+                </a:xfrm>
+                <a:prstGeom prst="rect">
+                  <a:avLst/>
+                </a:prstGeom>
+                <a:ln w="12700"/>
+              </p:spPr>
+              <p:style>
+                <a:lnRef idx="2">
+                  <a:schemeClr val="accent1">
+                    <a:shade val="50000"/>
+                  </a:schemeClr>
+                </a:lnRef>
+                <a:fillRef idx="1">
+                  <a:schemeClr val="accent1"/>
+                </a:fillRef>
+                <a:effectRef idx="0">
+                  <a:schemeClr val="accent1"/>
+                </a:effectRef>
+                <a:fontRef idx="minor">
+                  <a:schemeClr val="lt1"/>
+                </a:fontRef>
+              </p:style>
+              <p:txBody>
+                <a:bodyPr rtlCol="0" anchor="ctr"/>
+                <a:lstStyle/>
+                <a:p>
+                  <a:pPr algn="ctr"/>
+                  <a14:m>
+                    <m:oMathPara xmlns:m="http://schemas.openxmlformats.org/officeDocument/2006/math">
+                      <m:oMathParaPr>
+                        <m:jc m:val="centerGroup"/>
+                      </m:oMathParaPr>
+                      <m:oMath xmlns:m="http://schemas.openxmlformats.org/officeDocument/2006/math">
+                        <m:r>
+                          <a:rPr lang="en-US" sz="1600" b="0" i="1" smtClean="0">
+                            <a:latin typeface="Cambria Math"/>
+                          </a:rPr>
+                          <m:t>𝑓</m:t>
+                        </m:r>
+                        <m:d>
+                          <m:dPr>
+                            <m:ctrlPr>
+                              <a:rPr lang="en-US" sz="1600" b="0" i="1" smtClean="0">
+                                <a:latin typeface="Cambria Math"/>
+                              </a:rPr>
+                            </m:ctrlPr>
+                          </m:dPr>
+                          <m:e>
+                            <m:r>
+                              <a:rPr lang="en-US" sz="1600" b="0" i="1" smtClean="0">
+                                <a:latin typeface="Cambria Math"/>
+                                <a:ea typeface="Cambria Math"/>
+                              </a:rPr>
+                              <m:t>∙</m:t>
+                            </m:r>
+                          </m:e>
+                        </m:d>
+                      </m:oMath>
+                    </m:oMathPara>
+                  </a14:m>
+                  <a:endParaRPr lang="en-US" sz="1600" dirty="0"/>
+                </a:p>
+              </p:txBody>
+            </p:sp>
+          </mc:Choice>
+          <mc:Fallback>
+            <p:sp>
+              <p:nvSpPr>
+                <p:cNvPr id="4" name="Rectangle 3"/>
+                <p:cNvSpPr>
+                  <a:spLocks noRot="1" noChangeAspect="1" noMove="1" noResize="1" noEditPoints="1" noAdjustHandles="1" noChangeArrowheads="1" noChangeShapeType="1" noTextEdit="1"/>
+                </p:cNvSpPr>
+                <p:nvPr/>
+              </p:nvSpPr>
+              <p:spPr>
+                <a:xfrm>
+                  <a:off x="4181479" y="2351306"/>
+                  <a:ext cx="609600" cy="228600"/>
+                </a:xfrm>
+                <a:prstGeom prst="rect">
+                  <a:avLst/>
+                </a:prstGeom>
+                <a:blipFill rotWithShape="1">
+                  <a:blip r:embed="rId4"/>
+                  <a:stretch>
+                    <a:fillRect b="-35897"/>
+                  </a:stretch>
+                </a:blipFill>
+                <a:ln w="12700"/>
+              </p:spPr>
+              <p:txBody>
+                <a:bodyPr/>
+                <a:lstStyle/>
+                <a:p>
+                  <a:r>
+                    <a:rPr lang="en-US">
+                      <a:noFill/>
+                    </a:rPr>
+                    <a:t> </a:t>
+                  </a:r>
+                </a:p>
+              </p:txBody>
+            </p:sp>
+          </mc:Fallback>
+        </mc:AlternateContent>
+        <mc:AlternateContent xmlns:mc="http://schemas.openxmlformats.org/markup-compatibility/2006">
+          <mc:Choice xmlns:a14="http://schemas.microsoft.com/office/drawing/2010/main" Requires="a14">
+            <p:sp>
+              <p:nvSpPr>
+                <p:cNvPr id="5" name="Rectangle 4"/>
+                <p:cNvSpPr/>
+                <p:nvPr/>
+              </p:nvSpPr>
+              <p:spPr>
+                <a:xfrm>
+                  <a:off x="4181479" y="2637062"/>
+                  <a:ext cx="609600" cy="228600"/>
+                </a:xfrm>
+                <a:prstGeom prst="rect">
+                  <a:avLst/>
+                </a:prstGeom>
+                <a:ln w="12700"/>
+              </p:spPr>
+              <p:style>
+                <a:lnRef idx="2">
+                  <a:schemeClr val="accent6">
+                    <a:shade val="50000"/>
+                  </a:schemeClr>
+                </a:lnRef>
+                <a:fillRef idx="1">
+                  <a:schemeClr val="accent6"/>
+                </a:fillRef>
+                <a:effectRef idx="0">
+                  <a:schemeClr val="accent6"/>
+                </a:effectRef>
+                <a:fontRef idx="minor">
+                  <a:schemeClr val="lt1"/>
+                </a:fontRef>
+              </p:style>
+              <p:txBody>
+                <a:bodyPr rtlCol="0" anchor="ctr"/>
+                <a:lstStyle/>
+                <a:p>
+                  <a:pPr algn="ctr"/>
+                  <a14:m>
+                    <m:oMathPara xmlns:m="http://schemas.openxmlformats.org/officeDocument/2006/math">
+                      <m:oMathParaPr>
+                        <m:jc m:val="centerGroup"/>
+                      </m:oMathParaPr>
+                      <m:oMath xmlns:m="http://schemas.openxmlformats.org/officeDocument/2006/math">
+                        <m:sSup>
+                          <m:sSupPr>
+                            <m:ctrlPr>
+                              <a:rPr lang="en-US" sz="1600" b="0" i="1" smtClean="0">
+                                <a:latin typeface="Cambria Math"/>
+                              </a:rPr>
+                            </m:ctrlPr>
+                          </m:sSupPr>
+                          <m:e>
+                            <m:r>
+                              <a:rPr lang="en-US" sz="1600" b="0" i="1" smtClean="0">
+                                <a:latin typeface="Cambria Math"/>
+                              </a:rPr>
+                              <m:t>𝑓</m:t>
+                            </m:r>
+                          </m:e>
+                          <m:sup>
+                            <m:r>
+                              <a:rPr lang="en-US" sz="1600" b="0" i="1" smtClean="0">
+                                <a:latin typeface="Cambria Math"/>
+                              </a:rPr>
+                              <m:t>′</m:t>
+                            </m:r>
+                          </m:sup>
+                        </m:sSup>
+                        <m:d>
+                          <m:dPr>
+                            <m:ctrlPr>
+                              <a:rPr lang="en-US" sz="1600" b="0" i="1" smtClean="0">
+                                <a:latin typeface="Cambria Math"/>
+                              </a:rPr>
+                            </m:ctrlPr>
+                          </m:dPr>
+                          <m:e>
+                            <m:r>
+                              <a:rPr lang="en-US" sz="1600" b="0" i="1" smtClean="0">
+                                <a:latin typeface="Cambria Math"/>
+                                <a:ea typeface="Cambria Math"/>
+                              </a:rPr>
+                              <m:t>∙</m:t>
+                            </m:r>
+                          </m:e>
+                        </m:d>
+                      </m:oMath>
+                    </m:oMathPara>
+                  </a14:m>
+                  <a:endParaRPr lang="en-US" sz="1600" dirty="0"/>
+                </a:p>
+              </p:txBody>
+            </p:sp>
+          </mc:Choice>
+          <mc:Fallback>
+            <p:sp>
+              <p:nvSpPr>
+                <p:cNvPr id="5" name="Rectangle 4"/>
+                <p:cNvSpPr>
+                  <a:spLocks noRot="1" noChangeAspect="1" noMove="1" noResize="1" noEditPoints="1" noAdjustHandles="1" noChangeArrowheads="1" noChangeShapeType="1" noTextEdit="1"/>
+                </p:cNvSpPr>
+                <p:nvPr/>
+              </p:nvSpPr>
+              <p:spPr>
+                <a:xfrm>
+                  <a:off x="4181479" y="2637062"/>
+                  <a:ext cx="609600" cy="228600"/>
+                </a:xfrm>
+                <a:prstGeom prst="rect">
+                  <a:avLst/>
+                </a:prstGeom>
+                <a:blipFill rotWithShape="1">
+                  <a:blip r:embed="rId5"/>
+                  <a:stretch>
+                    <a:fillRect l="-980" b="-35897"/>
+                  </a:stretch>
+                </a:blipFill>
+                <a:ln w="12700"/>
+              </p:spPr>
+              <p:txBody>
+                <a:bodyPr/>
+                <a:lstStyle/>
+                <a:p>
+                  <a:r>
+                    <a:rPr lang="en-US">
+                      <a:noFill/>
+                    </a:rPr>
+                    <a:t> </a:t>
+                  </a:r>
+                </a:p>
+              </p:txBody>
+            </p:sp>
+          </mc:Fallback>
+        </mc:AlternateContent>
+        <p:sp>
+          <p:nvSpPr>
+            <p:cNvPr id="69" name="TextBox 68"/>
+            <p:cNvSpPr txBox="1"/>
+            <p:nvPr/>
+          </p:nvSpPr>
+          <p:spPr>
+            <a:xfrm>
+              <a:off x="2562221" y="2654096"/>
+              <a:ext cx="430887" cy="243310"/>
+            </a:xfrm>
+            <a:prstGeom prst="rect">
+              <a:avLst/>
+            </a:prstGeom>
+            <a:noFill/>
+          </p:spPr>
+          <p:txBody>
+            <a:bodyPr vert="vert" wrap="square" rtlCol="0">
+              <a:spAutoFit/>
+            </a:bodyPr>
+            <a:lstStyle/>
+            <a:p>
+              <a:pPr algn="ctr"/>
+              <a:r>
+                <a:rPr lang="en-US" sz="1600" dirty="0" smtClean="0"/>
+                <a:t>…</a:t>
+              </a:r>
+              <a:endParaRPr lang="en-US" sz="1600" dirty="0"/>
+            </a:p>
+          </p:txBody>
+        </p:sp>
+        <p:sp>
+          <p:nvSpPr>
+            <p:cNvPr id="77" name="TextBox 76"/>
+            <p:cNvSpPr txBox="1"/>
+            <p:nvPr/>
+          </p:nvSpPr>
+          <p:spPr>
+            <a:xfrm>
+              <a:off x="6091244" y="2654096"/>
+              <a:ext cx="430887" cy="243310"/>
+            </a:xfrm>
+            <a:prstGeom prst="rect">
+              <a:avLst/>
+            </a:prstGeom>
+            <a:noFill/>
+          </p:spPr>
+          <p:txBody>
+            <a:bodyPr vert="vert" wrap="square" rtlCol="0">
+              <a:spAutoFit/>
+            </a:bodyPr>
+            <a:lstStyle/>
+            <a:p>
+              <a:pPr algn="ctr"/>
+              <a:r>
+                <a:rPr lang="en-US" sz="1600" dirty="0" smtClean="0"/>
+                <a:t>…</a:t>
+              </a:r>
+              <a:endParaRPr lang="en-US" sz="1600" dirty="0"/>
+            </a:p>
+          </p:txBody>
+        </p:sp>
+        <p:cxnSp>
+          <p:nvCxnSpPr>
+            <p:cNvPr id="8" name="Straight Arrow Connector 7"/>
+            <p:cNvCxnSpPr>
+              <a:stCxn id="118" idx="3"/>
+              <a:endCxn id="63" idx="1"/>
+            </p:cNvCxnSpPr>
+            <p:nvPr/>
+          </p:nvCxnSpPr>
+          <p:spPr>
+            <a:xfrm>
+              <a:off x="2835270" y="2217956"/>
+              <a:ext cx="342909" cy="247650"/>
+            </a:xfrm>
+            <a:prstGeom prst="straightConnector1">
+              <a:avLst/>
+            </a:prstGeom>
+            <a:ln w="12700">
+              <a:headEnd type="none" w="med" len="med"/>
+              <a:tailEnd type="triangle" w="med" len="med"/>
+            </a:ln>
+          </p:spPr>
+          <p:style>
+            <a:lnRef idx="1">
+              <a:schemeClr val="accent1"/>
+            </a:lnRef>
+            <a:fillRef idx="0">
+              <a:schemeClr val="accent1"/>
+            </a:fillRef>
+            <a:effectRef idx="0">
+              <a:schemeClr val="accent1"/>
+            </a:effectRef>
+            <a:fontRef idx="minor">
+              <a:schemeClr val="tx1"/>
+            </a:fontRef>
+          </p:style>
+        </p:cxnSp>
+        <p:cxnSp>
+          <p:nvCxnSpPr>
+            <p:cNvPr id="80" name="Straight Arrow Connector 79"/>
+            <p:cNvCxnSpPr>
+              <a:stCxn id="127" idx="3"/>
+              <a:endCxn id="63" idx="1"/>
+            </p:cNvCxnSpPr>
+            <p:nvPr/>
+          </p:nvCxnSpPr>
+          <p:spPr>
+            <a:xfrm flipV="1">
+              <a:off x="2835270" y="2465606"/>
+              <a:ext cx="342909" cy="57150"/>
+            </a:xfrm>
+            <a:prstGeom prst="straightConnector1">
+              <a:avLst/>
+            </a:prstGeom>
+            <a:ln w="12700">
+              <a:headEnd type="none" w="med" len="med"/>
+              <a:tailEnd type="triangle" w="med" len="med"/>
+            </a:ln>
+          </p:spPr>
+          <p:style>
+            <a:lnRef idx="1">
+              <a:schemeClr val="accent1"/>
+            </a:lnRef>
+            <a:fillRef idx="0">
+              <a:schemeClr val="accent1"/>
+            </a:fillRef>
+            <a:effectRef idx="0">
+              <a:schemeClr val="accent1"/>
+            </a:effectRef>
+            <a:fontRef idx="minor">
+              <a:schemeClr val="tx1"/>
+            </a:fontRef>
+          </p:style>
+        </p:cxnSp>
+        <p:cxnSp>
+          <p:nvCxnSpPr>
+            <p:cNvPr id="84" name="Straight Arrow Connector 83"/>
+            <p:cNvCxnSpPr>
+              <a:stCxn id="129" idx="3"/>
+              <a:endCxn id="63" idx="1"/>
+            </p:cNvCxnSpPr>
+            <p:nvPr/>
+          </p:nvCxnSpPr>
+          <p:spPr>
+            <a:xfrm flipV="1">
+              <a:off x="2835270" y="2465606"/>
+              <a:ext cx="342909" cy="559336"/>
+            </a:xfrm>
+            <a:prstGeom prst="straightConnector1">
+              <a:avLst/>
+            </a:prstGeom>
+            <a:ln w="12700">
+              <a:headEnd type="none" w="med" len="med"/>
+              <a:tailEnd type="triangle" w="med" len="med"/>
+            </a:ln>
+          </p:spPr>
+          <p:style>
+            <a:lnRef idx="1">
+              <a:schemeClr val="accent1"/>
+            </a:lnRef>
+            <a:fillRef idx="0">
+              <a:schemeClr val="accent1"/>
+            </a:fillRef>
+            <a:effectRef idx="0">
+              <a:schemeClr val="accent1"/>
+            </a:effectRef>
+            <a:fontRef idx="minor">
+              <a:schemeClr val="tx1"/>
+            </a:fontRef>
+          </p:style>
+        </p:cxnSp>
+        <p:cxnSp>
+          <p:nvCxnSpPr>
+            <p:cNvPr id="87" name="Straight Arrow Connector 86"/>
+            <p:cNvCxnSpPr>
+              <a:endCxn id="101" idx="3"/>
+            </p:cNvCxnSpPr>
+            <p:nvPr/>
+          </p:nvCxnSpPr>
+          <p:spPr>
+            <a:xfrm flipH="1">
+              <a:off x="5768979" y="2217956"/>
+              <a:ext cx="366715" cy="533400"/>
+            </a:xfrm>
+            <a:prstGeom prst="straightConnector1">
+              <a:avLst/>
+            </a:prstGeom>
+            <a:ln w="12700">
+              <a:headEnd type="none" w="med" len="med"/>
+              <a:tailEnd type="triangle" w="med" len="med"/>
+            </a:ln>
+          </p:spPr>
+          <p:style>
+            <a:lnRef idx="1">
+              <a:schemeClr val="accent6"/>
+            </a:lnRef>
+            <a:fillRef idx="0">
+              <a:schemeClr val="accent6"/>
+            </a:fillRef>
+            <a:effectRef idx="0">
+              <a:schemeClr val="accent6"/>
+            </a:effectRef>
+            <a:fontRef idx="minor">
+              <a:schemeClr val="tx1"/>
+            </a:fontRef>
+          </p:style>
+        </p:cxnSp>
+        <p:cxnSp>
+          <p:nvCxnSpPr>
+            <p:cNvPr id="90" name="Straight Arrow Connector 89"/>
+            <p:cNvCxnSpPr>
+              <a:endCxn id="101" idx="3"/>
+            </p:cNvCxnSpPr>
+            <p:nvPr/>
+          </p:nvCxnSpPr>
+          <p:spPr>
+            <a:xfrm flipH="1">
+              <a:off x="5768979" y="2522756"/>
+              <a:ext cx="366715" cy="228600"/>
+            </a:xfrm>
+            <a:prstGeom prst="straightConnector1">
+              <a:avLst/>
+            </a:prstGeom>
+            <a:ln w="12700">
+              <a:headEnd type="none" w="med" len="med"/>
+              <a:tailEnd type="triangle" w="med" len="med"/>
+            </a:ln>
+          </p:spPr>
+          <p:style>
+            <a:lnRef idx="1">
+              <a:schemeClr val="accent6"/>
+            </a:lnRef>
+            <a:fillRef idx="0">
+              <a:schemeClr val="accent6"/>
+            </a:fillRef>
+            <a:effectRef idx="0">
+              <a:schemeClr val="accent6"/>
+            </a:effectRef>
+            <a:fontRef idx="minor">
+              <a:schemeClr val="tx1"/>
+            </a:fontRef>
+          </p:style>
+        </p:cxnSp>
+        <p:cxnSp>
+          <p:nvCxnSpPr>
+            <p:cNvPr id="93" name="Straight Arrow Connector 92"/>
+            <p:cNvCxnSpPr>
+              <a:stCxn id="136" idx="1"/>
+              <a:endCxn id="101" idx="3"/>
+            </p:cNvCxnSpPr>
+            <p:nvPr/>
+          </p:nvCxnSpPr>
+          <p:spPr>
+            <a:xfrm flipH="1" flipV="1">
+              <a:off x="5768979" y="2751356"/>
+              <a:ext cx="366715" cy="273050"/>
+            </a:xfrm>
+            <a:prstGeom prst="straightConnector1">
+              <a:avLst/>
+            </a:prstGeom>
+            <a:ln w="12700">
+              <a:headEnd type="none" w="med" len="med"/>
+              <a:tailEnd type="triangle" w="med" len="med"/>
+            </a:ln>
+          </p:spPr>
+          <p:style>
+            <a:lnRef idx="1">
+              <a:schemeClr val="accent6"/>
+            </a:lnRef>
+            <a:fillRef idx="0">
+              <a:schemeClr val="accent6"/>
+            </a:fillRef>
+            <a:effectRef idx="0">
+              <a:schemeClr val="accent6"/>
+            </a:effectRef>
+            <a:fontRef idx="minor">
+              <a:schemeClr val="tx1"/>
+            </a:fontRef>
+          </p:style>
+        </p:cxnSp>
+        <p:sp>
+          <p:nvSpPr>
+            <p:cNvPr id="96" name="Rectangle 95"/>
+            <p:cNvSpPr/>
+            <p:nvPr/>
+          </p:nvSpPr>
+          <p:spPr>
+            <a:xfrm>
+              <a:off x="3502029" y="2351306"/>
+              <a:ext cx="679450" cy="228600"/>
+            </a:xfrm>
+            <a:prstGeom prst="rect">
+              <a:avLst/>
+            </a:prstGeom>
+            <a:ln w="12700"/>
+          </p:spPr>
+          <p:style>
+            <a:lnRef idx="2">
+              <a:schemeClr val="accent1">
+                <a:shade val="50000"/>
+              </a:schemeClr>
+            </a:lnRef>
+            <a:fillRef idx="1">
+              <a:schemeClr val="accent1"/>
+            </a:fillRef>
+            <a:effectRef idx="0">
+              <a:schemeClr val="accent1"/>
+            </a:effectRef>
+            <a:fontRef idx="minor">
+              <a:schemeClr val="lt1"/>
+            </a:fontRef>
+          </p:style>
+          <p:txBody>
+            <a:bodyPr rtlCol="0" anchor="ctr"/>
+            <a:lstStyle/>
+            <a:p>
+              <a:pPr algn="ctr"/>
+              <a:r>
+                <a:rPr lang="en-US" sz="1600" dirty="0" smtClean="0"/>
+                <a:t>Input</a:t>
+              </a:r>
+              <a:endParaRPr lang="en-US" sz="1600" dirty="0"/>
+            </a:p>
+          </p:txBody>
+        </p:sp>
+        <p:sp>
+          <p:nvSpPr>
+            <p:cNvPr id="100" name="Rectangle 99"/>
+            <p:cNvSpPr/>
+            <p:nvPr/>
+          </p:nvSpPr>
+          <p:spPr>
+            <a:xfrm>
+              <a:off x="4791079" y="2637056"/>
+              <a:ext cx="679450" cy="228600"/>
+            </a:xfrm>
+            <a:prstGeom prst="rect">
+              <a:avLst/>
+            </a:prstGeom>
+            <a:ln w="12700"/>
+          </p:spPr>
+          <p:style>
+            <a:lnRef idx="2">
+              <a:schemeClr val="accent6">
+                <a:shade val="50000"/>
+              </a:schemeClr>
+            </a:lnRef>
+            <a:fillRef idx="1">
+              <a:schemeClr val="accent6"/>
+            </a:fillRef>
+            <a:effectRef idx="0">
+              <a:schemeClr val="accent6"/>
+            </a:effectRef>
+            <a:fontRef idx="minor">
+              <a:schemeClr val="lt1"/>
+            </a:fontRef>
+          </p:style>
+          <p:txBody>
+            <a:bodyPr rtlCol="0" anchor="ctr"/>
+            <a:lstStyle/>
+            <a:p>
+              <a:pPr algn="ctr"/>
+              <a:r>
+                <a:rPr lang="en-US" sz="1600" dirty="0" smtClean="0"/>
+                <a:t>Input</a:t>
+              </a:r>
+              <a:endParaRPr lang="en-US" sz="1600" dirty="0"/>
+            </a:p>
+          </p:txBody>
+        </p:sp>
+        <p:sp>
+          <p:nvSpPr>
+            <p:cNvPr id="26" name="TextBox 25"/>
+            <p:cNvSpPr txBox="1"/>
+            <p:nvPr/>
+          </p:nvSpPr>
+          <p:spPr>
+            <a:xfrm>
+              <a:off x="3813787" y="2012752"/>
+              <a:ext cx="1344984" cy="338554"/>
+            </a:xfrm>
+            <a:prstGeom prst="rect">
+              <a:avLst/>
+            </a:prstGeom>
+            <a:noFill/>
+          </p:spPr>
+          <p:txBody>
+            <a:bodyPr wrap="none" rtlCol="0">
+              <a:spAutoFit/>
+            </a:bodyPr>
+            <a:lstStyle/>
+            <a:p>
+              <a:r>
+                <a:rPr lang="en-US" sz="1600" dirty="0" smtClean="0"/>
+                <a:t>Feed-Forward</a:t>
+              </a:r>
+              <a:endParaRPr lang="en-US" sz="1600" dirty="0"/>
+            </a:p>
+          </p:txBody>
+        </p:sp>
+        <p:cxnSp>
+          <p:nvCxnSpPr>
+            <p:cNvPr id="28" name="Straight Arrow Connector 27"/>
+            <p:cNvCxnSpPr/>
+            <p:nvPr/>
+          </p:nvCxnSpPr>
+          <p:spPr>
+            <a:xfrm>
+              <a:off x="3663489" y="2292251"/>
+              <a:ext cx="1645579" cy="0"/>
+            </a:xfrm>
+            <a:prstGeom prst="straightConnector1">
+              <a:avLst/>
+            </a:prstGeom>
+            <a:ln w="12700">
+              <a:headEnd type="none" w="med" len="med"/>
+              <a:tailEnd type="triangle" w="med" len="med"/>
+            </a:ln>
+          </p:spPr>
+          <p:style>
+            <a:lnRef idx="1">
+              <a:schemeClr val="accent1"/>
+            </a:lnRef>
+            <a:fillRef idx="0">
+              <a:schemeClr val="accent1"/>
+            </a:fillRef>
+            <a:effectRef idx="0">
+              <a:schemeClr val="accent1"/>
+            </a:effectRef>
+            <a:fontRef idx="minor">
+              <a:schemeClr val="tx1"/>
+            </a:fontRef>
+          </p:style>
+        </p:cxnSp>
+        <p:sp>
+          <p:nvSpPr>
+            <p:cNvPr id="112" name="TextBox 111"/>
+            <p:cNvSpPr txBox="1"/>
+            <p:nvPr/>
+          </p:nvSpPr>
+          <p:spPr>
+            <a:xfrm>
+              <a:off x="3663489" y="2865656"/>
+              <a:ext cx="1645579" cy="338554"/>
+            </a:xfrm>
+            <a:prstGeom prst="rect">
+              <a:avLst/>
+            </a:prstGeom>
+            <a:noFill/>
+          </p:spPr>
+          <p:txBody>
+            <a:bodyPr wrap="none" rtlCol="0">
+              <a:spAutoFit/>
+            </a:bodyPr>
+            <a:lstStyle/>
+            <a:p>
+              <a:r>
+                <a:rPr lang="en-US" sz="1600" dirty="0" smtClean="0"/>
+                <a:t>Back-Propagation</a:t>
+              </a:r>
+              <a:endParaRPr lang="en-US" sz="1600" dirty="0"/>
+            </a:p>
+          </p:txBody>
+        </p:sp>
+        <p:cxnSp>
+          <p:nvCxnSpPr>
+            <p:cNvPr id="113" name="Straight Arrow Connector 112"/>
+            <p:cNvCxnSpPr/>
+            <p:nvPr/>
+          </p:nvCxnSpPr>
+          <p:spPr>
+            <a:xfrm flipH="1">
+              <a:off x="3663489" y="2924711"/>
+              <a:ext cx="1645579" cy="0"/>
+            </a:xfrm>
+            <a:prstGeom prst="straightConnector1">
+              <a:avLst/>
+            </a:prstGeom>
+            <a:ln w="12700">
+              <a:headEnd type="none" w="med" len="med"/>
+              <a:tailEnd type="triangle" w="med" len="med"/>
+            </a:ln>
+          </p:spPr>
+          <p:style>
+            <a:lnRef idx="1">
+              <a:schemeClr val="accent6"/>
+            </a:lnRef>
+            <a:fillRef idx="0">
+              <a:schemeClr val="accent6"/>
+            </a:fillRef>
+            <a:effectRef idx="0">
+              <a:schemeClr val="accent6"/>
+            </a:effectRef>
+            <a:fontRef idx="minor">
+              <a:schemeClr val="tx1"/>
+            </a:fontRef>
+          </p:style>
+        </p:cxnSp>
+        <p:sp>
+          <p:nvSpPr>
+            <p:cNvPr id="118" name="Rounded Rectangle 117"/>
+            <p:cNvSpPr/>
+            <p:nvPr/>
+          </p:nvSpPr>
+          <p:spPr>
+            <a:xfrm>
+              <a:off x="1797050" y="2103656"/>
+              <a:ext cx="1038220" cy="228600"/>
+            </a:xfrm>
+            <a:prstGeom prst="roundRect">
+              <a:avLst>
+                <a:gd name="adj" fmla="val 50000"/>
+              </a:avLst>
+            </a:prstGeom>
+            <a:ln w="12700"/>
+          </p:spPr>
+          <p:style>
+            <a:lnRef idx="2">
+              <a:schemeClr val="accent1">
+                <a:shade val="50000"/>
+              </a:schemeClr>
+            </a:lnRef>
+            <a:fillRef idx="1">
+              <a:schemeClr val="accent1"/>
+            </a:fillRef>
+            <a:effectRef idx="0">
+              <a:schemeClr val="accent1"/>
+            </a:effectRef>
+            <a:fontRef idx="minor">
+              <a:schemeClr val="lt1"/>
+            </a:fontRef>
+          </p:style>
+          <p:txBody>
+            <a:bodyPr rtlCol="0" anchor="ctr"/>
+            <a:lstStyle/>
+            <a:p>
+              <a:pPr algn="ctr"/>
+              <a:r>
+                <a:rPr lang="en-US" sz="1600" dirty="0" smtClean="0"/>
+                <a:t>   Output</a:t>
+              </a:r>
+              <a:endParaRPr lang="en-US" sz="1600" dirty="0"/>
+            </a:p>
+          </p:txBody>
+        </p:sp>
+        <p:sp>
+          <p:nvSpPr>
+            <p:cNvPr id="127" name="Rounded Rectangle 126"/>
+            <p:cNvSpPr/>
+            <p:nvPr/>
+          </p:nvSpPr>
+          <p:spPr>
+            <a:xfrm>
+              <a:off x="1797050" y="2408456"/>
+              <a:ext cx="1038220" cy="228600"/>
+            </a:xfrm>
+            <a:prstGeom prst="roundRect">
+              <a:avLst>
+                <a:gd name="adj" fmla="val 50000"/>
+              </a:avLst>
+            </a:prstGeom>
+            <a:ln w="12700"/>
+          </p:spPr>
+          <p:style>
+            <a:lnRef idx="2">
+              <a:schemeClr val="accent1">
+                <a:shade val="50000"/>
+              </a:schemeClr>
+            </a:lnRef>
+            <a:fillRef idx="1">
+              <a:schemeClr val="accent1"/>
+            </a:fillRef>
+            <a:effectRef idx="0">
+              <a:schemeClr val="accent1"/>
+            </a:effectRef>
+            <a:fontRef idx="minor">
+              <a:schemeClr val="lt1"/>
+            </a:fontRef>
+          </p:style>
+          <p:txBody>
+            <a:bodyPr rtlCol="0" anchor="ctr"/>
+            <a:lstStyle/>
+            <a:p>
+              <a:pPr algn="ctr"/>
+              <a:r>
+                <a:rPr lang="en-US" sz="1600" dirty="0" smtClean="0"/>
+                <a:t>   Output</a:t>
+              </a:r>
+              <a:endParaRPr lang="en-US" sz="1600" dirty="0"/>
+            </a:p>
+          </p:txBody>
+        </p:sp>
+        <p:sp>
+          <p:nvSpPr>
+            <p:cNvPr id="129" name="Rounded Rectangle 128"/>
+            <p:cNvSpPr/>
+            <p:nvPr/>
+          </p:nvSpPr>
+          <p:spPr>
+            <a:xfrm>
+              <a:off x="1797050" y="2910642"/>
+              <a:ext cx="1038220" cy="228600"/>
+            </a:xfrm>
+            <a:prstGeom prst="roundRect">
+              <a:avLst>
+                <a:gd name="adj" fmla="val 50000"/>
+              </a:avLst>
+            </a:prstGeom>
+            <a:ln w="12700"/>
+          </p:spPr>
+          <p:style>
+            <a:lnRef idx="2">
+              <a:schemeClr val="accent1">
+                <a:shade val="50000"/>
+              </a:schemeClr>
+            </a:lnRef>
+            <a:fillRef idx="1">
+              <a:schemeClr val="accent1"/>
+            </a:fillRef>
+            <a:effectRef idx="0">
+              <a:schemeClr val="accent1"/>
+            </a:effectRef>
+            <a:fontRef idx="minor">
+              <a:schemeClr val="lt1"/>
+            </a:fontRef>
+          </p:style>
+          <p:txBody>
+            <a:bodyPr rtlCol="0" anchor="ctr"/>
+            <a:lstStyle/>
+            <a:p>
+              <a:pPr algn="ctr"/>
+              <a:r>
+                <a:rPr lang="en-US" sz="1600" dirty="0" smtClean="0"/>
+                <a:t>   Output</a:t>
+              </a:r>
+              <a:endParaRPr lang="en-US" sz="1600" dirty="0"/>
+            </a:p>
+          </p:txBody>
+        </p:sp>
+        <p:sp>
+          <p:nvSpPr>
+            <p:cNvPr id="241" name="Rectangle 240"/>
+            <p:cNvSpPr/>
+            <p:nvPr/>
+          </p:nvSpPr>
+          <p:spPr>
+            <a:xfrm>
+              <a:off x="1789430" y="2025453"/>
+              <a:ext cx="187764" cy="1191458"/>
+            </a:xfrm>
+            <a:prstGeom prst="rect">
+              <a:avLst/>
+            </a:prstGeom>
+            <a:solidFill>
+              <a:schemeClr val="bg1"/>
+            </a:solidFill>
+            <a:ln>
+              <a:noFill/>
+            </a:ln>
+          </p:spPr>
+          <p:style>
+            <a:lnRef idx="2">
+              <a:schemeClr val="accent1">
+                <a:shade val="50000"/>
+              </a:schemeClr>
+            </a:lnRef>
+            <a:fillRef idx="1">
+              <a:schemeClr val="accent1"/>
+            </a:fillRef>
+            <a:effectRef idx="0">
+              <a:schemeClr val="accent1"/>
+            </a:effectRef>
+            <a:fontRef idx="minor">
+              <a:schemeClr val="lt1"/>
+            </a:fontRef>
+          </p:style>
+          <p:txBody>
+            <a:bodyPr rtlCol="0" anchor="ctr"/>
+            <a:lstStyle/>
+            <a:p>
+              <a:pPr algn="ctr"/>
+              <a:endParaRPr lang="en-US"/>
+            </a:p>
+          </p:txBody>
+        </p:sp>
+        <p:sp>
+          <p:nvSpPr>
+            <p:cNvPr id="136" name="Rounded Rectangle 135"/>
+            <p:cNvSpPr/>
+            <p:nvPr/>
+          </p:nvSpPr>
+          <p:spPr>
+            <a:xfrm>
+              <a:off x="6135694" y="2910106"/>
+              <a:ext cx="995356" cy="228600"/>
+            </a:xfrm>
+            <a:prstGeom prst="roundRect">
+              <a:avLst>
+                <a:gd name="adj" fmla="val 50000"/>
+              </a:avLst>
+            </a:prstGeom>
+            <a:ln w="12700"/>
+          </p:spPr>
+          <p:style>
+            <a:lnRef idx="2">
+              <a:schemeClr val="accent6">
+                <a:shade val="50000"/>
+              </a:schemeClr>
+            </a:lnRef>
+            <a:fillRef idx="1">
+              <a:schemeClr val="accent6"/>
+            </a:fillRef>
+            <a:effectRef idx="0">
+              <a:schemeClr val="accent6"/>
+            </a:effectRef>
+            <a:fontRef idx="minor">
+              <a:schemeClr val="lt1"/>
+            </a:fontRef>
+          </p:style>
+          <p:txBody>
+            <a:bodyPr rtlCol="0" anchor="ctr"/>
+            <a:lstStyle/>
+            <a:p>
+              <a:r>
+                <a:rPr lang="en-US" sz="1600" dirty="0" smtClean="0"/>
+                <a:t>Output</a:t>
+              </a:r>
+              <a:endParaRPr lang="en-US" sz="1600" dirty="0"/>
+            </a:p>
+          </p:txBody>
+        </p:sp>
+        <p:sp>
+          <p:nvSpPr>
+            <p:cNvPr id="138" name="Rounded Rectangle 137"/>
+            <p:cNvSpPr/>
+            <p:nvPr/>
+          </p:nvSpPr>
+          <p:spPr>
+            <a:xfrm>
+              <a:off x="6135694" y="2408456"/>
+              <a:ext cx="995356" cy="228600"/>
+            </a:xfrm>
+            <a:prstGeom prst="roundRect">
+              <a:avLst>
+                <a:gd name="adj" fmla="val 50000"/>
+              </a:avLst>
+            </a:prstGeom>
+            <a:ln w="12700"/>
+          </p:spPr>
+          <p:style>
+            <a:lnRef idx="2">
+              <a:schemeClr val="accent6">
+                <a:shade val="50000"/>
+              </a:schemeClr>
+            </a:lnRef>
+            <a:fillRef idx="1">
+              <a:schemeClr val="accent6"/>
+            </a:fillRef>
+            <a:effectRef idx="0">
+              <a:schemeClr val="accent6"/>
+            </a:effectRef>
+            <a:fontRef idx="minor">
+              <a:schemeClr val="lt1"/>
+            </a:fontRef>
+          </p:style>
+          <p:txBody>
+            <a:bodyPr rtlCol="0" anchor="ctr"/>
+            <a:lstStyle/>
+            <a:p>
+              <a:r>
+                <a:rPr lang="en-US" sz="1600" dirty="0" smtClean="0"/>
+                <a:t>Output</a:t>
+              </a:r>
+              <a:endParaRPr lang="en-US" sz="1600" dirty="0"/>
+            </a:p>
+          </p:txBody>
+        </p:sp>
+        <p:sp>
+          <p:nvSpPr>
+            <p:cNvPr id="139" name="Rounded Rectangle 138"/>
+            <p:cNvSpPr/>
+            <p:nvPr/>
+          </p:nvSpPr>
+          <p:spPr>
+            <a:xfrm>
+              <a:off x="6135694" y="2103656"/>
+              <a:ext cx="995356" cy="228600"/>
+            </a:xfrm>
+            <a:prstGeom prst="roundRect">
+              <a:avLst>
+                <a:gd name="adj" fmla="val 50000"/>
+              </a:avLst>
+            </a:prstGeom>
+            <a:ln w="12700"/>
+          </p:spPr>
+          <p:style>
+            <a:lnRef idx="2">
+              <a:schemeClr val="accent6">
+                <a:shade val="50000"/>
+              </a:schemeClr>
+            </a:lnRef>
+            <a:fillRef idx="1">
+              <a:schemeClr val="accent6"/>
+            </a:fillRef>
+            <a:effectRef idx="0">
+              <a:schemeClr val="accent6"/>
+            </a:effectRef>
+            <a:fontRef idx="minor">
+              <a:schemeClr val="lt1"/>
+            </a:fontRef>
+          </p:style>
+          <p:txBody>
+            <a:bodyPr rtlCol="0" anchor="ctr"/>
+            <a:lstStyle/>
+            <a:p>
+              <a:r>
+                <a:rPr lang="en-US" sz="1600" dirty="0" smtClean="0"/>
+                <a:t>Output</a:t>
+              </a:r>
+              <a:endParaRPr lang="en-US" sz="1600" dirty="0"/>
+            </a:p>
+          </p:txBody>
+        </p:sp>
+        <p:cxnSp>
+          <p:nvCxnSpPr>
+            <p:cNvPr id="247" name="Straight Connector 246"/>
+            <p:cNvCxnSpPr/>
+            <p:nvPr/>
+          </p:nvCxnSpPr>
+          <p:spPr>
+            <a:xfrm>
+              <a:off x="1979930" y="2103656"/>
+              <a:ext cx="0" cy="228600"/>
+            </a:xfrm>
+            <a:prstGeom prst="line">
+              <a:avLst/>
+            </a:prstGeom>
+            <a:ln w="12700">
+              <a:solidFill>
+                <a:schemeClr val="accent1">
+                  <a:lumMod val="75000"/>
+                </a:schemeClr>
+              </a:solidFill>
+            </a:ln>
+          </p:spPr>
+          <p:style>
+            <a:lnRef idx="1">
+              <a:schemeClr val="accent1"/>
+            </a:lnRef>
+            <a:fillRef idx="0">
+              <a:schemeClr val="accent1"/>
+            </a:fillRef>
+            <a:effectRef idx="0">
+              <a:schemeClr val="accent1"/>
+            </a:effectRef>
+            <a:fontRef idx="minor">
+              <a:schemeClr val="tx1"/>
+            </a:fontRef>
+          </p:style>
+        </p:cxnSp>
+        <p:cxnSp>
+          <p:nvCxnSpPr>
+            <p:cNvPr id="146" name="Straight Connector 145"/>
+            <p:cNvCxnSpPr/>
+            <p:nvPr/>
+          </p:nvCxnSpPr>
+          <p:spPr>
+            <a:xfrm>
+              <a:off x="1982470" y="2407920"/>
+              <a:ext cx="0" cy="228600"/>
+            </a:xfrm>
+            <a:prstGeom prst="line">
+              <a:avLst/>
+            </a:prstGeom>
+            <a:ln w="12700">
+              <a:solidFill>
+                <a:schemeClr val="accent1">
+                  <a:lumMod val="75000"/>
+                </a:schemeClr>
+              </a:solidFill>
+            </a:ln>
+          </p:spPr>
+          <p:style>
+            <a:lnRef idx="1">
+              <a:schemeClr val="accent1"/>
+            </a:lnRef>
+            <a:fillRef idx="0">
+              <a:schemeClr val="accent1"/>
+            </a:fillRef>
+            <a:effectRef idx="0">
+              <a:schemeClr val="accent1"/>
+            </a:effectRef>
+            <a:fontRef idx="minor">
+              <a:schemeClr val="tx1"/>
+            </a:fontRef>
+          </p:style>
+        </p:cxnSp>
+        <p:cxnSp>
+          <p:nvCxnSpPr>
+            <p:cNvPr id="147" name="Straight Connector 146"/>
+            <p:cNvCxnSpPr/>
+            <p:nvPr/>
+          </p:nvCxnSpPr>
+          <p:spPr>
+            <a:xfrm>
+              <a:off x="1977194" y="2912745"/>
+              <a:ext cx="0" cy="228600"/>
+            </a:xfrm>
+            <a:prstGeom prst="line">
+              <a:avLst/>
+            </a:prstGeom>
+            <a:ln w="12700">
+              <a:solidFill>
+                <a:schemeClr val="accent1">
+                  <a:lumMod val="75000"/>
+                </a:schemeClr>
+              </a:solidFill>
+            </a:ln>
+          </p:spPr>
+          <p:style>
+            <a:lnRef idx="1">
+              <a:schemeClr val="accent1"/>
+            </a:lnRef>
+            <a:fillRef idx="0">
+              <a:schemeClr val="accent1"/>
+            </a:fillRef>
+            <a:effectRef idx="0">
+              <a:schemeClr val="accent1"/>
+            </a:effectRef>
+            <a:fontRef idx="minor">
+              <a:schemeClr val="tx1"/>
+            </a:fontRef>
+          </p:style>
+        </p:cxnSp>
+        <p:cxnSp>
+          <p:nvCxnSpPr>
+            <p:cNvPr id="148" name="Straight Connector 147"/>
+            <p:cNvCxnSpPr/>
+            <p:nvPr/>
+          </p:nvCxnSpPr>
+          <p:spPr>
+            <a:xfrm>
+              <a:off x="6936162" y="2103656"/>
+              <a:ext cx="0" cy="228600"/>
+            </a:xfrm>
+            <a:prstGeom prst="line">
+              <a:avLst/>
+            </a:prstGeom>
+            <a:ln w="12700">
+              <a:solidFill>
+                <a:srgbClr val="B66D31"/>
+              </a:solidFill>
+            </a:ln>
+          </p:spPr>
+          <p:style>
+            <a:lnRef idx="1">
+              <a:schemeClr val="accent1"/>
+            </a:lnRef>
+            <a:fillRef idx="0">
+              <a:schemeClr val="accent1"/>
+            </a:fillRef>
+            <a:effectRef idx="0">
+              <a:schemeClr val="accent1"/>
+            </a:effectRef>
+            <a:fontRef idx="minor">
+              <a:schemeClr val="tx1"/>
+            </a:fontRef>
+          </p:style>
+        </p:cxnSp>
+        <p:cxnSp>
+          <p:nvCxnSpPr>
+            <p:cNvPr id="149" name="Straight Connector 148"/>
+            <p:cNvCxnSpPr/>
+            <p:nvPr/>
+          </p:nvCxnSpPr>
+          <p:spPr>
+            <a:xfrm>
+              <a:off x="6936420" y="2410295"/>
+              <a:ext cx="0" cy="228600"/>
+            </a:xfrm>
+            <a:prstGeom prst="line">
+              <a:avLst/>
+            </a:prstGeom>
+            <a:ln w="12700">
+              <a:solidFill>
+                <a:srgbClr val="B66D31"/>
+              </a:solidFill>
+            </a:ln>
+          </p:spPr>
+          <p:style>
+            <a:lnRef idx="1">
+              <a:schemeClr val="accent1"/>
+            </a:lnRef>
+            <a:fillRef idx="0">
+              <a:schemeClr val="accent1"/>
+            </a:fillRef>
+            <a:effectRef idx="0">
+              <a:schemeClr val="accent1"/>
+            </a:effectRef>
+            <a:fontRef idx="minor">
+              <a:schemeClr val="tx1"/>
+            </a:fontRef>
+          </p:style>
+        </p:cxnSp>
+        <p:cxnSp>
+          <p:nvCxnSpPr>
+            <p:cNvPr id="150" name="Straight Connector 149"/>
+            <p:cNvCxnSpPr/>
+            <p:nvPr/>
+          </p:nvCxnSpPr>
+          <p:spPr>
+            <a:xfrm>
+              <a:off x="6934200" y="2912745"/>
+              <a:ext cx="0" cy="228600"/>
+            </a:xfrm>
+            <a:prstGeom prst="line">
+              <a:avLst/>
+            </a:prstGeom>
+            <a:ln w="12700">
+              <a:solidFill>
+                <a:srgbClr val="B66D31"/>
+              </a:solidFill>
+            </a:ln>
+          </p:spPr>
+          <p:style>
+            <a:lnRef idx="1">
+              <a:schemeClr val="accent1"/>
+            </a:lnRef>
+            <a:fillRef idx="0">
+              <a:schemeClr val="accent1"/>
+            </a:fillRef>
+            <a:effectRef idx="0">
+              <a:schemeClr val="accent1"/>
+            </a:effectRef>
+            <a:fontRef idx="minor">
+              <a:schemeClr val="tx1"/>
+            </a:fontRef>
+          </p:style>
+        </p:cxnSp>
+        <p:sp>
+          <p:nvSpPr>
+            <p:cNvPr id="155" name="Rectangle 154"/>
+            <p:cNvSpPr/>
+            <p:nvPr/>
+          </p:nvSpPr>
+          <p:spPr>
+            <a:xfrm>
+              <a:off x="6942275" y="2012950"/>
+              <a:ext cx="206540" cy="1191458"/>
+            </a:xfrm>
+            <a:prstGeom prst="rect">
+              <a:avLst/>
+            </a:prstGeom>
+            <a:solidFill>
+              <a:schemeClr val="bg1"/>
+            </a:solidFill>
+            <a:ln>
+              <a:noFill/>
+            </a:ln>
+          </p:spPr>
+          <p:style>
+            <a:lnRef idx="2">
+              <a:schemeClr val="accent1">
+                <a:shade val="50000"/>
+              </a:schemeClr>
+            </a:lnRef>
+            <a:fillRef idx="1">
+              <a:schemeClr val="accent1"/>
+            </a:fillRef>
+            <a:effectRef idx="0">
+              <a:schemeClr val="accent1"/>
+            </a:effectRef>
+            <a:fontRef idx="minor">
+              <a:schemeClr val="lt1"/>
+            </a:fontRef>
+          </p:style>
+          <p:txBody>
+            <a:bodyPr rtlCol="0" anchor="ctr"/>
+            <a:lstStyle/>
+            <a:p>
+              <a:pPr algn="ctr"/>
+              <a:endParaRPr lang="en-US"/>
+            </a:p>
+          </p:txBody>
+        </p:sp>
+      </p:grpSp>
+    </p:spTree>
+    <p:extLst>
+      <p:ext uri="{BB962C8B-B14F-4D97-AF65-F5344CB8AC3E}">
+        <p14:creationId xmlns:p14="http://schemas.microsoft.com/office/powerpoint/2010/main" val="1997678120"/>
       </p:ext>
     </p:extLst>
   </p:cSld>

</xml_diff>

<commit_message>
Update of Report and Picture
Add Levenberg-Marquardt Algorithm in Report.
Update fp and bp data flow pictures.
</commit_message>
<xml_diff>
--- a/trunk/pic/pic.pptx
+++ b/trunk/pic/pic.pptx
@@ -296,7 +296,7 @@
             <a:fld id="{1D8BD707-D9CF-40AE-B4C6-C98DA3205C09}" type="datetimeFigureOut">
               <a:rPr lang="en-US" smtClean="0"/>
               <a:pPr/>
-              <a:t>9/2/2014</a:t>
+              <a:t>9/15/2014</a:t>
             </a:fld>
             <a:endParaRPr lang="en-US"/>
           </a:p>
@@ -463,7 +463,7 @@
             <a:fld id="{1D8BD707-D9CF-40AE-B4C6-C98DA3205C09}" type="datetimeFigureOut">
               <a:rPr lang="en-US" smtClean="0"/>
               <a:pPr/>
-              <a:t>9/2/2014</a:t>
+              <a:t>9/15/2014</a:t>
             </a:fld>
             <a:endParaRPr lang="en-US"/>
           </a:p>
@@ -640,7 +640,7 @@
             <a:fld id="{1D8BD707-D9CF-40AE-B4C6-C98DA3205C09}" type="datetimeFigureOut">
               <a:rPr lang="en-US" smtClean="0"/>
               <a:pPr/>
-              <a:t>9/2/2014</a:t>
+              <a:t>9/15/2014</a:t>
             </a:fld>
             <a:endParaRPr lang="en-US"/>
           </a:p>
@@ -807,7 +807,7 @@
             <a:fld id="{1D8BD707-D9CF-40AE-B4C6-C98DA3205C09}" type="datetimeFigureOut">
               <a:rPr lang="en-US" smtClean="0"/>
               <a:pPr/>
-              <a:t>9/2/2014</a:t>
+              <a:t>9/15/2014</a:t>
             </a:fld>
             <a:endParaRPr lang="en-US"/>
           </a:p>
@@ -1050,7 +1050,7 @@
             <a:fld id="{1D8BD707-D9CF-40AE-B4C6-C98DA3205C09}" type="datetimeFigureOut">
               <a:rPr lang="en-US" smtClean="0"/>
               <a:pPr/>
-              <a:t>9/2/2014</a:t>
+              <a:t>9/15/2014</a:t>
             </a:fld>
             <a:endParaRPr lang="en-US"/>
           </a:p>
@@ -1335,7 +1335,7 @@
             <a:fld id="{1D8BD707-D9CF-40AE-B4C6-C98DA3205C09}" type="datetimeFigureOut">
               <a:rPr lang="en-US" smtClean="0"/>
               <a:pPr/>
-              <a:t>9/2/2014</a:t>
+              <a:t>9/15/2014</a:t>
             </a:fld>
             <a:endParaRPr lang="en-US"/>
           </a:p>
@@ -1754,7 +1754,7 @@
             <a:fld id="{1D8BD707-D9CF-40AE-B4C6-C98DA3205C09}" type="datetimeFigureOut">
               <a:rPr lang="en-US" smtClean="0"/>
               <a:pPr/>
-              <a:t>9/2/2014</a:t>
+              <a:t>9/15/2014</a:t>
             </a:fld>
             <a:endParaRPr lang="en-US"/>
           </a:p>
@@ -1869,7 +1869,7 @@
             <a:fld id="{1D8BD707-D9CF-40AE-B4C6-C98DA3205C09}" type="datetimeFigureOut">
               <a:rPr lang="en-US" smtClean="0"/>
               <a:pPr/>
-              <a:t>9/2/2014</a:t>
+              <a:t>9/15/2014</a:t>
             </a:fld>
             <a:endParaRPr lang="en-US"/>
           </a:p>
@@ -1961,7 +1961,7 @@
             <a:fld id="{1D8BD707-D9CF-40AE-B4C6-C98DA3205C09}" type="datetimeFigureOut">
               <a:rPr lang="en-US" smtClean="0"/>
               <a:pPr/>
-              <a:t>9/2/2014</a:t>
+              <a:t>9/15/2014</a:t>
             </a:fld>
             <a:endParaRPr lang="en-US"/>
           </a:p>
@@ -2235,7 +2235,7 @@
             <a:fld id="{1D8BD707-D9CF-40AE-B4C6-C98DA3205C09}" type="datetimeFigureOut">
               <a:rPr lang="en-US" smtClean="0"/>
               <a:pPr/>
-              <a:t>9/2/2014</a:t>
+              <a:t>9/15/2014</a:t>
             </a:fld>
             <a:endParaRPr lang="en-US"/>
           </a:p>
@@ -2485,7 +2485,7 @@
             <a:fld id="{1D8BD707-D9CF-40AE-B4C6-C98DA3205C09}" type="datetimeFigureOut">
               <a:rPr lang="en-US" smtClean="0"/>
               <a:pPr/>
-              <a:t>9/2/2014</a:t>
+              <a:t>9/15/2014</a:t>
             </a:fld>
             <a:endParaRPr lang="en-US"/>
           </a:p>
@@ -2695,7 +2695,7 @@
             <a:fld id="{1D8BD707-D9CF-40AE-B4C6-C98DA3205C09}" type="datetimeFigureOut">
               <a:rPr lang="en-US" smtClean="0"/>
               <a:pPr/>
-              <a:t>9/2/2014</a:t>
+              <a:t>9/15/2014</a:t>
             </a:fld>
             <a:endParaRPr lang="en-US"/>
           </a:p>
@@ -17657,16 +17657,16 @@
       </p:grpSpPr>
       <p:grpSp>
         <p:nvGrpSpPr>
-          <p:cNvPr id="32" name="Group 31"/>
+          <p:cNvPr id="14" name="Group 13"/>
           <p:cNvGrpSpPr/>
           <p:nvPr/>
         </p:nvGrpSpPr>
         <p:grpSpPr>
           <a:xfrm>
             <a:off x="1667412" y="1458304"/>
-            <a:ext cx="5657752" cy="2319410"/>
+            <a:ext cx="5800188" cy="2319410"/>
             <a:chOff x="1667412" y="1458304"/>
-            <a:chExt cx="5657752" cy="2319410"/>
+            <a:chExt cx="5800188" cy="2319410"/>
           </a:xfrm>
         </p:grpSpPr>
         <p:sp>
@@ -17677,8 +17677,8 @@
           </p:nvSpPr>
           <p:spPr>
             <a:xfrm>
-              <a:off x="3006724" y="1544320"/>
-              <a:ext cx="2945612" cy="2146842"/>
+              <a:off x="2997199" y="1544320"/>
+              <a:ext cx="3088048" cy="2146842"/>
             </a:xfrm>
             <a:prstGeom prst="roundRect">
               <a:avLst/>
@@ -17723,7 +17723,7 @@
               </p:nvSpPr>
               <p:spPr>
                 <a:xfrm>
-                  <a:off x="5349879" y="3157789"/>
+                  <a:off x="5492315" y="3157789"/>
                   <a:ext cx="419100" cy="228600"/>
                 </a:xfrm>
                 <a:prstGeom prst="roundRect">
@@ -17794,7 +17794,7 @@
               </p:nvSpPr>
               <p:spPr>
                 <a:xfrm>
-                  <a:off x="5349879" y="3157789"/>
+                  <a:off x="5492315" y="3157789"/>
                   <a:ext cx="419100" cy="228600"/>
                 </a:xfrm>
                 <a:prstGeom prst="roundRect">
@@ -17986,7 +17986,7 @@
           </p:nvSpPr>
           <p:spPr>
             <a:xfrm>
-              <a:off x="4670429" y="1848584"/>
+              <a:off x="4812865" y="1848584"/>
               <a:ext cx="1098550" cy="228600"/>
             </a:xfrm>
             <a:prstGeom prst="roundRect">
@@ -18025,259 +18025,96 @@
             </a:p>
           </p:txBody>
         </p:sp>
-        <mc:AlternateContent xmlns:mc="http://schemas.openxmlformats.org/markup-compatibility/2006" xmlns:a14="http://schemas.microsoft.com/office/drawing/2010/main">
-          <mc:Choice Requires="a14">
-            <p:sp>
-              <p:nvSpPr>
-                <p:cNvPr id="4" name="Rectangle 3"/>
-                <p:cNvSpPr/>
-                <p:nvPr/>
-              </p:nvSpPr>
-              <p:spPr>
-                <a:xfrm>
-                  <a:off x="4181479" y="1848584"/>
-                  <a:ext cx="609600" cy="228600"/>
-                </a:xfrm>
-                <a:prstGeom prst="rect">
-                  <a:avLst/>
-                </a:prstGeom>
-                <a:ln w="12700"/>
-              </p:spPr>
-              <p:style>
-                <a:lnRef idx="2">
-                  <a:schemeClr val="accent1">
-                    <a:shade val="50000"/>
-                  </a:schemeClr>
-                </a:lnRef>
-                <a:fillRef idx="1">
-                  <a:schemeClr val="accent1"/>
-                </a:fillRef>
-                <a:effectRef idx="0">
-                  <a:schemeClr val="accent1"/>
-                </a:effectRef>
-                <a:fontRef idx="minor">
-                  <a:schemeClr val="lt1"/>
-                </a:fontRef>
-              </p:style>
-              <p:txBody>
-                <a:bodyPr rtlCol="0" anchor="ctr"/>
-                <a:lstStyle/>
-                <a:p>
-                  <a:pPr algn="ctr"/>
-                  <a14:m>
-                    <m:oMathPara xmlns:m="http://schemas.openxmlformats.org/officeDocument/2006/math">
-                      <m:oMathParaPr>
-                        <m:jc m:val="centerGroup"/>
-                      </m:oMathParaPr>
-                      <m:oMath xmlns:m="http://schemas.openxmlformats.org/officeDocument/2006/math">
-                        <m:r>
-                          <a:rPr lang="en-US" sz="1600" b="0" i="1" smtClean="0">
-                            <a:latin typeface="Cambria Math"/>
-                          </a:rPr>
-                          <m:t>𝑓</m:t>
-                        </m:r>
-                        <m:d>
-                          <m:dPr>
-                            <m:ctrlPr>
-                              <a:rPr lang="en-US" sz="1600" b="0" i="1" smtClean="0">
-                                <a:latin typeface="Cambria Math"/>
-                              </a:rPr>
-                            </m:ctrlPr>
-                          </m:dPr>
-                          <m:e>
-                            <m:r>
-                              <a:rPr lang="en-US" sz="1600" b="0" i="1" smtClean="0">
-                                <a:latin typeface="Cambria Math"/>
-                                <a:ea typeface="Cambria Math"/>
-                              </a:rPr>
-                              <m:t>∙</m:t>
-                            </m:r>
-                          </m:e>
-                        </m:d>
-                      </m:oMath>
-                    </m:oMathPara>
-                  </a14:m>
-                  <a:endParaRPr lang="en-US" sz="1600" dirty="0"/>
-                </a:p>
-              </p:txBody>
-            </p:sp>
-          </mc:Choice>
-          <mc:Fallback xmlns="">
-            <p:sp>
-              <p:nvSpPr>
-                <p:cNvPr id="4" name="Rectangle 3"/>
-                <p:cNvSpPr>
-                  <a:spLocks noRot="1" noChangeAspect="1" noMove="1" noResize="1" noEditPoints="1" noAdjustHandles="1" noChangeArrowheads="1" noChangeShapeType="1" noTextEdit="1"/>
-                </p:cNvSpPr>
-                <p:nvPr/>
-              </p:nvSpPr>
-              <p:spPr>
-                <a:xfrm>
-                  <a:off x="4181479" y="1848584"/>
-                  <a:ext cx="609600" cy="228600"/>
-                </a:xfrm>
-                <a:prstGeom prst="rect">
-                  <a:avLst/>
-                </a:prstGeom>
-                <a:blipFill rotWithShape="1">
-                  <a:blip r:embed="rId4"/>
-                  <a:stretch>
-                    <a:fillRect b="-32500"/>
-                  </a:stretch>
-                </a:blipFill>
-                <a:ln w="12700"/>
-              </p:spPr>
-              <p:txBody>
-                <a:bodyPr/>
-                <a:lstStyle/>
-                <a:p>
-                  <a:r>
-                    <a:rPr lang="en-US">
-                      <a:noFill/>
-                    </a:rPr>
-                    <a:t> </a:t>
-                  </a:r>
-                </a:p>
-              </p:txBody>
-            </p:sp>
-          </mc:Fallback>
-        </mc:AlternateContent>
-        <mc:AlternateContent xmlns:mc="http://schemas.openxmlformats.org/markup-compatibility/2006" xmlns:a14="http://schemas.microsoft.com/office/drawing/2010/main">
-          <mc:Choice Requires="a14">
-            <p:sp>
-              <p:nvSpPr>
-                <p:cNvPr id="5" name="Rectangle 4"/>
-                <p:cNvSpPr/>
-                <p:nvPr/>
-              </p:nvSpPr>
-              <p:spPr>
-                <a:xfrm>
-                  <a:off x="4181479" y="3157789"/>
-                  <a:ext cx="609600" cy="228600"/>
-                </a:xfrm>
-                <a:prstGeom prst="rect">
-                  <a:avLst/>
-                </a:prstGeom>
-                <a:ln w="12700"/>
-              </p:spPr>
-              <p:style>
-                <a:lnRef idx="2">
-                  <a:schemeClr val="accent6">
-                    <a:shade val="50000"/>
-                  </a:schemeClr>
-                </a:lnRef>
-                <a:fillRef idx="1">
-                  <a:schemeClr val="accent6"/>
-                </a:fillRef>
-                <a:effectRef idx="0">
-                  <a:schemeClr val="accent6"/>
-                </a:effectRef>
-                <a:fontRef idx="minor">
-                  <a:schemeClr val="lt1"/>
-                </a:fontRef>
-              </p:style>
-              <p:txBody>
-                <a:bodyPr rtlCol="0" anchor="ctr"/>
-                <a:lstStyle/>
-                <a:p>
-                  <a:pPr algn="ctr"/>
-                  <a14:m>
-                    <m:oMathPara xmlns:m="http://schemas.openxmlformats.org/officeDocument/2006/math">
-                      <m:oMathParaPr>
-                        <m:jc m:val="centerGroup"/>
-                      </m:oMathParaPr>
-                      <m:oMath xmlns:m="http://schemas.openxmlformats.org/officeDocument/2006/math">
-                        <m:sSup>
-                          <m:sSupPr>
-                            <m:ctrlPr>
-                              <a:rPr lang="en-US" sz="1600" b="0" i="1" smtClean="0">
-                                <a:latin typeface="Cambria Math"/>
-                              </a:rPr>
-                            </m:ctrlPr>
-                          </m:sSupPr>
-                          <m:e>
-                            <m:r>
-                              <a:rPr lang="en-US" sz="1600" b="0" i="1" smtClean="0">
-                                <a:latin typeface="Cambria Math"/>
-                              </a:rPr>
-                              <m:t>𝑓</m:t>
-                            </m:r>
-                          </m:e>
-                          <m:sup>
-                            <m:r>
-                              <a:rPr lang="en-US" sz="1600" b="0" i="1" smtClean="0">
-                                <a:latin typeface="Cambria Math"/>
-                              </a:rPr>
-                              <m:t>′</m:t>
-                            </m:r>
-                          </m:sup>
-                        </m:sSup>
-                        <m:d>
-                          <m:dPr>
-                            <m:ctrlPr>
-                              <a:rPr lang="en-US" sz="1600" b="0" i="1" smtClean="0">
-                                <a:latin typeface="Cambria Math"/>
-                              </a:rPr>
-                            </m:ctrlPr>
-                          </m:dPr>
-                          <m:e>
-                            <m:r>
-                              <a:rPr lang="en-US" sz="1600" b="0" i="1" smtClean="0">
-                                <a:latin typeface="Cambria Math"/>
-                                <a:ea typeface="Cambria Math"/>
-                              </a:rPr>
-                              <m:t>∙</m:t>
-                            </m:r>
-                          </m:e>
-                        </m:d>
-                      </m:oMath>
-                    </m:oMathPara>
-                  </a14:m>
-                  <a:endParaRPr lang="en-US" sz="1600" dirty="0"/>
-                </a:p>
-              </p:txBody>
-            </p:sp>
-          </mc:Choice>
-          <mc:Fallback xmlns="">
-            <p:sp>
-              <p:nvSpPr>
-                <p:cNvPr id="5" name="Rectangle 4"/>
-                <p:cNvSpPr>
-                  <a:spLocks noRot="1" noChangeAspect="1" noMove="1" noResize="1" noEditPoints="1" noAdjustHandles="1" noChangeArrowheads="1" noChangeShapeType="1" noTextEdit="1"/>
-                </p:cNvSpPr>
-                <p:nvPr/>
-              </p:nvSpPr>
-              <p:spPr>
-                <a:xfrm>
-                  <a:off x="4181479" y="3157789"/>
-                  <a:ext cx="609600" cy="228600"/>
-                </a:xfrm>
-                <a:prstGeom prst="rect">
-                  <a:avLst/>
-                </a:prstGeom>
-                <a:blipFill rotWithShape="1">
-                  <a:blip r:embed="rId5"/>
-                  <a:stretch>
-                    <a:fillRect l="-980" b="-32500"/>
-                  </a:stretch>
-                </a:blipFill>
-                <a:ln w="12700"/>
-              </p:spPr>
-              <p:txBody>
-                <a:bodyPr/>
-                <a:lstStyle/>
-                <a:p>
-                  <a:r>
-                    <a:rPr lang="en-US">
-                      <a:noFill/>
-                    </a:rPr>
-                    <a:t> </a:t>
-                  </a:r>
-                </a:p>
-              </p:txBody>
-            </p:sp>
-          </mc:Fallback>
-        </mc:AlternateContent>
+        <p:sp>
+          <p:nvSpPr>
+            <p:cNvPr id="4" name="Rectangle 3"/>
+            <p:cNvSpPr/>
+            <p:nvPr/>
+          </p:nvSpPr>
+          <p:spPr>
+            <a:xfrm>
+              <a:off x="4181479" y="1849120"/>
+              <a:ext cx="752036" cy="228064"/>
+            </a:xfrm>
+            <a:prstGeom prst="rect">
+              <a:avLst/>
+            </a:prstGeom>
+            <a:ln w="12700"/>
+          </p:spPr>
+          <p:style>
+            <a:lnRef idx="2">
+              <a:schemeClr val="accent1">
+                <a:shade val="50000"/>
+              </a:schemeClr>
+            </a:lnRef>
+            <a:fillRef idx="1">
+              <a:schemeClr val="accent1"/>
+            </a:fillRef>
+            <a:effectRef idx="0">
+              <a:schemeClr val="accent1"/>
+            </a:effectRef>
+            <a:fontRef idx="minor">
+              <a:schemeClr val="lt1"/>
+            </a:fontRef>
+          </p:style>
+          <p:txBody>
+            <a:bodyPr rtlCol="0" anchor="ctr"/>
+            <a:lstStyle/>
+            <a:p>
+              <a:pPr algn="ctr"/>
+              <a:r>
+                <a:rPr lang="en-US" sz="1600" dirty="0" smtClean="0"/>
+                <a:t>Value</a:t>
+              </a:r>
+              <a:endParaRPr lang="en-US" sz="1600" dirty="0"/>
+            </a:p>
+          </p:txBody>
+        </p:sp>
+        <p:sp>
+          <p:nvSpPr>
+            <p:cNvPr id="5" name="Rectangle 4"/>
+            <p:cNvSpPr/>
+            <p:nvPr/>
+          </p:nvSpPr>
+          <p:spPr>
+            <a:xfrm>
+              <a:off x="4181479" y="3162299"/>
+              <a:ext cx="752036" cy="224089"/>
+            </a:xfrm>
+            <a:prstGeom prst="rect">
+              <a:avLst/>
+            </a:prstGeom>
+            <a:ln w="12700"/>
+          </p:spPr>
+          <p:style>
+            <a:lnRef idx="2">
+              <a:schemeClr val="accent6">
+                <a:shade val="50000"/>
+              </a:schemeClr>
+            </a:lnRef>
+            <a:fillRef idx="1">
+              <a:schemeClr val="accent6"/>
+            </a:fillRef>
+            <a:effectRef idx="0">
+              <a:schemeClr val="accent6"/>
+            </a:effectRef>
+            <a:fontRef idx="minor">
+              <a:schemeClr val="lt1"/>
+            </a:fontRef>
+          </p:style>
+          <p:txBody>
+            <a:bodyPr rtlCol="0" anchor="ctr"/>
+            <a:lstStyle/>
+            <a:p>
+              <a:pPr algn="ctr"/>
+              <a:r>
+                <a:rPr lang="en-US" sz="1600" dirty="0" smtClean="0"/>
+                <a:t>Value</a:t>
+              </a:r>
+              <a:endParaRPr lang="en-US" sz="1600" dirty="0"/>
+            </a:p>
+          </p:txBody>
+        </p:sp>
         <p:cxnSp>
           <p:nvCxnSpPr>
             <p:cNvPr id="8" name="Straight Arrow Connector 7"/>
@@ -18394,13 +18231,12 @@
             <p:cNvPr id="87" name="Straight Arrow Connector 86"/>
             <p:cNvCxnSpPr>
               <a:stCxn id="139" idx="1"/>
-              <a:endCxn id="101" idx="3"/>
             </p:cNvCxnSpPr>
             <p:nvPr/>
           </p:nvCxnSpPr>
           <p:spPr>
             <a:xfrm flipH="1">
-              <a:off x="5768979" y="2770412"/>
+              <a:off x="5911415" y="2770412"/>
               <a:ext cx="366715" cy="501677"/>
             </a:xfrm>
             <a:prstGeom prst="straightConnector1">
@@ -18431,13 +18267,12 @@
             <p:cNvPr id="90" name="Straight Arrow Connector 89"/>
             <p:cNvCxnSpPr>
               <a:stCxn id="138" idx="1"/>
-              <a:endCxn id="101" idx="3"/>
             </p:cNvCxnSpPr>
             <p:nvPr/>
           </p:nvCxnSpPr>
           <p:spPr>
             <a:xfrm flipH="1">
-              <a:off x="5768979" y="3271837"/>
+              <a:off x="5911415" y="3271837"/>
               <a:ext cx="366715" cy="252"/>
             </a:xfrm>
             <a:prstGeom prst="straightConnector1">
@@ -18468,13 +18303,12 @@
             <p:cNvPr id="93" name="Straight Arrow Connector 92"/>
             <p:cNvCxnSpPr>
               <a:stCxn id="136" idx="1"/>
-              <a:endCxn id="101" idx="3"/>
             </p:cNvCxnSpPr>
             <p:nvPr/>
           </p:nvCxnSpPr>
           <p:spPr>
             <a:xfrm flipH="1" flipV="1">
-              <a:off x="5768979" y="3272089"/>
+              <a:off x="5911415" y="3272089"/>
               <a:ext cx="366715" cy="304773"/>
             </a:xfrm>
             <a:prstGeom prst="straightConnector1">
@@ -18553,7 +18387,7 @@
           </p:nvSpPr>
           <p:spPr>
             <a:xfrm>
-              <a:off x="4791079" y="3157789"/>
+              <a:off x="4933515" y="3157789"/>
               <a:ext cx="679450" cy="228600"/>
             </a:xfrm>
             <a:prstGeom prst="rect">
@@ -18598,7 +18432,7 @@
           </p:nvSpPr>
           <p:spPr>
             <a:xfrm>
-              <a:off x="3807037" y="2077184"/>
+              <a:off x="3868730" y="2077184"/>
               <a:ext cx="1344984" cy="338554"/>
             </a:xfrm>
             <a:prstGeom prst="rect">
@@ -18628,7 +18462,7 @@
           </p:nvCxnSpPr>
           <p:spPr>
             <a:xfrm>
-              <a:off x="3656740" y="2133600"/>
+              <a:off x="3718433" y="2133600"/>
               <a:ext cx="1645579" cy="0"/>
             </a:xfrm>
             <a:prstGeom prst="straightConnector1">
@@ -18662,7 +18496,7 @@
           </p:nvSpPr>
           <p:spPr>
             <a:xfrm>
-              <a:off x="3656740" y="2805877"/>
+              <a:off x="3718433" y="2805877"/>
               <a:ext cx="1645579" cy="338554"/>
             </a:xfrm>
             <a:prstGeom prst="rect">
@@ -18692,7 +18526,7 @@
           </p:nvCxnSpPr>
           <p:spPr>
             <a:xfrm flipH="1">
-              <a:off x="3656740" y="3098800"/>
+              <a:off x="3718433" y="3105150"/>
               <a:ext cx="1645579" cy="0"/>
             </a:xfrm>
             <a:prstGeom prst="straightConnector1">
@@ -18867,7 +18701,7 @@
           </p:nvSpPr>
           <p:spPr>
             <a:xfrm>
-              <a:off x="6135694" y="3462562"/>
+              <a:off x="6278130" y="3462562"/>
               <a:ext cx="1179506" cy="228600"/>
             </a:xfrm>
             <a:prstGeom prst="roundRect">
@@ -18913,7 +18747,7 @@
           </p:nvSpPr>
           <p:spPr>
             <a:xfrm>
-              <a:off x="6135694" y="3157537"/>
+              <a:off x="6278130" y="3157537"/>
               <a:ext cx="1179506" cy="228600"/>
             </a:xfrm>
             <a:prstGeom prst="roundRect">
@@ -18959,7 +18793,7 @@
           </p:nvSpPr>
           <p:spPr>
             <a:xfrm>
-              <a:off x="6135694" y="2656112"/>
+              <a:off x="6278130" y="2656112"/>
               <a:ext cx="1179506" cy="228600"/>
             </a:xfrm>
             <a:prstGeom prst="roundRect">
@@ -19116,7 +18950,7 @@
           </p:nvCxnSpPr>
           <p:spPr>
             <a:xfrm>
-              <a:off x="7131050" y="2656112"/>
+              <a:off x="7273486" y="2656112"/>
               <a:ext cx="0" cy="228600"/>
             </a:xfrm>
             <a:prstGeom prst="line">
@@ -19151,7 +18985,7 @@
           </p:nvCxnSpPr>
           <p:spPr>
             <a:xfrm>
-              <a:off x="7131050" y="3162300"/>
+              <a:off x="7273486" y="3162300"/>
               <a:ext cx="0" cy="228600"/>
             </a:xfrm>
             <a:prstGeom prst="line">
@@ -19186,7 +19020,7 @@
           </p:nvCxnSpPr>
           <p:spPr>
             <a:xfrm>
-              <a:off x="7131050" y="3465201"/>
+              <a:off x="7273486" y="3465201"/>
               <a:ext cx="0" cy="228600"/>
             </a:xfrm>
             <a:prstGeom prst="line">
@@ -19223,7 +19057,7 @@
               </p:nvSpPr>
               <p:spPr>
                 <a:xfrm>
-                  <a:off x="6135694" y="2351306"/>
+                  <a:off x="6278130" y="2351306"/>
                   <a:ext cx="419100" cy="228600"/>
                 </a:xfrm>
                 <a:prstGeom prst="roundRect">
@@ -19288,7 +19122,7 @@
               </p:nvSpPr>
               <p:spPr>
                 <a:xfrm>
-                  <a:off x="6135694" y="2351306"/>
+                  <a:off x="6278130" y="2351306"/>
                   <a:ext cx="419100" cy="228600"/>
                 </a:xfrm>
                 <a:prstGeom prst="roundRect">
@@ -19297,7 +19131,7 @@
                   </a:avLst>
                 </a:prstGeom>
                 <a:blipFill rotWithShape="1">
-                  <a:blip r:embed="rId6"/>
+                  <a:blip r:embed="rId4"/>
                   <a:stretch>
                     <a:fillRect b="-7692"/>
                   </a:stretch>
@@ -19327,7 +19161,7 @@
           </p:nvSpPr>
           <p:spPr>
             <a:xfrm>
-              <a:off x="6451600" y="2351306"/>
+              <a:off x="6594036" y="2351306"/>
               <a:ext cx="679450" cy="228600"/>
             </a:xfrm>
             <a:prstGeom prst="rect">
@@ -19374,7 +19208,7 @@
               </p:nvSpPr>
               <p:spPr>
                 <a:xfrm>
-                  <a:off x="6135694" y="1849120"/>
+                  <a:off x="6278130" y="1849120"/>
                   <a:ext cx="419100" cy="228600"/>
                 </a:xfrm>
                 <a:prstGeom prst="roundRect">
@@ -19439,7 +19273,7 @@
               </p:nvSpPr>
               <p:spPr>
                 <a:xfrm>
-                  <a:off x="6135694" y="1849120"/>
+                  <a:off x="6278130" y="1849120"/>
                   <a:ext cx="419100" cy="228600"/>
                 </a:xfrm>
                 <a:prstGeom prst="roundRect">
@@ -19448,7 +19282,7 @@
                   </a:avLst>
                 </a:prstGeom>
                 <a:blipFill rotWithShape="1">
-                  <a:blip r:embed="rId7"/>
+                  <a:blip r:embed="rId5"/>
                   <a:stretch>
                     <a:fillRect b="-7500"/>
                   </a:stretch>
@@ -19478,7 +19312,7 @@
           </p:nvSpPr>
           <p:spPr>
             <a:xfrm>
-              <a:off x="6451600" y="1849120"/>
+              <a:off x="6594036" y="1849120"/>
               <a:ext cx="679450" cy="228600"/>
             </a:xfrm>
             <a:prstGeom prst="rect">
@@ -19525,7 +19359,7 @@
               </p:nvSpPr>
               <p:spPr>
                 <a:xfrm>
-                  <a:off x="6135694" y="1544320"/>
+                  <a:off x="6278130" y="1544320"/>
                   <a:ext cx="419100" cy="228600"/>
                 </a:xfrm>
                 <a:prstGeom prst="roundRect">
@@ -19590,7 +19424,7 @@
               </p:nvSpPr>
               <p:spPr>
                 <a:xfrm>
-                  <a:off x="6135694" y="1544320"/>
+                  <a:off x="6278130" y="1544320"/>
                   <a:ext cx="419100" cy="228600"/>
                 </a:xfrm>
                 <a:prstGeom prst="roundRect">
@@ -19599,7 +19433,7 @@
                   </a:avLst>
                 </a:prstGeom>
                 <a:blipFill rotWithShape="1">
-                  <a:blip r:embed="rId7"/>
+                  <a:blip r:embed="rId5"/>
                   <a:stretch>
                     <a:fillRect b="-7500"/>
                   </a:stretch>
@@ -19629,7 +19463,7 @@
           </p:nvSpPr>
           <p:spPr>
             <a:xfrm>
-              <a:off x="6451600" y="1544320"/>
+              <a:off x="6594036" y="1544320"/>
               <a:ext cx="679450" cy="228600"/>
             </a:xfrm>
             <a:prstGeom prst="rect">
@@ -19677,7 +19511,7 @@
           </p:nvCxnSpPr>
           <p:spPr>
             <a:xfrm>
-              <a:off x="5768979" y="1962884"/>
+              <a:off x="5911415" y="1962884"/>
               <a:ext cx="366715" cy="502722"/>
             </a:xfrm>
             <a:prstGeom prst="straightConnector1">
@@ -19714,7 +19548,7 @@
           </p:nvCxnSpPr>
           <p:spPr>
             <a:xfrm>
-              <a:off x="5768979" y="1962884"/>
+              <a:off x="5911415" y="1962884"/>
               <a:ext cx="366715" cy="536"/>
             </a:xfrm>
             <a:prstGeom prst="straightConnector1">
@@ -19751,7 +19585,7 @@
           </p:nvCxnSpPr>
           <p:spPr>
             <a:xfrm flipV="1">
-              <a:off x="5768979" y="1658620"/>
+              <a:off x="5911415" y="1658620"/>
               <a:ext cx="366715" cy="304264"/>
             </a:xfrm>
             <a:prstGeom prst="straightConnector1">
@@ -19785,7 +19619,7 @@
           </p:nvSpPr>
           <p:spPr>
             <a:xfrm>
-              <a:off x="7137400" y="2586256"/>
+              <a:off x="7279836" y="2586256"/>
               <a:ext cx="187764" cy="1191458"/>
             </a:xfrm>
             <a:prstGeom prst="rect">
@@ -19913,7 +19747,7 @@
                   </a:avLst>
                 </a:prstGeom>
                 <a:blipFill rotWithShape="1">
-                  <a:blip r:embed="rId8"/>
+                  <a:blip r:embed="rId6"/>
                   <a:stretch>
                     <a:fillRect b="-7692"/>
                   </a:stretch>
@@ -20070,7 +19904,7 @@
                   </a:avLst>
                 </a:prstGeom>
                 <a:blipFill rotWithShape="1">
-                  <a:blip r:embed="rId9"/>
+                  <a:blip r:embed="rId7"/>
                   <a:stretch>
                     <a:fillRect b="-7692"/>
                   </a:stretch>
@@ -20227,7 +20061,7 @@
                   </a:avLst>
                 </a:prstGeom>
                 <a:blipFill rotWithShape="1">
-                  <a:blip r:embed="rId10"/>
+                  <a:blip r:embed="rId8"/>
                   <a:stretch>
                     <a:fillRect b="-5000"/>
                   </a:stretch>
@@ -20302,7 +20136,7 @@
           </p:nvSpPr>
           <p:spPr>
             <a:xfrm>
-              <a:off x="6484603" y="2086147"/>
+              <a:off x="6627039" y="2086147"/>
               <a:ext cx="430887" cy="243310"/>
             </a:xfrm>
             <a:prstGeom prst="rect">
@@ -20521,7 +20355,7 @@
           </p:nvSpPr>
           <p:spPr>
             <a:xfrm>
-              <a:off x="4161173" y="2448464"/>
+              <a:off x="4222866" y="2448464"/>
               <a:ext cx="636713" cy="338554"/>
             </a:xfrm>
             <a:prstGeom prst="rect">
@@ -20582,7 +20416,7 @@
           </p:nvSpPr>
           <p:spPr>
             <a:xfrm>
-              <a:off x="6484602" y="2901121"/>
+              <a:off x="6627038" y="2901121"/>
               <a:ext cx="430887" cy="243310"/>
             </a:xfrm>
             <a:prstGeom prst="rect">
@@ -20638,7 +20472,7 @@
       </p:grpSpPr>
       <p:pic>
         <p:nvPicPr>
-          <p:cNvPr id="2" name="Picture 2"/>
+          <p:cNvPr id="1026" name="Picture 2"/>
           <p:cNvPicPr>
             <a:picLocks noChangeAspect="1" noChangeArrowheads="1"/>
           </p:cNvPicPr>
@@ -20659,8 +20493,8 @@
         </p:blipFill>
         <p:spPr bwMode="auto">
           <a:xfrm>
-            <a:off x="3343275" y="2738438"/>
-            <a:ext cx="2457450" cy="1381125"/>
+            <a:off x="3195638" y="2738438"/>
+            <a:ext cx="2752725" cy="1381125"/>
           </a:xfrm>
           <a:prstGeom prst="rect">
             <a:avLst/>
@@ -20669,7 +20503,6 @@
           <a:ln>
             <a:noFill/>
           </a:ln>
-          <a:effectLst/>
           <a:extLst>
             <a:ext uri="{909E8E84-426E-40DD-AFC4-6F175D3DCCD1}">
               <a14:hiddenFill xmlns:a14="http://schemas.microsoft.com/office/drawing/2010/main">
@@ -20687,15 +20520,6 @@
                 <a:headEnd/>
                 <a:tailEnd/>
               </a14:hiddenLine>
-            </a:ext>
-            <a:ext uri="{AF507438-7753-43E0-B8FC-AC1667EBCBE1}">
-              <a14:hiddenEffects xmlns:a14="http://schemas.microsoft.com/office/drawing/2010/main">
-                <a:effectLst>
-                  <a:outerShdw dist="35921" dir="2700000" algn="ctr" rotWithShape="0">
-                    <a:schemeClr val="bg2"/>
-                  </a:outerShdw>
-                </a:effectLst>
-              </a14:hiddenEffects>
             </a:ext>
           </a:extLst>
         </p:spPr>

</xml_diff>

<commit_message>
Add Save and Load Method
Add save and load method and demo.
All the other file commited because of EOL problem.
</commit_message>
<xml_diff>
--- a/trunk/pic/pic.pptx
+++ b/trunk/pic/pic.pptx
@@ -297,7 +297,7 @@
             <a:fld id="{1D8BD707-D9CF-40AE-B4C6-C98DA3205C09}" type="datetimeFigureOut">
               <a:rPr lang="en-US" smtClean="0"/>
               <a:pPr/>
-              <a:t>12/1/2014</a:t>
+              <a:t>12/3/2014</a:t>
             </a:fld>
             <a:endParaRPr lang="en-US"/>
           </a:p>
@@ -464,7 +464,7 @@
             <a:fld id="{1D8BD707-D9CF-40AE-B4C6-C98DA3205C09}" type="datetimeFigureOut">
               <a:rPr lang="en-US" smtClean="0"/>
               <a:pPr/>
-              <a:t>12/1/2014</a:t>
+              <a:t>12/3/2014</a:t>
             </a:fld>
             <a:endParaRPr lang="en-US"/>
           </a:p>
@@ -641,7 +641,7 @@
             <a:fld id="{1D8BD707-D9CF-40AE-B4C6-C98DA3205C09}" type="datetimeFigureOut">
               <a:rPr lang="en-US" smtClean="0"/>
               <a:pPr/>
-              <a:t>12/1/2014</a:t>
+              <a:t>12/3/2014</a:t>
             </a:fld>
             <a:endParaRPr lang="en-US"/>
           </a:p>
@@ -808,7 +808,7 @@
             <a:fld id="{1D8BD707-D9CF-40AE-B4C6-C98DA3205C09}" type="datetimeFigureOut">
               <a:rPr lang="en-US" smtClean="0"/>
               <a:pPr/>
-              <a:t>12/1/2014</a:t>
+              <a:t>12/3/2014</a:t>
             </a:fld>
             <a:endParaRPr lang="en-US"/>
           </a:p>
@@ -1051,7 +1051,7 @@
             <a:fld id="{1D8BD707-D9CF-40AE-B4C6-C98DA3205C09}" type="datetimeFigureOut">
               <a:rPr lang="en-US" smtClean="0"/>
               <a:pPr/>
-              <a:t>12/1/2014</a:t>
+              <a:t>12/3/2014</a:t>
             </a:fld>
             <a:endParaRPr lang="en-US"/>
           </a:p>
@@ -1336,7 +1336,7 @@
             <a:fld id="{1D8BD707-D9CF-40AE-B4C6-C98DA3205C09}" type="datetimeFigureOut">
               <a:rPr lang="en-US" smtClean="0"/>
               <a:pPr/>
-              <a:t>12/1/2014</a:t>
+              <a:t>12/3/2014</a:t>
             </a:fld>
             <a:endParaRPr lang="en-US"/>
           </a:p>
@@ -1755,7 +1755,7 @@
             <a:fld id="{1D8BD707-D9CF-40AE-B4C6-C98DA3205C09}" type="datetimeFigureOut">
               <a:rPr lang="en-US" smtClean="0"/>
               <a:pPr/>
-              <a:t>12/1/2014</a:t>
+              <a:t>12/3/2014</a:t>
             </a:fld>
             <a:endParaRPr lang="en-US"/>
           </a:p>
@@ -1870,7 +1870,7 @@
             <a:fld id="{1D8BD707-D9CF-40AE-B4C6-C98DA3205C09}" type="datetimeFigureOut">
               <a:rPr lang="en-US" smtClean="0"/>
               <a:pPr/>
-              <a:t>12/1/2014</a:t>
+              <a:t>12/3/2014</a:t>
             </a:fld>
             <a:endParaRPr lang="en-US"/>
           </a:p>
@@ -1962,7 +1962,7 @@
             <a:fld id="{1D8BD707-D9CF-40AE-B4C6-C98DA3205C09}" type="datetimeFigureOut">
               <a:rPr lang="en-US" smtClean="0"/>
               <a:pPr/>
-              <a:t>12/1/2014</a:t>
+              <a:t>12/3/2014</a:t>
             </a:fld>
             <a:endParaRPr lang="en-US"/>
           </a:p>
@@ -2236,7 +2236,7 @@
             <a:fld id="{1D8BD707-D9CF-40AE-B4C6-C98DA3205C09}" type="datetimeFigureOut">
               <a:rPr lang="en-US" smtClean="0"/>
               <a:pPr/>
-              <a:t>12/1/2014</a:t>
+              <a:t>12/3/2014</a:t>
             </a:fld>
             <a:endParaRPr lang="en-US"/>
           </a:p>
@@ -2486,7 +2486,7 @@
             <a:fld id="{1D8BD707-D9CF-40AE-B4C6-C98DA3205C09}" type="datetimeFigureOut">
               <a:rPr lang="en-US" smtClean="0"/>
               <a:pPr/>
-              <a:t>12/1/2014</a:t>
+              <a:t>12/3/2014</a:t>
             </a:fld>
             <a:endParaRPr lang="en-US"/>
           </a:p>
@@ -2696,7 +2696,7 @@
             <a:fld id="{1D8BD707-D9CF-40AE-B4C6-C98DA3205C09}" type="datetimeFigureOut">
               <a:rPr lang="en-US" smtClean="0"/>
               <a:pPr/>
-              <a:t>12/1/2014</a:t>
+              <a:t>12/3/2014</a:t>
             </a:fld>
             <a:endParaRPr lang="en-US"/>
           </a:p>
@@ -22368,16 +22368,16 @@
       </p:grpSpPr>
       <p:grpSp>
         <p:nvGrpSpPr>
-          <p:cNvPr id="3" name="Group 2"/>
+          <p:cNvPr id="10" name="Group 9"/>
           <p:cNvGrpSpPr/>
           <p:nvPr/>
         </p:nvGrpSpPr>
         <p:grpSpPr>
           <a:xfrm>
             <a:off x="436636" y="-228600"/>
-            <a:ext cx="8116813" cy="7363346"/>
+            <a:ext cx="8050139" cy="7363346"/>
             <a:chOff x="436636" y="-228600"/>
-            <a:chExt cx="8116813" cy="7363346"/>
+            <a:chExt cx="8050139" cy="7363346"/>
           </a:xfrm>
         </p:grpSpPr>
         <p:pic>
@@ -22552,8 +22552,8 @@
           </p:nvSpPr>
           <p:spPr>
             <a:xfrm>
-              <a:off x="7441292" y="6061027"/>
-              <a:ext cx="1001941" cy="1015663"/>
+              <a:off x="7610475" y="5895796"/>
+              <a:ext cx="864508" cy="1200329"/>
             </a:xfrm>
             <a:prstGeom prst="rect">
               <a:avLst/>
@@ -22561,45 +22561,54 @@
             <a:noFill/>
           </p:spPr>
           <p:txBody>
-            <a:bodyPr wrap="none" rtlCol="0">
+            <a:bodyPr wrap="square" rtlCol="0">
               <a:spAutoFit/>
             </a:bodyPr>
             <a:lstStyle/>
             <a:p>
               <a:r>
-                <a:rPr lang="en-US" sz="1500" dirty="0" smtClean="0"/>
+                <a:rPr lang="en-US" sz="1200" dirty="0" smtClean="0"/>
+                <a:t>topology</a:t>
+              </a:r>
+              <a:br>
+                <a:rPr lang="en-US" sz="1200" dirty="0" smtClean="0"/>
+              </a:br>
+              <a:r>
+                <a:rPr lang="en-US" sz="1200" dirty="0" smtClean="0"/>
+                <a:t>module</a:t>
+              </a:r>
+              <a:r>
+                <a:rPr lang="en-US" sz="1200" dirty="0" smtClean="0"/>
+                <a:t>:</a:t>
+              </a:r>
+            </a:p>
+            <a:p>
+              <a:r>
+                <a:rPr lang="en-US" sz="1200" i="1" dirty="0" smtClean="0"/>
                 <a:t>scalable</a:t>
               </a:r>
               <a:br>
-                <a:rPr lang="en-US" sz="1500" dirty="0" smtClean="0"/>
+                <a:rPr lang="en-US" sz="1200" i="1" dirty="0" smtClean="0"/>
               </a:br>
               <a:r>
-                <a:rPr lang="en-US" sz="1500" dirty="0" smtClean="0"/>
-                <a:t>for</a:t>
-              </a:r>
-              <a:r>
-                <a:rPr lang="en-US" sz="1500" dirty="0"/>
-                <a:t> </a:t>
-              </a:r>
-              <a:r>
-                <a:rPr lang="en-US" sz="1500" dirty="0" smtClean="0"/>
-                <a:t>other</a:t>
+                <a:rPr lang="en-US" sz="1200" i="1" dirty="0" smtClean="0"/>
+                <a:t>for other</a:t>
               </a:r>
               <a:br>
-                <a:rPr lang="en-US" sz="1500" dirty="0" smtClean="0"/>
+                <a:rPr lang="en-US" sz="1200" i="1" dirty="0" smtClean="0"/>
               </a:br>
               <a:r>
-                <a:rPr lang="en-US" sz="1500" dirty="0" smtClean="0"/>
+                <a:rPr lang="en-US" sz="1200" i="1" dirty="0" smtClean="0"/>
                 <a:t>network</a:t>
               </a:r>
               <a:br>
-                <a:rPr lang="en-US" sz="1500" dirty="0" smtClean="0"/>
+                <a:rPr lang="en-US" sz="1200" i="1" dirty="0" smtClean="0"/>
               </a:br>
               <a:r>
-                <a:rPr lang="en-US" sz="1500" dirty="0" smtClean="0"/>
+                <a:rPr lang="en-US" sz="1200" i="1" dirty="0" smtClean="0"/>
                 <a:t>topologies</a:t>
               </a:r>
-              <a:endParaRPr lang="en-US" sz="1500" dirty="0"/>
+              <a:endParaRPr lang="en-US" sz="1200" i="1" dirty="0"/>
             </a:p>
           </p:txBody>
         </p:sp>
@@ -22661,8 +22670,8 @@
           </p:nvSpPr>
           <p:spPr>
             <a:xfrm>
-              <a:off x="7367510" y="62650"/>
-              <a:ext cx="1185939" cy="1246495"/>
+              <a:off x="7472285" y="104775"/>
+              <a:ext cx="1014490" cy="1384995"/>
             </a:xfrm>
             <a:prstGeom prst="rect">
               <a:avLst/>
@@ -22676,32 +22685,50 @@
             <a:lstStyle/>
             <a:p>
               <a:r>
-                <a:rPr lang="en-US" sz="1500" dirty="0" smtClean="0"/>
+                <a:rPr lang="en-US" sz="1200" dirty="0"/>
+                <a:t>p</a:t>
+              </a:r>
+              <a:r>
+                <a:rPr lang="en-US" sz="1200" dirty="0" smtClean="0"/>
+                <a:t>ropagation module:</a:t>
+              </a:r>
+            </a:p>
+            <a:p>
+              <a:r>
+                <a:rPr lang="en-US" sz="1200" i="1" dirty="0" smtClean="0"/>
                 <a:t>scalable</a:t>
               </a:r>
+              <a:r>
+                <a:rPr lang="en-US" sz="1200" i="1" dirty="0" smtClean="0"/>
+                <a:t/>
+              </a:r>
               <a:br>
-                <a:rPr lang="en-US" sz="1500" dirty="0" smtClean="0"/>
+                <a:rPr lang="en-US" sz="1200" i="1" dirty="0" smtClean="0"/>
               </a:br>
               <a:r>
-                <a:rPr lang="en-US" sz="1500" dirty="0" smtClean="0"/>
+                <a:rPr lang="en-US" sz="1200" i="1" dirty="0" smtClean="0"/>
                 <a:t>for</a:t>
               </a:r>
               <a:r>
-                <a:rPr lang="en-US" sz="1500" dirty="0"/>
+                <a:rPr lang="en-US" sz="1200" i="1" dirty="0"/>
                 <a:t> </a:t>
               </a:r>
               <a:r>
-                <a:rPr lang="en-US" sz="1500" dirty="0" smtClean="0"/>
+                <a:rPr lang="en-US" sz="1200" i="1" dirty="0" smtClean="0"/>
                 <a:t>other</a:t>
               </a:r>
               <a:br>
-                <a:rPr lang="en-US" sz="1500" dirty="0" smtClean="0"/>
+                <a:rPr lang="en-US" sz="1200" i="1" dirty="0" smtClean="0"/>
               </a:br>
               <a:r>
-                <a:rPr lang="en-US" sz="1500" dirty="0" smtClean="0"/>
-                <a:t>back-propagation algorithms</a:t>
+                <a:rPr lang="en-US" sz="1200" i="1" dirty="0" smtClean="0"/>
+                <a:t>back-propagation </a:t>
               </a:r>
-              <a:endParaRPr lang="en-US" sz="1500" dirty="0"/>
+              <a:r>
+                <a:rPr lang="en-US" sz="1200" i="1" dirty="0" smtClean="0"/>
+                <a:t>algorithms</a:t>
+              </a:r>
+              <a:endParaRPr lang="en-US" sz="1200" i="1" dirty="0"/>
             </a:p>
           </p:txBody>
         </p:sp>
@@ -22713,8 +22740,8 @@
           </p:nvSpPr>
           <p:spPr>
             <a:xfrm>
-              <a:off x="684286" y="3669705"/>
-              <a:ext cx="1676400" cy="553998"/>
+              <a:off x="874029" y="3667208"/>
+              <a:ext cx="1296914" cy="830997"/>
             </a:xfrm>
             <a:prstGeom prst="rect">
               <a:avLst/>
@@ -22728,17 +22755,38 @@
             <a:lstStyle/>
             <a:p>
               <a:r>
-                <a:rPr lang="en-US" sz="1500" dirty="0" smtClean="0"/>
-                <a:t>scalable for other</a:t>
+                <a:rPr lang="en-US" sz="1200" dirty="0"/>
+                <a:t>i</a:t>
+              </a:r>
+              <a:r>
+                <a:rPr lang="en-US" sz="1200" dirty="0" smtClean="0"/>
+                <a:t>nput and output</a:t>
               </a:r>
               <a:br>
-                <a:rPr lang="en-US" sz="1500" dirty="0" smtClean="0"/>
+                <a:rPr lang="en-US" sz="1200" dirty="0" smtClean="0"/>
               </a:br>
               <a:r>
-                <a:rPr lang="en-US" sz="1500" dirty="0" smtClean="0"/>
+                <a:rPr lang="en-US" sz="1200" dirty="0" smtClean="0"/>
+                <a:t>utility module:</a:t>
+              </a:r>
+            </a:p>
+            <a:p>
+              <a:r>
+                <a:rPr lang="en-US" sz="1200" i="1" dirty="0" smtClean="0"/>
+                <a:t>scalable </a:t>
+              </a:r>
+              <a:r>
+                <a:rPr lang="en-US" sz="1200" i="1" dirty="0" smtClean="0"/>
+                <a:t>for other</a:t>
+              </a:r>
+              <a:br>
+                <a:rPr lang="en-US" sz="1200" i="1" dirty="0" smtClean="0"/>
+              </a:br>
+              <a:r>
+                <a:rPr lang="en-US" sz="1200" i="1" dirty="0" smtClean="0"/>
                 <a:t>system models</a:t>
               </a:r>
-              <a:endParaRPr lang="en-US" sz="1500" dirty="0"/>
+              <a:endParaRPr lang="en-US" sz="1200" i="1" dirty="0"/>
             </a:p>
           </p:txBody>
         </p:sp>

</xml_diff>

<commit_message>
Update on Thread Experiment Update document and figure.
</commit_message>
<xml_diff>
--- a/trunk/pic/pic.pptx
+++ b/trunk/pic/pic.pptx
@@ -201,7 +201,7 @@
           <a:p>
             <a:fld id="{40F2FB96-7D30-4672-9E6D-9816F53C8FB8}" type="datetimeFigureOut">
               <a:rPr lang="en-US" smtClean="0"/>
-              <a:t>12/27/2014</a:t>
+              <a:t>12/31/2014</a:t>
             </a:fld>
             <a:endParaRPr lang="en-US"/>
           </a:p>
@@ -903,7 +903,7 @@
             <a:fld id="{1D8BD707-D9CF-40AE-B4C6-C98DA3205C09}" type="datetimeFigureOut">
               <a:rPr lang="en-US" smtClean="0"/>
               <a:pPr/>
-              <a:t>12/27/2014</a:t>
+              <a:t>12/31/2014</a:t>
             </a:fld>
             <a:endParaRPr lang="en-US"/>
           </a:p>
@@ -1070,7 +1070,7 @@
             <a:fld id="{1D8BD707-D9CF-40AE-B4C6-C98DA3205C09}" type="datetimeFigureOut">
               <a:rPr lang="en-US" smtClean="0"/>
               <a:pPr/>
-              <a:t>12/27/2014</a:t>
+              <a:t>12/31/2014</a:t>
             </a:fld>
             <a:endParaRPr lang="en-US"/>
           </a:p>
@@ -1247,7 +1247,7 @@
             <a:fld id="{1D8BD707-D9CF-40AE-B4C6-C98DA3205C09}" type="datetimeFigureOut">
               <a:rPr lang="en-US" smtClean="0"/>
               <a:pPr/>
-              <a:t>12/27/2014</a:t>
+              <a:t>12/31/2014</a:t>
             </a:fld>
             <a:endParaRPr lang="en-US"/>
           </a:p>
@@ -1414,7 +1414,7 @@
             <a:fld id="{1D8BD707-D9CF-40AE-B4C6-C98DA3205C09}" type="datetimeFigureOut">
               <a:rPr lang="en-US" smtClean="0"/>
               <a:pPr/>
-              <a:t>12/27/2014</a:t>
+              <a:t>12/31/2014</a:t>
             </a:fld>
             <a:endParaRPr lang="en-US"/>
           </a:p>
@@ -1657,7 +1657,7 @@
             <a:fld id="{1D8BD707-D9CF-40AE-B4C6-C98DA3205C09}" type="datetimeFigureOut">
               <a:rPr lang="en-US" smtClean="0"/>
               <a:pPr/>
-              <a:t>12/27/2014</a:t>
+              <a:t>12/31/2014</a:t>
             </a:fld>
             <a:endParaRPr lang="en-US"/>
           </a:p>
@@ -1942,7 +1942,7 @@
             <a:fld id="{1D8BD707-D9CF-40AE-B4C6-C98DA3205C09}" type="datetimeFigureOut">
               <a:rPr lang="en-US" smtClean="0"/>
               <a:pPr/>
-              <a:t>12/27/2014</a:t>
+              <a:t>12/31/2014</a:t>
             </a:fld>
             <a:endParaRPr lang="en-US"/>
           </a:p>
@@ -2361,7 +2361,7 @@
             <a:fld id="{1D8BD707-D9CF-40AE-B4C6-C98DA3205C09}" type="datetimeFigureOut">
               <a:rPr lang="en-US" smtClean="0"/>
               <a:pPr/>
-              <a:t>12/27/2014</a:t>
+              <a:t>12/31/2014</a:t>
             </a:fld>
             <a:endParaRPr lang="en-US"/>
           </a:p>
@@ -2476,7 +2476,7 @@
             <a:fld id="{1D8BD707-D9CF-40AE-B4C6-C98DA3205C09}" type="datetimeFigureOut">
               <a:rPr lang="en-US" smtClean="0"/>
               <a:pPr/>
-              <a:t>12/27/2014</a:t>
+              <a:t>12/31/2014</a:t>
             </a:fld>
             <a:endParaRPr lang="en-US"/>
           </a:p>
@@ -2568,7 +2568,7 @@
             <a:fld id="{1D8BD707-D9CF-40AE-B4C6-C98DA3205C09}" type="datetimeFigureOut">
               <a:rPr lang="en-US" smtClean="0"/>
               <a:pPr/>
-              <a:t>12/27/2014</a:t>
+              <a:t>12/31/2014</a:t>
             </a:fld>
             <a:endParaRPr lang="en-US"/>
           </a:p>
@@ -2842,7 +2842,7 @@
             <a:fld id="{1D8BD707-D9CF-40AE-B4C6-C98DA3205C09}" type="datetimeFigureOut">
               <a:rPr lang="en-US" smtClean="0"/>
               <a:pPr/>
-              <a:t>12/27/2014</a:t>
+              <a:t>12/31/2014</a:t>
             </a:fld>
             <a:endParaRPr lang="en-US"/>
           </a:p>
@@ -3092,7 +3092,7 @@
             <a:fld id="{1D8BD707-D9CF-40AE-B4C6-C98DA3205C09}" type="datetimeFigureOut">
               <a:rPr lang="en-US" smtClean="0"/>
               <a:pPr/>
-              <a:t>12/27/2014</a:t>
+              <a:t>12/31/2014</a:t>
             </a:fld>
             <a:endParaRPr lang="en-US"/>
           </a:p>
@@ -3302,7 +3302,7 @@
             <a:fld id="{1D8BD707-D9CF-40AE-B4C6-C98DA3205C09}" type="datetimeFigureOut">
               <a:rPr lang="en-US" smtClean="0"/>
               <a:pPr/>
-              <a:t>12/27/2014</a:t>
+              <a:t>12/31/2014</a:t>
             </a:fld>
             <a:endParaRPr lang="en-US"/>
           </a:p>
@@ -5471,7 +5471,7 @@
       </p:grpSpPr>
       <p:pic>
         <p:nvPicPr>
-          <p:cNvPr id="1026" name="Picture 2"/>
+          <p:cNvPr id="1027" name="Picture 3"/>
           <p:cNvPicPr>
             <a:picLocks noChangeAspect="1" noChangeArrowheads="1"/>
           </p:cNvPicPr>
@@ -5492,8 +5492,8 @@
         </p:blipFill>
         <p:spPr bwMode="auto">
           <a:xfrm>
-            <a:off x="938214" y="914400"/>
-            <a:ext cx="7267575" cy="4572000"/>
+            <a:off x="1743075" y="1585913"/>
+            <a:ext cx="5657850" cy="3686175"/>
           </a:xfrm>
           <a:prstGeom prst="rect">
             <a:avLst/>
@@ -5502,6 +5502,7 @@
           <a:ln>
             <a:noFill/>
           </a:ln>
+          <a:effectLst/>
           <a:extLst>
             <a:ext uri="{909E8E84-426E-40DD-AFC4-6F175D3DCCD1}">
               <a14:hiddenFill xmlns:a14="http://schemas.microsoft.com/office/drawing/2010/main">
@@ -5519,6 +5520,15 @@
                 <a:headEnd/>
                 <a:tailEnd/>
               </a14:hiddenLine>
+            </a:ext>
+            <a:ext uri="{AF507438-7753-43E0-B8FC-AC1667EBCBE1}">
+              <a14:hiddenEffects xmlns:a14="http://schemas.microsoft.com/office/drawing/2010/main">
+                <a:effectLst>
+                  <a:outerShdw dist="35921" dir="2700000" algn="ctr" rotWithShape="0">
+                    <a:schemeClr val="bg2"/>
+                  </a:outerShdw>
+                </a:effectLst>
+              </a14:hiddenEffects>
             </a:ext>
           </a:extLst>
         </p:spPr>
@@ -25583,15 +25593,7 @@
                     <a:schemeClr val="tx1"/>
                   </a:solidFill>
                 </a:rPr>
-                <a:t>educe </a:t>
-              </a:r>
-              <a:r>
-                <a:rPr lang="en-US" sz="1600" dirty="0" smtClean="0">
-                  <a:solidFill>
-                    <a:schemeClr val="tx1"/>
-                  </a:solidFill>
-                </a:rPr>
-                <a:t>type</a:t>
+                <a:t>educe type</a:t>
               </a:r>
               <a:br>
                 <a:rPr lang="en-US" sz="1600" dirty="0" smtClean="0">
@@ -26081,15 +26083,7 @@
                     <a:schemeClr val="tx1"/>
                   </a:solidFill>
                 </a:rPr>
-                <a:t>educe </a:t>
-              </a:r>
-              <a:r>
-                <a:rPr lang="en-US" sz="1600" dirty="0" smtClean="0">
-                  <a:solidFill>
-                    <a:schemeClr val="tx1"/>
-                  </a:solidFill>
-                </a:rPr>
-                <a:t>type</a:t>
+                <a:t>educe type</a:t>
               </a:r>
               <a:br>
                 <a:rPr lang="en-US" sz="1600" dirty="0" smtClean="0">
@@ -26297,15 +26291,7 @@
                     <a:schemeClr val="tx1"/>
                   </a:solidFill>
                 </a:rPr>
-                <a:t>run </a:t>
-              </a:r>
-              <a:r>
-                <a:rPr lang="en-US" sz="1600" dirty="0" smtClean="0">
-                  <a:solidFill>
-                    <a:schemeClr val="tx1"/>
-                  </a:solidFill>
-                </a:rPr>
-                <a:t>code</a:t>
+                <a:t>run code</a:t>
               </a:r>
               <a:endParaRPr lang="en-US" sz="1600" dirty="0">
                 <a:solidFill>
@@ -26601,8 +26587,8 @@
             </a:fontRef>
           </p:style>
         </p:cxnSp>
-        <mc:AlternateContent xmlns:mc="http://schemas.openxmlformats.org/markup-compatibility/2006">
-          <mc:Choice xmlns:a14="http://schemas.microsoft.com/office/drawing/2010/main" Requires="a14">
+        <mc:AlternateContent xmlns:mc="http://schemas.openxmlformats.org/markup-compatibility/2006" xmlns:a14="http://schemas.microsoft.com/office/drawing/2010/main">
+          <mc:Choice Requires="a14">
             <p:sp>
               <p:nvSpPr>
                 <p:cNvPr id="195" name="TextBox 194"/>
@@ -26652,7 +26638,7 @@
               </p:txBody>
             </p:sp>
           </mc:Choice>
-          <mc:Fallback>
+          <mc:Fallback xmlns="">
             <p:sp>
               <p:nvSpPr>
                 <p:cNvPr id="195" name="TextBox 194"/>
@@ -26691,8 +26677,8 @@
             </p:sp>
           </mc:Fallback>
         </mc:AlternateContent>
-        <mc:AlternateContent xmlns:mc="http://schemas.openxmlformats.org/markup-compatibility/2006">
-          <mc:Choice xmlns:a14="http://schemas.microsoft.com/office/drawing/2010/main" Requires="a14">
+        <mc:AlternateContent xmlns:mc="http://schemas.openxmlformats.org/markup-compatibility/2006" xmlns:a14="http://schemas.microsoft.com/office/drawing/2010/main">
+          <mc:Choice Requires="a14">
             <p:sp>
               <p:nvSpPr>
                 <p:cNvPr id="200" name="TextBox 199"/>
@@ -26742,7 +26728,7 @@
               </p:txBody>
             </p:sp>
           </mc:Choice>
-          <mc:Fallback>
+          <mc:Fallback xmlns="">
             <p:sp>
               <p:nvSpPr>
                 <p:cNvPr id="200" name="TextBox 199"/>
@@ -26859,8 +26845,8 @@
             </a:fontRef>
           </p:style>
         </p:cxnSp>
-        <mc:AlternateContent xmlns:mc="http://schemas.openxmlformats.org/markup-compatibility/2006">
-          <mc:Choice xmlns:a14="http://schemas.microsoft.com/office/drawing/2010/main" Requires="a14">
+        <mc:AlternateContent xmlns:mc="http://schemas.openxmlformats.org/markup-compatibility/2006" xmlns:a14="http://schemas.microsoft.com/office/drawing/2010/main">
+          <mc:Choice Requires="a14">
             <p:sp>
               <p:nvSpPr>
                 <p:cNvPr id="209" name="TextBox 208"/>
@@ -26910,7 +26896,7 @@
               </p:txBody>
             </p:sp>
           </mc:Choice>
-          <mc:Fallback>
+          <mc:Fallback xmlns="">
             <p:sp>
               <p:nvSpPr>
                 <p:cNvPr id="209" name="TextBox 208"/>
@@ -26949,8 +26935,8 @@
             </p:sp>
           </mc:Fallback>
         </mc:AlternateContent>
-        <mc:AlternateContent xmlns:mc="http://schemas.openxmlformats.org/markup-compatibility/2006">
-          <mc:Choice xmlns:a14="http://schemas.microsoft.com/office/drawing/2010/main" Requires="a14">
+        <mc:AlternateContent xmlns:mc="http://schemas.openxmlformats.org/markup-compatibility/2006" xmlns:a14="http://schemas.microsoft.com/office/drawing/2010/main">
+          <mc:Choice Requires="a14">
             <p:sp>
               <p:nvSpPr>
                 <p:cNvPr id="210" name="TextBox 209"/>
@@ -27000,7 +26986,7 @@
               </p:txBody>
             </p:sp>
           </mc:Choice>
-          <mc:Fallback>
+          <mc:Fallback xmlns="">
             <p:sp>
               <p:nvSpPr>
                 <p:cNvPr id="210" name="TextBox 209"/>

</xml_diff>

<commit_message>
Submission of the Paper
Change document structure.
Remove redundant figures.
</commit_message>
<xml_diff>
--- a/trunk/pic/pic.pptx
+++ b/trunk/pic/pic.pptx
@@ -5582,16 +5582,16 @@
       </p:grpSpPr>
       <p:grpSp>
         <p:nvGrpSpPr>
-          <p:cNvPr id="163" name="Group 162"/>
+          <p:cNvPr id="12" name="Group 11"/>
           <p:cNvGrpSpPr/>
           <p:nvPr/>
         </p:nvGrpSpPr>
         <p:grpSpPr>
           <a:xfrm>
             <a:off x="1321357" y="794190"/>
-            <a:ext cx="6222443" cy="5332288"/>
+            <a:ext cx="6454452" cy="5371737"/>
             <a:chOff x="1321357" y="794190"/>
-            <a:chExt cx="6222443" cy="5332288"/>
+            <a:chExt cx="6454452" cy="5371737"/>
           </a:xfrm>
         </p:grpSpPr>
         <p:sp>
@@ -5602,7 +5602,7 @@
           </p:nvSpPr>
           <p:spPr>
             <a:xfrm>
-              <a:off x="2286000" y="794190"/>
+              <a:off x="1563624" y="794190"/>
               <a:ext cx="1066800" cy="533400"/>
             </a:xfrm>
             <a:prstGeom prst="roundRect">
@@ -5722,7 +5722,7 @@
                           <a:solidFill>
                             <a:schemeClr val="tx1"/>
                           </a:solidFill>
-                          <a:latin typeface="Times New Roman" panose="02020603050405020304" pitchFamily="18" charset="0"/>
+                          <a:latin typeface="Cambria Math" panose="02040503050406030204" pitchFamily="18" charset="0"/>
                           <a:cs typeface="Times New Roman" panose="02020603050405020304" pitchFamily="18" charset="0"/>
                         </a:rPr>
                         <m:t>𝐾</m:t>
@@ -5780,7 +5780,7 @@
                 <a:blipFill rotWithShape="0">
                   <a:blip r:embed="rId2"/>
                   <a:stretch>
-                    <a:fillRect t="-5495" r="-1186" b="-16484"/>
+                    <a:fillRect t="-5495" r="-1581" b="-16484"/>
                   </a:stretch>
                 </a:blipFill>
                 <a:ln w="19050">
@@ -6001,7 +6001,7 @@
           </p:nvSpPr>
           <p:spPr>
             <a:xfrm>
-              <a:off x="2286000" y="5554978"/>
+              <a:off x="1563624" y="5554978"/>
               <a:ext cx="1066800" cy="533400"/>
             </a:xfrm>
             <a:prstGeom prst="roundRect">
@@ -6038,25 +6038,41 @@
             <a:p>
               <a:pPr algn="ctr"/>
               <a:r>
-                <a:rPr lang="en-US" altLang="zh-CN" sz="1600" dirty="0">
+                <a:rPr lang="en-US" altLang="zh-CN" sz="1600" dirty="0" smtClean="0">
                   <a:solidFill>
                     <a:schemeClr val="tx1"/>
                   </a:solidFill>
                   <a:latin typeface="Times New Roman" panose="02020603050405020304" pitchFamily="18" charset="0"/>
                   <a:cs typeface="Times New Roman" panose="02020603050405020304" pitchFamily="18" charset="0"/>
                 </a:rPr>
-                <a:t>s</a:t>
+                <a:t>end</a:t>
               </a:r>
-              <a:r>
-                <a:rPr lang="en-US" sz="1600" dirty="0">
+              <a:br>
+                <a:rPr lang="en-US" altLang="zh-CN" sz="1600" dirty="0" smtClean="0">
                   <a:solidFill>
                     <a:schemeClr val="tx1"/>
                   </a:solidFill>
                   <a:latin typeface="Times New Roman" panose="02020603050405020304" pitchFamily="18" charset="0"/>
                   <a:cs typeface="Times New Roman" panose="02020603050405020304" pitchFamily="18" charset="0"/>
                 </a:rPr>
-                <a:t>tart training</a:t>
+              </a:br>
+              <a:r>
+                <a:rPr lang="en-US" sz="1600" dirty="0" smtClean="0">
+                  <a:solidFill>
+                    <a:schemeClr val="tx1"/>
+                  </a:solidFill>
+                  <a:latin typeface="Times New Roman" panose="02020603050405020304" pitchFamily="18" charset="0"/>
+                  <a:cs typeface="Times New Roman" panose="02020603050405020304" pitchFamily="18" charset="0"/>
+                </a:rPr>
+                <a:t>training</a:t>
               </a:r>
+              <a:endParaRPr lang="en-US" sz="1600" dirty="0">
+                <a:solidFill>
+                  <a:schemeClr val="tx1"/>
+                </a:solidFill>
+                <a:latin typeface="Times New Roman" panose="02020603050405020304" pitchFamily="18" charset="0"/>
+                <a:cs typeface="Times New Roman" panose="02020603050405020304" pitchFamily="18" charset="0"/>
+              </a:endParaRPr>
             </a:p>
           </p:txBody>
         </p:sp>
@@ -6071,8 +6087,8 @@
           </p:nvCxnSpPr>
           <p:spPr>
             <a:xfrm>
-              <a:off x="3352800" y="1060890"/>
-              <a:ext cx="609600" cy="0"/>
+              <a:off x="2630424" y="1060890"/>
+              <a:ext cx="1331976" cy="0"/>
             </a:xfrm>
             <a:prstGeom prst="straightConnector1">
               <a:avLst/>
@@ -6252,7 +6268,7 @@
             </a:xfrm>
             <a:prstGeom prst="bentConnector3">
               <a:avLst>
-                <a:gd name="adj1" fmla="val 50261"/>
+                <a:gd name="adj1" fmla="val 48826"/>
               </a:avLst>
             </a:prstGeom>
             <a:noFill/>
@@ -6423,8 +6439,8 @@
           </p:nvCxnSpPr>
           <p:spPr>
             <a:xfrm flipH="1">
-              <a:off x="3352800" y="5821678"/>
-              <a:ext cx="342900" cy="0"/>
+              <a:off x="2630424" y="5821678"/>
+              <a:ext cx="1065276" cy="0"/>
             </a:xfrm>
             <a:prstGeom prst="straightConnector1">
               <a:avLst/>
@@ -6931,84 +6947,142 @@
             </a:p>
           </p:txBody>
         </p:sp>
-        <p:sp>
-          <p:nvSpPr>
-            <p:cNvPr id="130" name="Parallelogram 129"/>
-            <p:cNvSpPr/>
-            <p:nvPr/>
-          </p:nvSpPr>
-          <p:spPr>
-            <a:xfrm>
-              <a:off x="4767297" y="2220141"/>
-              <a:ext cx="1319417" cy="746762"/>
-            </a:xfrm>
-            <a:prstGeom prst="parallelogram">
-              <a:avLst/>
-            </a:prstGeom>
-            <a:noFill/>
-            <a:ln w="19050">
-              <a:solidFill>
-                <a:schemeClr val="tx1"/>
-              </a:solidFill>
-            </a:ln>
-          </p:spPr>
-          <p:style>
-            <a:lnRef idx="2">
-              <a:schemeClr val="accent1">
-                <a:shade val="50000"/>
-              </a:schemeClr>
-            </a:lnRef>
-            <a:fillRef idx="1">
-              <a:schemeClr val="accent1"/>
-            </a:fillRef>
-            <a:effectRef idx="0">
-              <a:schemeClr val="accent1"/>
-            </a:effectRef>
-            <a:fontRef idx="minor">
-              <a:schemeClr val="lt1"/>
-            </a:fontRef>
-          </p:style>
-          <p:txBody>
-            <a:bodyPr rtlCol="0" anchor="ctr"/>
-            <a:lstStyle/>
-            <a:p>
-              <a:pPr algn="ctr"/>
-              <a:r>
-                <a:rPr lang="en-US" sz="1600" dirty="0">
+        <mc:AlternateContent xmlns:mc="http://schemas.openxmlformats.org/markup-compatibility/2006">
+          <mc:Choice xmlns:a14="http://schemas.microsoft.com/office/drawing/2010/main" Requires="a14">
+            <p:sp>
+              <p:nvSpPr>
+                <p:cNvPr id="130" name="Parallelogram 129"/>
+                <p:cNvSpPr/>
+                <p:nvPr/>
+              </p:nvSpPr>
+              <p:spPr>
+                <a:xfrm>
+                  <a:off x="4767297" y="2220141"/>
+                  <a:ext cx="1319417" cy="746762"/>
+                </a:xfrm>
+                <a:prstGeom prst="parallelogram">
+                  <a:avLst/>
+                </a:prstGeom>
+                <a:noFill/>
+                <a:ln w="19050">
                   <a:solidFill>
                     <a:schemeClr val="tx1"/>
                   </a:solidFill>
-                  <a:latin typeface="Times New Roman" panose="02020603050405020304" pitchFamily="18" charset="0"/>
-                  <a:cs typeface="Times New Roman" panose="02020603050405020304" pitchFamily="18" charset="0"/>
-                </a:rPr>
-                <a:t>K</a:t>
-              </a:r>
-              <a:r>
-                <a:rPr lang="en-US" sz="1600" baseline="30000" dirty="0">
+                </a:ln>
+              </p:spPr>
+              <p:style>
+                <a:lnRef idx="2">
+                  <a:schemeClr val="accent1">
+                    <a:shade val="50000"/>
+                  </a:schemeClr>
+                </a:lnRef>
+                <a:fillRef idx="1">
+                  <a:schemeClr val="accent1"/>
+                </a:fillRef>
+                <a:effectRef idx="0">
+                  <a:schemeClr val="accent1"/>
+                </a:effectRef>
+                <a:fontRef idx="minor">
+                  <a:schemeClr val="lt1"/>
+                </a:fontRef>
+              </p:style>
+              <p:txBody>
+                <a:bodyPr rtlCol="0" anchor="ctr"/>
+                <a:lstStyle/>
+                <a:p>
+                  <a:pPr algn="ctr"/>
+                  <a14:m>
+                    <m:oMath xmlns:m="http://schemas.openxmlformats.org/officeDocument/2006/math">
+                      <m:r>
+                        <a:rPr lang="en-US" sz="1600" i="1" dirty="0" smtClean="0">
+                          <a:solidFill>
+                            <a:schemeClr val="tx1"/>
+                          </a:solidFill>
+                          <a:latin typeface="Cambria Math" panose="02040503050406030204" pitchFamily="18" charset="0"/>
+                          <a:cs typeface="Times New Roman" panose="02020603050405020304" pitchFamily="18" charset="0"/>
+                        </a:rPr>
+                        <m:t>𝐾</m:t>
+                      </m:r>
+                    </m:oMath>
+                  </a14:m>
+                  <a:r>
+                    <a:rPr lang="en-US" sz="1600" baseline="30000" dirty="0" smtClean="0">
+                      <a:solidFill>
+                        <a:schemeClr val="tx1"/>
+                      </a:solidFill>
+                      <a:latin typeface="Times New Roman" panose="02020603050405020304" pitchFamily="18" charset="0"/>
+                      <a:cs typeface="Times New Roman" panose="02020603050405020304" pitchFamily="18" charset="0"/>
+                    </a:rPr>
+                    <a:t>th</a:t>
+                  </a:r>
+                  <a:endParaRPr lang="en-US" sz="1600" baseline="30000" dirty="0">
+                    <a:solidFill>
+                      <a:schemeClr val="tx1"/>
+                    </a:solidFill>
+                    <a:latin typeface="Times New Roman" panose="02020603050405020304" pitchFamily="18" charset="0"/>
+                    <a:cs typeface="Times New Roman" panose="02020603050405020304" pitchFamily="18" charset="0"/>
+                  </a:endParaRPr>
+                </a:p>
+                <a:p>
+                  <a:pPr algn="ctr"/>
+                  <a:r>
+                    <a:rPr lang="en-US" sz="1600" dirty="0">
+                      <a:solidFill>
+                        <a:schemeClr val="tx1"/>
+                      </a:solidFill>
+                      <a:latin typeface="Times New Roman" panose="02020603050405020304" pitchFamily="18" charset="0"/>
+                      <a:cs typeface="Times New Roman" panose="02020603050405020304" pitchFamily="18" charset="0"/>
+                    </a:rPr>
+                    <a:t>partition of data</a:t>
+                  </a:r>
+                </a:p>
+              </p:txBody>
+            </p:sp>
+          </mc:Choice>
+          <mc:Fallback>
+            <p:sp>
+              <p:nvSpPr>
+                <p:cNvPr id="130" name="Parallelogram 129"/>
+                <p:cNvSpPr>
+                  <a:spLocks noRot="1" noChangeAspect="1" noMove="1" noResize="1" noEditPoints="1" noAdjustHandles="1" noChangeArrowheads="1" noChangeShapeType="1" noTextEdit="1"/>
+                </p:cNvSpPr>
+                <p:nvPr/>
+              </p:nvSpPr>
+              <p:spPr>
+                <a:xfrm>
+                  <a:off x="4767297" y="2220141"/>
+                  <a:ext cx="1319417" cy="746762"/>
+                </a:xfrm>
+                <a:prstGeom prst="parallelogram">
+                  <a:avLst/>
+                </a:prstGeom>
+                <a:blipFill rotWithShape="0">
+                  <a:blip r:embed="rId3"/>
+                  <a:stretch>
+                    <a:fillRect t="-2381" b="-12698"/>
+                  </a:stretch>
+                </a:blipFill>
+                <a:ln w="19050">
                   <a:solidFill>
                     <a:schemeClr val="tx1"/>
                   </a:solidFill>
-                  <a:latin typeface="Times New Roman" panose="02020603050405020304" pitchFamily="18" charset="0"/>
-                  <a:cs typeface="Times New Roman" panose="02020603050405020304" pitchFamily="18" charset="0"/>
-                </a:rPr>
-                <a:t>th</a:t>
-              </a:r>
-            </a:p>
-            <a:p>
-              <a:pPr algn="ctr"/>
-              <a:r>
-                <a:rPr lang="en-US" sz="1600" dirty="0">
-                  <a:solidFill>
-                    <a:schemeClr val="tx1"/>
-                  </a:solidFill>
-                  <a:latin typeface="Times New Roman" panose="02020603050405020304" pitchFamily="18" charset="0"/>
-                  <a:cs typeface="Times New Roman" panose="02020603050405020304" pitchFamily="18" charset="0"/>
-                </a:rPr>
-                <a:t>partition of data</a:t>
-              </a:r>
-            </a:p>
-          </p:txBody>
-        </p:sp>
+                </a:ln>
+              </p:spPr>
+              <p:txBody>
+                <a:bodyPr/>
+                <a:lstStyle/>
+                <a:p>
+                  <a:r>
+                    <a:rPr lang="en-US">
+                      <a:noFill/>
+                    </a:rPr>
+                    <a:t> </a:t>
+                  </a:r>
+                </a:p>
+              </p:txBody>
+            </p:sp>
+          </mc:Fallback>
+        </mc:AlternateContent>
         <p:cxnSp>
           <p:nvCxnSpPr>
             <p:cNvPr id="131" name="Straight Arrow Connector 21"/>
@@ -7260,7 +7334,7 @@
                   <a:avLst/>
                 </a:prstGeom>
                 <a:blipFill rotWithShape="0">
-                  <a:blip r:embed="rId3"/>
+                  <a:blip r:embed="rId4"/>
                   <a:stretch>
                     <a:fillRect t="-5455" r="-1255" b="-23636"/>
                   </a:stretch>
@@ -7342,7 +7416,7 @@
                           <a:solidFill>
                             <a:schemeClr val="tx1"/>
                           </a:solidFill>
-                          <a:latin typeface="Times New Roman" panose="02020603050405020304" pitchFamily="18" charset="0"/>
+                          <a:latin typeface="Cambria Math" panose="02040503050406030204" pitchFamily="18" charset="0"/>
                           <a:cs typeface="Times New Roman" panose="02020603050405020304" pitchFamily="18" charset="0"/>
                         </a:rPr>
                         <m:t>𝐾</m:t>
@@ -7398,7 +7472,7 @@
                   <a:avLst/>
                 </a:prstGeom>
                 <a:blipFill rotWithShape="0">
-                  <a:blip r:embed="rId4"/>
+                  <a:blip r:embed="rId5"/>
                   <a:stretch>
                     <a:fillRect t="-6667" b="-16667"/>
                   </a:stretch>
@@ -7490,6 +7564,157 @@
                 <a:solidFill>
                   <a:schemeClr val="tx1"/>
                 </a:solidFill>
+                <a:latin typeface="Times New Roman" panose="02020603050405020304" pitchFamily="18" charset="0"/>
+                <a:cs typeface="Times New Roman" panose="02020603050405020304" pitchFamily="18" charset="0"/>
+              </a:endParaRPr>
+            </a:p>
+          </p:txBody>
+        </p:sp>
+        <p:sp>
+          <p:nvSpPr>
+            <p:cNvPr id="35" name="TextBox 34"/>
+            <p:cNvSpPr txBox="1"/>
+            <p:nvPr/>
+          </p:nvSpPr>
+          <p:spPr>
+            <a:xfrm>
+              <a:off x="3522485" y="5821678"/>
+              <a:ext cx="332142" cy="338554"/>
+            </a:xfrm>
+            <a:prstGeom prst="rect">
+              <a:avLst/>
+            </a:prstGeom>
+            <a:noFill/>
+          </p:spPr>
+          <p:txBody>
+            <a:bodyPr wrap="none" rtlCol="0">
+              <a:spAutoFit/>
+            </a:bodyPr>
+            <a:lstStyle/>
+            <a:p>
+              <a:r>
+                <a:rPr lang="en-US" sz="1600" dirty="0" smtClean="0">
+                  <a:latin typeface="Times New Roman" panose="02020603050405020304" pitchFamily="18" charset="0"/>
+                  <a:cs typeface="Times New Roman" panose="02020603050405020304" pitchFamily="18" charset="0"/>
+                </a:rPr>
+                <a:t>Y</a:t>
+              </a:r>
+              <a:endParaRPr lang="en-US" sz="1600" dirty="0">
+                <a:latin typeface="Times New Roman" panose="02020603050405020304" pitchFamily="18" charset="0"/>
+                <a:cs typeface="Times New Roman" panose="02020603050405020304" pitchFamily="18" charset="0"/>
+              </a:endParaRPr>
+            </a:p>
+          </p:txBody>
+        </p:sp>
+        <p:sp>
+          <p:nvSpPr>
+            <p:cNvPr id="36" name="TextBox 35"/>
+            <p:cNvSpPr txBox="1"/>
+            <p:nvPr/>
+          </p:nvSpPr>
+          <p:spPr>
+            <a:xfrm>
+              <a:off x="5619750" y="5827373"/>
+              <a:ext cx="332142" cy="338554"/>
+            </a:xfrm>
+            <a:prstGeom prst="rect">
+              <a:avLst/>
+            </a:prstGeom>
+            <a:noFill/>
+          </p:spPr>
+          <p:txBody>
+            <a:bodyPr wrap="none" rtlCol="0">
+              <a:spAutoFit/>
+            </a:bodyPr>
+            <a:lstStyle/>
+            <a:p>
+              <a:r>
+                <a:rPr lang="en-US" sz="1600" dirty="0" smtClean="0">
+                  <a:latin typeface="Times New Roman" panose="02020603050405020304" pitchFamily="18" charset="0"/>
+                  <a:cs typeface="Times New Roman" panose="02020603050405020304" pitchFamily="18" charset="0"/>
+                </a:rPr>
+                <a:t>N</a:t>
+              </a:r>
+              <a:endParaRPr lang="en-US" sz="1600" dirty="0">
+                <a:latin typeface="Times New Roman" panose="02020603050405020304" pitchFamily="18" charset="0"/>
+                <a:cs typeface="Times New Roman" panose="02020603050405020304" pitchFamily="18" charset="0"/>
+              </a:endParaRPr>
+            </a:p>
+          </p:txBody>
+        </p:sp>
+        <p:sp>
+          <p:nvSpPr>
+            <p:cNvPr id="37" name="TextBox 36"/>
+            <p:cNvSpPr txBox="1"/>
+            <p:nvPr/>
+          </p:nvSpPr>
+          <p:spPr>
+            <a:xfrm>
+              <a:off x="2699993" y="5477429"/>
+              <a:ext cx="1095103" cy="338554"/>
+            </a:xfrm>
+            <a:prstGeom prst="rect">
+              <a:avLst/>
+            </a:prstGeom>
+            <a:noFill/>
+          </p:spPr>
+          <p:txBody>
+            <a:bodyPr wrap="square" rtlCol="0">
+              <a:spAutoFit/>
+            </a:bodyPr>
+            <a:lstStyle/>
+            <a:p>
+              <a:r>
+                <a:rPr lang="en-US" sz="1600" dirty="0">
+                  <a:latin typeface="Times New Roman" panose="02020603050405020304" pitchFamily="18" charset="0"/>
+                  <a:cs typeface="Times New Roman" panose="02020603050405020304" pitchFamily="18" charset="0"/>
+                </a:rPr>
+                <a:t>o</a:t>
+              </a:r>
+              <a:r>
+                <a:rPr lang="en-US" sz="1600" dirty="0" smtClean="0">
+                  <a:latin typeface="Times New Roman" panose="02020603050405020304" pitchFamily="18" charset="0"/>
+                  <a:cs typeface="Times New Roman" panose="02020603050405020304" pitchFamily="18" charset="0"/>
+                </a:rPr>
+                <a:t>utput NN</a:t>
+              </a:r>
+              <a:endParaRPr lang="en-US" sz="1600" dirty="0">
+                <a:latin typeface="Times New Roman" panose="02020603050405020304" pitchFamily="18" charset="0"/>
+                <a:cs typeface="Times New Roman" panose="02020603050405020304" pitchFamily="18" charset="0"/>
+              </a:endParaRPr>
+            </a:p>
+          </p:txBody>
+        </p:sp>
+        <p:sp>
+          <p:nvSpPr>
+            <p:cNvPr id="39" name="TextBox 38"/>
+            <p:cNvSpPr txBox="1"/>
+            <p:nvPr/>
+          </p:nvSpPr>
+          <p:spPr>
+            <a:xfrm>
+              <a:off x="5486400" y="5483123"/>
+              <a:ext cx="2289409" cy="338554"/>
+            </a:xfrm>
+            <a:prstGeom prst="rect">
+              <a:avLst/>
+            </a:prstGeom>
+            <a:noFill/>
+          </p:spPr>
+          <p:txBody>
+            <a:bodyPr wrap="none" rtlCol="0">
+              <a:spAutoFit/>
+            </a:bodyPr>
+            <a:lstStyle/>
+            <a:p>
+              <a:r>
+                <a:rPr lang="en-US" sz="1600" dirty="0" smtClean="0">
+                  <a:latin typeface="Times New Roman" panose="02020603050405020304" pitchFamily="18" charset="0"/>
+                  <a:cs typeface="Times New Roman" panose="02020603050405020304" pitchFamily="18" charset="0"/>
+                </a:rPr>
+                <a:t>NN with updated weights</a:t>
+              </a:r>
+              <a:endParaRPr lang="en-US" sz="1600" dirty="0">
                 <a:latin typeface="Times New Roman" panose="02020603050405020304" pitchFamily="18" charset="0"/>
                 <a:cs typeface="Times New Roman" panose="02020603050405020304" pitchFamily="18" charset="0"/>
               </a:endParaRPr>
@@ -17544,8 +17769,8 @@
             </a:p>
           </p:txBody>
         </p:sp>
-        <mc:AlternateContent xmlns:mc="http://schemas.openxmlformats.org/markup-compatibility/2006">
-          <mc:Choice xmlns:a14="http://schemas.microsoft.com/office/drawing/2010/main" Requires="a14">
+        <mc:AlternateContent xmlns:mc="http://schemas.openxmlformats.org/markup-compatibility/2006" xmlns:a14="http://schemas.microsoft.com/office/drawing/2010/main">
+          <mc:Choice Requires="a14">
             <p:sp>
               <p:nvSpPr>
                 <p:cNvPr id="421" name="TextBox 420"/>
@@ -17578,6 +17803,7 @@
                   </a:lvl1pPr>
                 </a:lstStyle>
                 <a:p>
+                  <a:pPr/>
                   <a14:m>
                     <m:oMathPara xmlns:m="http://schemas.openxmlformats.org/officeDocument/2006/math">
                       <m:oMathParaPr>
@@ -17587,18 +17813,24 @@
                         <m:sSub>
                           <m:sSubPr>
                             <m:ctrlPr>
-                              <a:rPr lang="en-US"/>
+                              <a:rPr lang="en-US" i="1">
+                                <a:latin typeface="Cambria Math" panose="02040503050406030204" pitchFamily="18" charset="0"/>
+                              </a:rPr>
                             </m:ctrlPr>
                           </m:sSubPr>
                           <m:e>
                             <m:r>
-                              <a:rPr lang="en-US"/>
+                              <a:rPr lang="en-US">
+                                <a:latin typeface="Cambria Math" panose="02040503050406030204" pitchFamily="18" charset="0"/>
+                              </a:rPr>
                               <m:t>𝛿</m:t>
                             </m:r>
                           </m:e>
                           <m:sub>
                             <m:r>
-                              <a:rPr lang="en-US"/>
+                              <a:rPr lang="en-US">
+                                <a:latin typeface="Cambria Math" panose="02040503050406030204" pitchFamily="18" charset="0"/>
+                              </a:rPr>
                               <m:t>10</m:t>
                             </m:r>
                           </m:sub>
@@ -17611,7 +17843,7 @@
               </p:txBody>
             </p:sp>
           </mc:Choice>
-          <mc:Fallback>
+          <mc:Fallback xmlns="">
             <p:sp>
               <p:nvSpPr>
                 <p:cNvPr id="421" name="TextBox 420"/>
@@ -17650,8 +17882,8 @@
             </p:sp>
           </mc:Fallback>
         </mc:AlternateContent>
-        <mc:AlternateContent xmlns:mc="http://schemas.openxmlformats.org/markup-compatibility/2006">
-          <mc:Choice xmlns:a14="http://schemas.microsoft.com/office/drawing/2010/main" Requires="a14">
+        <mc:AlternateContent xmlns:mc="http://schemas.openxmlformats.org/markup-compatibility/2006" xmlns:a14="http://schemas.microsoft.com/office/drawing/2010/main">
+          <mc:Choice Requires="a14">
             <p:sp>
               <p:nvSpPr>
                 <p:cNvPr id="420" name="TextBox 419"/>
@@ -17684,6 +17916,7 @@
                   </a:lvl1pPr>
                 </a:lstStyle>
                 <a:p>
+                  <a:pPr/>
                   <a14:m>
                     <m:oMathPara xmlns:m="http://schemas.openxmlformats.org/officeDocument/2006/math">
                       <m:oMathParaPr>
@@ -17693,18 +17926,24 @@
                         <m:sSub>
                           <m:sSubPr>
                             <m:ctrlPr>
-                              <a:rPr lang="en-US"/>
+                              <a:rPr lang="en-US" i="1">
+                                <a:latin typeface="Cambria Math" panose="02040503050406030204" pitchFamily="18" charset="0"/>
+                              </a:rPr>
                             </m:ctrlPr>
                           </m:sSubPr>
                           <m:e>
                             <m:r>
-                              <a:rPr lang="en-US"/>
+                              <a:rPr lang="en-US">
+                                <a:latin typeface="Cambria Math" panose="02040503050406030204" pitchFamily="18" charset="0"/>
+                              </a:rPr>
                               <m:t>𝛿</m:t>
                             </m:r>
                           </m:e>
                           <m:sub>
                             <m:r>
-                              <a:rPr lang="en-US"/>
+                              <a:rPr lang="en-US">
+                                <a:latin typeface="Cambria Math" panose="02040503050406030204" pitchFamily="18" charset="0"/>
+                              </a:rPr>
                               <m:t>1</m:t>
                             </m:r>
                           </m:sub>
@@ -17717,7 +17956,7 @@
               </p:txBody>
             </p:sp>
           </mc:Choice>
-          <mc:Fallback>
+          <mc:Fallback xmlns="">
             <p:sp>
               <p:nvSpPr>
                 <p:cNvPr id="420" name="TextBox 419"/>
@@ -17874,8 +18113,8 @@
             </a:p>
           </p:txBody>
         </p:sp>
-        <mc:AlternateContent xmlns:mc="http://schemas.openxmlformats.org/markup-compatibility/2006">
-          <mc:Choice xmlns:a14="http://schemas.microsoft.com/office/drawing/2010/main" Requires="a14">
+        <mc:AlternateContent xmlns:mc="http://schemas.openxmlformats.org/markup-compatibility/2006" xmlns:a14="http://schemas.microsoft.com/office/drawing/2010/main">
+          <mc:Choice Requires="a14">
             <p:sp>
               <p:nvSpPr>
                 <p:cNvPr id="203" name="Rectangle 202"/>
@@ -17934,11 +18173,11 @@
                         <m:sSub>
                           <m:sSubPr>
                             <m:ctrlPr>
-                              <a:rPr lang="en-US" sz="1600">
+                              <a:rPr lang="en-US" sz="1600" i="1">
                                 <a:solidFill>
                                   <a:schemeClr val="tx1"/>
                                 </a:solidFill>
-                                <a:latin typeface="Times New Roman" panose="02020603050405020304" pitchFamily="18" charset="0"/>
+                                <a:latin typeface="Cambria Math" panose="02040503050406030204" pitchFamily="18" charset="0"/>
                                 <a:cs typeface="Times New Roman" panose="02020603050405020304" pitchFamily="18" charset="0"/>
                               </a:rPr>
                             </m:ctrlPr>
@@ -17949,7 +18188,7 @@
                                 <a:solidFill>
                                   <a:schemeClr val="tx1"/>
                                 </a:solidFill>
-                                <a:latin typeface="Times New Roman" panose="02020603050405020304" pitchFamily="18" charset="0"/>
+                                <a:latin typeface="Cambria Math" panose="02040503050406030204" pitchFamily="18" charset="0"/>
                                 <a:cs typeface="Times New Roman" panose="02020603050405020304" pitchFamily="18" charset="0"/>
                               </a:rPr>
                               <m:t>𝑓</m:t>
@@ -17961,7 +18200,7 @@
                                 <a:solidFill>
                                   <a:schemeClr val="tx1"/>
                                 </a:solidFill>
-                                <a:latin typeface="Times New Roman" panose="02020603050405020304" pitchFamily="18" charset="0"/>
+                                <a:latin typeface="Cambria Math" panose="02040503050406030204" pitchFamily="18" charset="0"/>
                                 <a:cs typeface="Times New Roman" panose="02020603050405020304" pitchFamily="18" charset="0"/>
                               </a:rPr>
                               <m:t>1</m:t>
@@ -17971,11 +18210,11 @@
                         <m:d>
                           <m:dPr>
                             <m:ctrlPr>
-                              <a:rPr lang="en-US" sz="1600">
+                              <a:rPr lang="en-US" sz="1600" i="1">
                                 <a:solidFill>
                                   <a:schemeClr val="tx1"/>
                                 </a:solidFill>
-                                <a:latin typeface="Times New Roman" panose="02020603050405020304" pitchFamily="18" charset="0"/>
+                                <a:latin typeface="Cambria Math" panose="02040503050406030204" pitchFamily="18" charset="0"/>
                                 <a:cs typeface="Times New Roman" panose="02020603050405020304" pitchFamily="18" charset="0"/>
                               </a:rPr>
                             </m:ctrlPr>
@@ -17986,7 +18225,7 @@
                                 <a:solidFill>
                                   <a:schemeClr val="tx1"/>
                                 </a:solidFill>
-                                <a:latin typeface="Times New Roman" panose="02020603050405020304" pitchFamily="18" charset="0"/>
+                                <a:latin typeface="Cambria Math" panose="02040503050406030204" pitchFamily="18" charset="0"/>
                                 <a:cs typeface="Times New Roman" panose="02020603050405020304" pitchFamily="18" charset="0"/>
                               </a:rPr>
                               <m:t>∙</m:t>
@@ -18007,7 +18246,7 @@
               </p:txBody>
             </p:sp>
           </mc:Choice>
-          <mc:Fallback>
+          <mc:Fallback xmlns="">
             <p:sp>
               <p:nvSpPr>
                 <p:cNvPr id="203" name="Rectangle 202"/>
@@ -18051,8 +18290,8 @@
             </p:sp>
           </mc:Fallback>
         </mc:AlternateContent>
-        <mc:AlternateContent xmlns:mc="http://schemas.openxmlformats.org/markup-compatibility/2006">
-          <mc:Choice xmlns:a14="http://schemas.microsoft.com/office/drawing/2010/main" Requires="a14">
+        <mc:AlternateContent xmlns:mc="http://schemas.openxmlformats.org/markup-compatibility/2006" xmlns:a14="http://schemas.microsoft.com/office/drawing/2010/main">
+          <mc:Choice Requires="a14">
             <p:sp>
               <p:nvSpPr>
                 <p:cNvPr id="204" name="Rectangle 203"/>
@@ -18111,11 +18350,11 @@
                         <m:sSub>
                           <m:sSubPr>
                             <m:ctrlPr>
-                              <a:rPr lang="en-US" sz="1600">
+                              <a:rPr lang="en-US" sz="1600" i="1">
                                 <a:solidFill>
                                   <a:schemeClr val="tx1"/>
                                 </a:solidFill>
-                                <a:latin typeface="Times New Roman" panose="02020603050405020304" pitchFamily="18" charset="0"/>
+                                <a:latin typeface="Cambria Math" panose="02040503050406030204" pitchFamily="18" charset="0"/>
                                 <a:cs typeface="Times New Roman" panose="02020603050405020304" pitchFamily="18" charset="0"/>
                               </a:rPr>
                             </m:ctrlPr>
@@ -18126,7 +18365,7 @@
                                 <a:solidFill>
                                   <a:schemeClr val="tx1"/>
                                 </a:solidFill>
-                                <a:latin typeface="Times New Roman" panose="02020603050405020304" pitchFamily="18" charset="0"/>
+                                <a:latin typeface="Cambria Math" panose="02040503050406030204" pitchFamily="18" charset="0"/>
                                 <a:cs typeface="Times New Roman" panose="02020603050405020304" pitchFamily="18" charset="0"/>
                               </a:rPr>
                               <m:t>𝑓</m:t>
@@ -18138,7 +18377,7 @@
                                 <a:solidFill>
                                   <a:schemeClr val="tx1"/>
                                 </a:solidFill>
-                                <a:latin typeface="Times New Roman" panose="02020603050405020304" pitchFamily="18" charset="0"/>
+                                <a:latin typeface="Cambria Math" panose="02040503050406030204" pitchFamily="18" charset="0"/>
                                 <a:cs typeface="Times New Roman" panose="02020603050405020304" pitchFamily="18" charset="0"/>
                               </a:rPr>
                               <m:t>1</m:t>
@@ -18148,11 +18387,11 @@
                         <m:d>
                           <m:dPr>
                             <m:ctrlPr>
-                              <a:rPr lang="en-US" sz="1600">
+                              <a:rPr lang="en-US" sz="1600" i="1">
                                 <a:solidFill>
                                   <a:schemeClr val="tx1"/>
                                 </a:solidFill>
-                                <a:latin typeface="Times New Roman" panose="02020603050405020304" pitchFamily="18" charset="0"/>
+                                <a:latin typeface="Cambria Math" panose="02040503050406030204" pitchFamily="18" charset="0"/>
                                 <a:cs typeface="Times New Roman" panose="02020603050405020304" pitchFamily="18" charset="0"/>
                               </a:rPr>
                             </m:ctrlPr>
@@ -18163,7 +18402,7 @@
                                 <a:solidFill>
                                   <a:schemeClr val="tx1"/>
                                 </a:solidFill>
-                                <a:latin typeface="Times New Roman" panose="02020603050405020304" pitchFamily="18" charset="0"/>
+                                <a:latin typeface="Cambria Math" panose="02040503050406030204" pitchFamily="18" charset="0"/>
                                 <a:cs typeface="Times New Roman" panose="02020603050405020304" pitchFamily="18" charset="0"/>
                               </a:rPr>
                               <m:t>∙</m:t>
@@ -18184,7 +18423,7 @@
               </p:txBody>
             </p:sp>
           </mc:Choice>
-          <mc:Fallback>
+          <mc:Fallback xmlns="">
             <p:sp>
               <p:nvSpPr>
                 <p:cNvPr id="204" name="Rectangle 203"/>
@@ -18228,8 +18467,8 @@
             </p:sp>
           </mc:Fallback>
         </mc:AlternateContent>
-        <mc:AlternateContent xmlns:mc="http://schemas.openxmlformats.org/markup-compatibility/2006">
-          <mc:Choice xmlns:a14="http://schemas.microsoft.com/office/drawing/2010/main" Requires="a14">
+        <mc:AlternateContent xmlns:mc="http://schemas.openxmlformats.org/markup-compatibility/2006" xmlns:a14="http://schemas.microsoft.com/office/drawing/2010/main">
+          <mc:Choice Requires="a14">
             <p:sp>
               <p:nvSpPr>
                 <p:cNvPr id="207" name="Oval 206"/>
@@ -18293,7 +18532,7 @@
                             <a:solidFill>
                               <a:schemeClr val="tx1"/>
                             </a:solidFill>
-                            <a:latin typeface="Times New Roman" panose="02020603050405020304" pitchFamily="18" charset="0"/>
+                            <a:latin typeface="Cambria Math" panose="02040503050406030204" pitchFamily="18" charset="0"/>
                             <a:cs typeface="Times New Roman" panose="02020603050405020304" pitchFamily="18" charset="0"/>
                           </a:rPr>
                           <m:t>Σ</m:t>
@@ -18312,7 +18551,7 @@
               </p:txBody>
             </p:sp>
           </mc:Choice>
-          <mc:Fallback>
+          <mc:Fallback xmlns="">
             <p:sp>
               <p:nvSpPr>
                 <p:cNvPr id="207" name="Oval 206"/>
@@ -18441,8 +18680,8 @@
             </a:fontRef>
           </p:style>
         </p:cxnSp>
-        <mc:AlternateContent xmlns:mc="http://schemas.openxmlformats.org/markup-compatibility/2006">
-          <mc:Choice xmlns:a14="http://schemas.microsoft.com/office/drawing/2010/main" Requires="a14">
+        <mc:AlternateContent xmlns:mc="http://schemas.openxmlformats.org/markup-compatibility/2006" xmlns:a14="http://schemas.microsoft.com/office/drawing/2010/main">
+          <mc:Choice Requires="a14">
             <p:sp>
               <p:nvSpPr>
                 <p:cNvPr id="212" name="Oval 211"/>
@@ -18506,7 +18745,7 @@
                             <a:solidFill>
                               <a:schemeClr val="tx1"/>
                             </a:solidFill>
-                            <a:latin typeface="Times New Roman" panose="02020603050405020304" pitchFamily="18" charset="0"/>
+                            <a:latin typeface="Cambria Math" panose="02040503050406030204" pitchFamily="18" charset="0"/>
                             <a:cs typeface="Times New Roman" panose="02020603050405020304" pitchFamily="18" charset="0"/>
                           </a:rPr>
                           <m:t>Σ</m:t>
@@ -18525,7 +18764,7 @@
               </p:txBody>
             </p:sp>
           </mc:Choice>
-          <mc:Fallback>
+          <mc:Fallback xmlns="">
             <p:sp>
               <p:nvSpPr>
                 <p:cNvPr id="212" name="Oval 211"/>
@@ -18603,11 +18842,7 @@
             <a:p>
               <a:r>
                 <a:rPr lang="en-US" dirty="0"/>
-                <a:t>n</a:t>
-              </a:r>
-              <a:r>
-                <a:rPr lang="en-US" dirty="0"/>
-                <a:t>euron</a:t>
+                <a:t>neuron</a:t>
               </a:r>
               <a:br>
                 <a:rPr lang="en-US" dirty="0"/>
@@ -18616,12 +18851,11 @@
                 <a:rPr lang="en-US" dirty="0"/>
                 <a:t>abs-layer</a:t>
               </a:r>
-              <a:endParaRPr lang="en-US" dirty="0"/>
             </a:p>
           </p:txBody>
         </p:sp>
-        <mc:AlternateContent xmlns:mc="http://schemas.openxmlformats.org/markup-compatibility/2006">
-          <mc:Choice xmlns:a14="http://schemas.microsoft.com/office/drawing/2010/main" Requires="a14">
+        <mc:AlternateContent xmlns:mc="http://schemas.openxmlformats.org/markup-compatibility/2006" xmlns:a14="http://schemas.microsoft.com/office/drawing/2010/main">
+          <mc:Choice Requires="a14">
             <p:sp>
               <p:nvSpPr>
                 <p:cNvPr id="225" name="Rectangle 224"/>
@@ -18680,11 +18914,11 @@
                         <m:sSub>
                           <m:sSubPr>
                             <m:ctrlPr>
-                              <a:rPr lang="en-US" sz="1600">
+                              <a:rPr lang="en-US" sz="1600" i="1">
                                 <a:solidFill>
                                   <a:schemeClr val="tx1"/>
                                 </a:solidFill>
-                                <a:latin typeface="Times New Roman" panose="02020603050405020304" pitchFamily="18" charset="0"/>
+                                <a:latin typeface="Cambria Math" panose="02040503050406030204" pitchFamily="18" charset="0"/>
                                 <a:cs typeface="Times New Roman" panose="02020603050405020304" pitchFamily="18" charset="0"/>
                               </a:rPr>
                             </m:ctrlPr>
@@ -18695,7 +18929,7 @@
                                 <a:solidFill>
                                   <a:schemeClr val="tx1"/>
                                 </a:solidFill>
-                                <a:latin typeface="Times New Roman" panose="02020603050405020304" pitchFamily="18" charset="0"/>
+                                <a:latin typeface="Cambria Math" panose="02040503050406030204" pitchFamily="18" charset="0"/>
                                 <a:cs typeface="Times New Roman" panose="02020603050405020304" pitchFamily="18" charset="0"/>
                               </a:rPr>
                               <m:t>𝑓</m:t>
@@ -18707,7 +18941,7 @@
                                 <a:solidFill>
                                   <a:schemeClr val="tx1"/>
                                 </a:solidFill>
-                                <a:latin typeface="Times New Roman" panose="02020603050405020304" pitchFamily="18" charset="0"/>
+                                <a:latin typeface="Cambria Math" panose="02040503050406030204" pitchFamily="18" charset="0"/>
                                 <a:cs typeface="Times New Roman" panose="02020603050405020304" pitchFamily="18" charset="0"/>
                               </a:rPr>
                               <m:t>10</m:t>
@@ -18717,11 +18951,11 @@
                         <m:d>
                           <m:dPr>
                             <m:ctrlPr>
-                              <a:rPr lang="en-US" sz="1600">
+                              <a:rPr lang="en-US" sz="1600" i="1">
                                 <a:solidFill>
                                   <a:schemeClr val="tx1"/>
                                 </a:solidFill>
-                                <a:latin typeface="Times New Roman" panose="02020603050405020304" pitchFamily="18" charset="0"/>
+                                <a:latin typeface="Cambria Math" panose="02040503050406030204" pitchFamily="18" charset="0"/>
                                 <a:cs typeface="Times New Roman" panose="02020603050405020304" pitchFamily="18" charset="0"/>
                               </a:rPr>
                             </m:ctrlPr>
@@ -18732,7 +18966,7 @@
                                 <a:solidFill>
                                   <a:schemeClr val="tx1"/>
                                 </a:solidFill>
-                                <a:latin typeface="Times New Roman" panose="02020603050405020304" pitchFamily="18" charset="0"/>
+                                <a:latin typeface="Cambria Math" panose="02040503050406030204" pitchFamily="18" charset="0"/>
                                 <a:cs typeface="Times New Roman" panose="02020603050405020304" pitchFamily="18" charset="0"/>
                               </a:rPr>
                               <m:t>∙</m:t>
@@ -18753,7 +18987,7 @@
               </p:txBody>
             </p:sp>
           </mc:Choice>
-          <mc:Fallback>
+          <mc:Fallback xmlns="">
             <p:sp>
               <p:nvSpPr>
                 <p:cNvPr id="225" name="Rectangle 224"/>
@@ -18797,8 +19031,8 @@
             </p:sp>
           </mc:Fallback>
         </mc:AlternateContent>
-        <mc:AlternateContent xmlns:mc="http://schemas.openxmlformats.org/markup-compatibility/2006">
-          <mc:Choice xmlns:a14="http://schemas.microsoft.com/office/drawing/2010/main" Requires="a14">
+        <mc:AlternateContent xmlns:mc="http://schemas.openxmlformats.org/markup-compatibility/2006" xmlns:a14="http://schemas.microsoft.com/office/drawing/2010/main">
+          <mc:Choice Requires="a14">
             <p:sp>
               <p:nvSpPr>
                 <p:cNvPr id="226" name="Rectangle 225"/>
@@ -18857,11 +19091,11 @@
                         <m:sSub>
                           <m:sSubPr>
                             <m:ctrlPr>
-                              <a:rPr lang="en-US" sz="1600">
+                              <a:rPr lang="en-US" sz="1600" i="1">
                                 <a:solidFill>
                                   <a:schemeClr val="tx1"/>
                                 </a:solidFill>
-                                <a:latin typeface="Times New Roman" panose="02020603050405020304" pitchFamily="18" charset="0"/>
+                                <a:latin typeface="Cambria Math" panose="02040503050406030204" pitchFamily="18" charset="0"/>
                                 <a:cs typeface="Times New Roman" panose="02020603050405020304" pitchFamily="18" charset="0"/>
                               </a:rPr>
                             </m:ctrlPr>
@@ -18872,7 +19106,7 @@
                                 <a:solidFill>
                                   <a:schemeClr val="tx1"/>
                                 </a:solidFill>
-                                <a:latin typeface="Times New Roman" panose="02020603050405020304" pitchFamily="18" charset="0"/>
+                                <a:latin typeface="Cambria Math" panose="02040503050406030204" pitchFamily="18" charset="0"/>
                                 <a:cs typeface="Times New Roman" panose="02020603050405020304" pitchFamily="18" charset="0"/>
                               </a:rPr>
                               <m:t>𝑓</m:t>
@@ -18884,7 +19118,7 @@
                                 <a:solidFill>
                                   <a:schemeClr val="tx1"/>
                                 </a:solidFill>
-                                <a:latin typeface="Times New Roman" panose="02020603050405020304" pitchFamily="18" charset="0"/>
+                                <a:latin typeface="Cambria Math" panose="02040503050406030204" pitchFamily="18" charset="0"/>
                                 <a:cs typeface="Times New Roman" panose="02020603050405020304" pitchFamily="18" charset="0"/>
                               </a:rPr>
                               <m:t>10</m:t>
@@ -18894,11 +19128,11 @@
                         <m:d>
                           <m:dPr>
                             <m:ctrlPr>
-                              <a:rPr lang="en-US" sz="1600">
+                              <a:rPr lang="en-US" sz="1600" i="1">
                                 <a:solidFill>
                                   <a:schemeClr val="tx1"/>
                                 </a:solidFill>
-                                <a:latin typeface="Times New Roman" panose="02020603050405020304" pitchFamily="18" charset="0"/>
+                                <a:latin typeface="Cambria Math" panose="02040503050406030204" pitchFamily="18" charset="0"/>
                                 <a:cs typeface="Times New Roman" panose="02020603050405020304" pitchFamily="18" charset="0"/>
                               </a:rPr>
                             </m:ctrlPr>
@@ -18909,7 +19143,7 @@
                                 <a:solidFill>
                                   <a:schemeClr val="tx1"/>
                                 </a:solidFill>
-                                <a:latin typeface="Times New Roman" panose="02020603050405020304" pitchFamily="18" charset="0"/>
+                                <a:latin typeface="Cambria Math" panose="02040503050406030204" pitchFamily="18" charset="0"/>
                                 <a:cs typeface="Times New Roman" panose="02020603050405020304" pitchFamily="18" charset="0"/>
                               </a:rPr>
                               <m:t>∙</m:t>
@@ -18930,7 +19164,7 @@
               </p:txBody>
             </p:sp>
           </mc:Choice>
-          <mc:Fallback>
+          <mc:Fallback xmlns="">
             <p:sp>
               <p:nvSpPr>
                 <p:cNvPr id="226" name="Rectangle 225"/>
@@ -19008,11 +19242,7 @@
             <a:p>
               <a:r>
                 <a:rPr lang="en-US" dirty="0"/>
-                <a:t>w</a:t>
-              </a:r>
-              <a:r>
-                <a:rPr lang="en-US" dirty="0"/>
-                <a:t>eight</a:t>
+                <a:t>weight</a:t>
               </a:r>
               <a:br>
                 <a:rPr lang="en-US" dirty="0"/>
@@ -19021,12 +19251,11 @@
                 <a:rPr lang="en-US" dirty="0"/>
                 <a:t>abs-layer</a:t>
               </a:r>
-              <a:endParaRPr lang="en-US" dirty="0"/>
             </a:p>
           </p:txBody>
         </p:sp>
-        <mc:AlternateContent xmlns:mc="http://schemas.openxmlformats.org/markup-compatibility/2006">
-          <mc:Choice xmlns:a14="http://schemas.microsoft.com/office/drawing/2010/main" Requires="a14">
+        <mc:AlternateContent xmlns:mc="http://schemas.openxmlformats.org/markup-compatibility/2006" xmlns:a14="http://schemas.microsoft.com/office/drawing/2010/main">
+          <mc:Choice Requires="a14">
             <p:sp>
               <p:nvSpPr>
                 <p:cNvPr id="303" name="Rectangle 302"/>
@@ -19085,11 +19314,11 @@
                         <m:sSub>
                           <m:sSubPr>
                             <m:ctrlPr>
-                              <a:rPr lang="en-US" sz="1600">
+                              <a:rPr lang="en-US" sz="1600" i="1">
                                 <a:solidFill>
                                   <a:schemeClr val="tx1"/>
                                 </a:solidFill>
-                                <a:latin typeface="Times New Roman" panose="02020603050405020304" pitchFamily="18" charset="0"/>
+                                <a:latin typeface="Cambria Math" panose="02040503050406030204" pitchFamily="18" charset="0"/>
                                 <a:cs typeface="Times New Roman" panose="02020603050405020304" pitchFamily="18" charset="0"/>
                               </a:rPr>
                             </m:ctrlPr>
@@ -19100,7 +19329,7 @@
                                 <a:solidFill>
                                   <a:schemeClr val="tx1"/>
                                 </a:solidFill>
-                                <a:latin typeface="Times New Roman" panose="02020603050405020304" pitchFamily="18" charset="0"/>
+                                <a:latin typeface="Cambria Math" panose="02040503050406030204" pitchFamily="18" charset="0"/>
                                 <a:cs typeface="Times New Roman" panose="02020603050405020304" pitchFamily="18" charset="0"/>
                               </a:rPr>
                               <m:t>𝑓</m:t>
@@ -19112,7 +19341,7 @@
                                 <a:solidFill>
                                   <a:schemeClr val="tx1"/>
                                 </a:solidFill>
-                                <a:latin typeface="Times New Roman" panose="02020603050405020304" pitchFamily="18" charset="0"/>
+                                <a:latin typeface="Cambria Math" panose="02040503050406030204" pitchFamily="18" charset="0"/>
                                 <a:cs typeface="Times New Roman" panose="02020603050405020304" pitchFamily="18" charset="0"/>
                               </a:rPr>
                               <m:t>10</m:t>
@@ -19122,11 +19351,11 @@
                         <m:d>
                           <m:dPr>
                             <m:ctrlPr>
-                              <a:rPr lang="en-US" sz="1600">
+                              <a:rPr lang="en-US" sz="1600" i="1">
                                 <a:solidFill>
                                   <a:schemeClr val="tx1"/>
                                 </a:solidFill>
-                                <a:latin typeface="Times New Roman" panose="02020603050405020304" pitchFamily="18" charset="0"/>
+                                <a:latin typeface="Cambria Math" panose="02040503050406030204" pitchFamily="18" charset="0"/>
                                 <a:cs typeface="Times New Roman" panose="02020603050405020304" pitchFamily="18" charset="0"/>
                               </a:rPr>
                             </m:ctrlPr>
@@ -19137,7 +19366,7 @@
                                 <a:solidFill>
                                   <a:schemeClr val="tx1"/>
                                 </a:solidFill>
-                                <a:latin typeface="Times New Roman" panose="02020603050405020304" pitchFamily="18" charset="0"/>
+                                <a:latin typeface="Cambria Math" panose="02040503050406030204" pitchFamily="18" charset="0"/>
                                 <a:cs typeface="Times New Roman" panose="02020603050405020304" pitchFamily="18" charset="0"/>
                               </a:rPr>
                               <m:t>∙</m:t>
@@ -19158,7 +19387,7 @@
               </p:txBody>
             </p:sp>
           </mc:Choice>
-          <mc:Fallback>
+          <mc:Fallback xmlns="">
             <p:sp>
               <p:nvSpPr>
                 <p:cNvPr id="303" name="Rectangle 302"/>
@@ -19202,8 +19431,8 @@
             </p:sp>
           </mc:Fallback>
         </mc:AlternateContent>
-        <mc:AlternateContent xmlns:mc="http://schemas.openxmlformats.org/markup-compatibility/2006">
-          <mc:Choice xmlns:a14="http://schemas.microsoft.com/office/drawing/2010/main" Requires="a14">
+        <mc:AlternateContent xmlns:mc="http://schemas.openxmlformats.org/markup-compatibility/2006" xmlns:a14="http://schemas.microsoft.com/office/drawing/2010/main">
+          <mc:Choice Requires="a14">
             <p:sp>
               <p:nvSpPr>
                 <p:cNvPr id="304" name="Rectangle 303"/>
@@ -19262,11 +19491,11 @@
                         <m:sSub>
                           <m:sSubPr>
                             <m:ctrlPr>
-                              <a:rPr lang="en-US" sz="1600">
+                              <a:rPr lang="en-US" sz="1600" i="1">
                                 <a:solidFill>
                                   <a:schemeClr val="tx1"/>
                                 </a:solidFill>
-                                <a:latin typeface="Times New Roman" panose="02020603050405020304" pitchFamily="18" charset="0"/>
+                                <a:latin typeface="Cambria Math" panose="02040503050406030204" pitchFamily="18" charset="0"/>
                                 <a:cs typeface="Times New Roman" panose="02020603050405020304" pitchFamily="18" charset="0"/>
                               </a:rPr>
                             </m:ctrlPr>
@@ -19277,7 +19506,7 @@
                                 <a:solidFill>
                                   <a:schemeClr val="tx1"/>
                                 </a:solidFill>
-                                <a:latin typeface="Times New Roman" panose="02020603050405020304" pitchFamily="18" charset="0"/>
+                                <a:latin typeface="Cambria Math" panose="02040503050406030204" pitchFamily="18" charset="0"/>
                                 <a:cs typeface="Times New Roman" panose="02020603050405020304" pitchFamily="18" charset="0"/>
                               </a:rPr>
                               <m:t>𝑓</m:t>
@@ -19289,7 +19518,7 @@
                                 <a:solidFill>
                                   <a:schemeClr val="tx1"/>
                                 </a:solidFill>
-                                <a:latin typeface="Times New Roman" panose="02020603050405020304" pitchFamily="18" charset="0"/>
+                                <a:latin typeface="Cambria Math" panose="02040503050406030204" pitchFamily="18" charset="0"/>
                                 <a:cs typeface="Times New Roman" panose="02020603050405020304" pitchFamily="18" charset="0"/>
                               </a:rPr>
                               <m:t>10</m:t>
@@ -19299,11 +19528,11 @@
                         <m:d>
                           <m:dPr>
                             <m:ctrlPr>
-                              <a:rPr lang="en-US" sz="1600">
+                              <a:rPr lang="en-US" sz="1600" i="1">
                                 <a:solidFill>
                                   <a:schemeClr val="tx1"/>
                                 </a:solidFill>
-                                <a:latin typeface="Times New Roman" panose="02020603050405020304" pitchFamily="18" charset="0"/>
+                                <a:latin typeface="Cambria Math" panose="02040503050406030204" pitchFamily="18" charset="0"/>
                                 <a:cs typeface="Times New Roman" panose="02020603050405020304" pitchFamily="18" charset="0"/>
                               </a:rPr>
                             </m:ctrlPr>
@@ -19314,7 +19543,7 @@
                                 <a:solidFill>
                                   <a:schemeClr val="tx1"/>
                                 </a:solidFill>
-                                <a:latin typeface="Times New Roman" panose="02020603050405020304" pitchFamily="18" charset="0"/>
+                                <a:latin typeface="Cambria Math" panose="02040503050406030204" pitchFamily="18" charset="0"/>
                                 <a:cs typeface="Times New Roman" panose="02020603050405020304" pitchFamily="18" charset="0"/>
                               </a:rPr>
                               <m:t>∙</m:t>
@@ -19335,7 +19564,7 @@
               </p:txBody>
             </p:sp>
           </mc:Choice>
-          <mc:Fallback>
+          <mc:Fallback xmlns="">
             <p:sp>
               <p:nvSpPr>
                 <p:cNvPr id="304" name="Rectangle 303"/>
@@ -19438,8 +19667,8 @@
             </a:p>
           </p:txBody>
         </p:sp>
-        <mc:AlternateContent xmlns:mc="http://schemas.openxmlformats.org/markup-compatibility/2006">
-          <mc:Choice xmlns:a14="http://schemas.microsoft.com/office/drawing/2010/main" Requires="a14">
+        <mc:AlternateContent xmlns:mc="http://schemas.openxmlformats.org/markup-compatibility/2006" xmlns:a14="http://schemas.microsoft.com/office/drawing/2010/main">
+          <mc:Choice Requires="a14">
             <p:sp>
               <p:nvSpPr>
                 <p:cNvPr id="323" name="Rectangle 322"/>
@@ -19498,11 +19727,11 @@
                         <m:sSub>
                           <m:sSubPr>
                             <m:ctrlPr>
-                              <a:rPr lang="en-US" sz="1600">
+                              <a:rPr lang="en-US" sz="1600" i="1">
                                 <a:solidFill>
                                   <a:schemeClr val="tx1"/>
                                 </a:solidFill>
-                                <a:latin typeface="Times New Roman" panose="02020603050405020304" pitchFamily="18" charset="0"/>
+                                <a:latin typeface="Cambria Math" panose="02040503050406030204" pitchFamily="18" charset="0"/>
                                 <a:cs typeface="Times New Roman" panose="02020603050405020304" pitchFamily="18" charset="0"/>
                               </a:rPr>
                             </m:ctrlPr>
@@ -19513,7 +19742,7 @@
                                 <a:solidFill>
                                   <a:schemeClr val="tx1"/>
                                 </a:solidFill>
-                                <a:latin typeface="Times New Roman" panose="02020603050405020304" pitchFamily="18" charset="0"/>
+                                <a:latin typeface="Cambria Math" panose="02040503050406030204" pitchFamily="18" charset="0"/>
                                 <a:cs typeface="Times New Roman" panose="02020603050405020304" pitchFamily="18" charset="0"/>
                               </a:rPr>
                               <m:t>𝑓</m:t>
@@ -19525,7 +19754,7 @@
                                 <a:solidFill>
                                   <a:schemeClr val="tx1"/>
                                 </a:solidFill>
-                                <a:latin typeface="Times New Roman" panose="02020603050405020304" pitchFamily="18" charset="0"/>
+                                <a:latin typeface="Cambria Math" panose="02040503050406030204" pitchFamily="18" charset="0"/>
                                 <a:cs typeface="Times New Roman" panose="02020603050405020304" pitchFamily="18" charset="0"/>
                               </a:rPr>
                               <m:t>𝑡</m:t>
@@ -19535,11 +19764,11 @@
                         <m:d>
                           <m:dPr>
                             <m:ctrlPr>
-                              <a:rPr lang="en-US" sz="1600">
+                              <a:rPr lang="en-US" sz="1600" i="1">
                                 <a:solidFill>
                                   <a:schemeClr val="tx1"/>
                                 </a:solidFill>
-                                <a:latin typeface="Times New Roman" panose="02020603050405020304" pitchFamily="18" charset="0"/>
+                                <a:latin typeface="Cambria Math" panose="02040503050406030204" pitchFamily="18" charset="0"/>
                                 <a:cs typeface="Times New Roman" panose="02020603050405020304" pitchFamily="18" charset="0"/>
                               </a:rPr>
                             </m:ctrlPr>
@@ -19550,7 +19779,7 @@
                                 <a:solidFill>
                                   <a:schemeClr val="tx1"/>
                                 </a:solidFill>
-                                <a:latin typeface="Times New Roman" panose="02020603050405020304" pitchFamily="18" charset="0"/>
+                                <a:latin typeface="Cambria Math" panose="02040503050406030204" pitchFamily="18" charset="0"/>
                                 <a:cs typeface="Times New Roman" panose="02020603050405020304" pitchFamily="18" charset="0"/>
                               </a:rPr>
                               <m:t>∙</m:t>
@@ -19571,7 +19800,7 @@
               </p:txBody>
             </p:sp>
           </mc:Choice>
-          <mc:Fallback>
+          <mc:Fallback xmlns="">
             <p:sp>
               <p:nvSpPr>
                 <p:cNvPr id="323" name="Rectangle 322"/>
@@ -19615,8 +19844,8 @@
             </p:sp>
           </mc:Fallback>
         </mc:AlternateContent>
-        <mc:AlternateContent xmlns:mc="http://schemas.openxmlformats.org/markup-compatibility/2006">
-          <mc:Choice xmlns:a14="http://schemas.microsoft.com/office/drawing/2010/main" Requires="a14">
+        <mc:AlternateContent xmlns:mc="http://schemas.openxmlformats.org/markup-compatibility/2006" xmlns:a14="http://schemas.microsoft.com/office/drawing/2010/main">
+          <mc:Choice Requires="a14">
             <p:sp>
               <p:nvSpPr>
                 <p:cNvPr id="324" name="Rectangle 323"/>
@@ -19675,11 +19904,11 @@
                         <m:sSub>
                           <m:sSubPr>
                             <m:ctrlPr>
-                              <a:rPr lang="en-US" sz="1600">
+                              <a:rPr lang="en-US" sz="1600" i="1">
                                 <a:solidFill>
                                   <a:schemeClr val="tx1"/>
                                 </a:solidFill>
-                                <a:latin typeface="Times New Roman" panose="02020603050405020304" pitchFamily="18" charset="0"/>
+                                <a:latin typeface="Cambria Math" panose="02040503050406030204" pitchFamily="18" charset="0"/>
                                 <a:cs typeface="Times New Roman" panose="02020603050405020304" pitchFamily="18" charset="0"/>
                               </a:rPr>
                             </m:ctrlPr>
@@ -19690,7 +19919,7 @@
                                 <a:solidFill>
                                   <a:schemeClr val="tx1"/>
                                 </a:solidFill>
-                                <a:latin typeface="Times New Roman" panose="02020603050405020304" pitchFamily="18" charset="0"/>
+                                <a:latin typeface="Cambria Math" panose="02040503050406030204" pitchFamily="18" charset="0"/>
                                 <a:cs typeface="Times New Roman" panose="02020603050405020304" pitchFamily="18" charset="0"/>
                               </a:rPr>
                               <m:t>𝑓</m:t>
@@ -19702,7 +19931,7 @@
                                 <a:solidFill>
                                   <a:schemeClr val="tx1"/>
                                 </a:solidFill>
-                                <a:latin typeface="Times New Roman" panose="02020603050405020304" pitchFamily="18" charset="0"/>
+                                <a:latin typeface="Cambria Math" panose="02040503050406030204" pitchFamily="18" charset="0"/>
                                 <a:cs typeface="Times New Roman" panose="02020603050405020304" pitchFamily="18" charset="0"/>
                               </a:rPr>
                               <m:t>𝑡</m:t>
@@ -19712,11 +19941,11 @@
                         <m:d>
                           <m:dPr>
                             <m:ctrlPr>
-                              <a:rPr lang="en-US" sz="1600">
+                              <a:rPr lang="en-US" sz="1600" i="1">
                                 <a:solidFill>
                                   <a:schemeClr val="tx1"/>
                                 </a:solidFill>
-                                <a:latin typeface="Times New Roman" panose="02020603050405020304" pitchFamily="18" charset="0"/>
+                                <a:latin typeface="Cambria Math" panose="02040503050406030204" pitchFamily="18" charset="0"/>
                                 <a:cs typeface="Times New Roman" panose="02020603050405020304" pitchFamily="18" charset="0"/>
                               </a:rPr>
                             </m:ctrlPr>
@@ -19727,7 +19956,7 @@
                                 <a:solidFill>
                                   <a:schemeClr val="tx1"/>
                                 </a:solidFill>
-                                <a:latin typeface="Times New Roman" panose="02020603050405020304" pitchFamily="18" charset="0"/>
+                                <a:latin typeface="Cambria Math" panose="02040503050406030204" pitchFamily="18" charset="0"/>
                                 <a:cs typeface="Times New Roman" panose="02020603050405020304" pitchFamily="18" charset="0"/>
                               </a:rPr>
                               <m:t>∙</m:t>
@@ -19748,7 +19977,7 @@
               </p:txBody>
             </p:sp>
           </mc:Choice>
-          <mc:Fallback>
+          <mc:Fallback xmlns="">
             <p:sp>
               <p:nvSpPr>
                 <p:cNvPr id="324" name="Rectangle 323"/>
@@ -19826,15 +20055,7 @@
             <a:p>
               <a:r>
                 <a:rPr lang="en-US" dirty="0"/>
-                <a:t>target</a:t>
-              </a:r>
-              <a:r>
-                <a:rPr lang="en-US" dirty="0"/>
-                <a:t> </a:t>
-              </a:r>
-              <a:r>
-                <a:rPr lang="en-US" dirty="0"/>
-                <a:t>node</a:t>
+                <a:t>target node</a:t>
               </a:r>
               <a:br>
                 <a:rPr lang="en-US" dirty="0"/>
@@ -19843,7 +20064,6 @@
                 <a:rPr lang="en-US" dirty="0"/>
                 <a:t>abs-layer</a:t>
               </a:r>
-              <a:endParaRPr lang="en-US" dirty="0"/>
             </a:p>
           </p:txBody>
         </p:sp>
@@ -19906,8 +20126,8 @@
             </a:p>
           </p:txBody>
         </p:sp>
-        <mc:AlternateContent xmlns:mc="http://schemas.openxmlformats.org/markup-compatibility/2006">
-          <mc:Choice xmlns:a14="http://schemas.microsoft.com/office/drawing/2010/main" Requires="a14">
+        <mc:AlternateContent xmlns:mc="http://schemas.openxmlformats.org/markup-compatibility/2006" xmlns:a14="http://schemas.microsoft.com/office/drawing/2010/main">
+          <mc:Choice Requires="a14">
             <p:sp>
               <p:nvSpPr>
                 <p:cNvPr id="331" name="Rectangle 330"/>
@@ -19966,11 +20186,11 @@
                         <m:sSub>
                           <m:sSubPr>
                             <m:ctrlPr>
-                              <a:rPr lang="en-US" sz="1600">
+                              <a:rPr lang="en-US" sz="1600" i="1">
                                 <a:solidFill>
                                   <a:schemeClr val="tx1"/>
                                 </a:solidFill>
-                                <a:latin typeface="Times New Roman" panose="02020603050405020304" pitchFamily="18" charset="0"/>
+                                <a:latin typeface="Cambria Math" panose="02040503050406030204" pitchFamily="18" charset="0"/>
                                 <a:cs typeface="Times New Roman" panose="02020603050405020304" pitchFamily="18" charset="0"/>
                               </a:rPr>
                             </m:ctrlPr>
@@ -19981,7 +20201,7 @@
                                 <a:solidFill>
                                   <a:schemeClr val="tx1"/>
                                 </a:solidFill>
-                                <a:latin typeface="Times New Roman" panose="02020603050405020304" pitchFamily="18" charset="0"/>
+                                <a:latin typeface="Cambria Math" panose="02040503050406030204" pitchFamily="18" charset="0"/>
                                 <a:cs typeface="Times New Roman" panose="02020603050405020304" pitchFamily="18" charset="0"/>
                               </a:rPr>
                               <m:t>𝑓</m:t>
@@ -19993,7 +20213,7 @@
                                 <a:solidFill>
                                   <a:schemeClr val="tx1"/>
                                 </a:solidFill>
-                                <a:latin typeface="Times New Roman" panose="02020603050405020304" pitchFamily="18" charset="0"/>
+                                <a:latin typeface="Cambria Math" panose="02040503050406030204" pitchFamily="18" charset="0"/>
                                 <a:cs typeface="Times New Roman" panose="02020603050405020304" pitchFamily="18" charset="0"/>
                               </a:rPr>
                               <m:t>0</m:t>
@@ -20003,11 +20223,11 @@
                         <m:d>
                           <m:dPr>
                             <m:ctrlPr>
-                              <a:rPr lang="en-US" sz="1600">
+                              <a:rPr lang="en-US" sz="1600" i="1">
                                 <a:solidFill>
                                   <a:schemeClr val="tx1"/>
                                 </a:solidFill>
-                                <a:latin typeface="Times New Roman" panose="02020603050405020304" pitchFamily="18" charset="0"/>
+                                <a:latin typeface="Cambria Math" panose="02040503050406030204" pitchFamily="18" charset="0"/>
                                 <a:cs typeface="Times New Roman" panose="02020603050405020304" pitchFamily="18" charset="0"/>
                               </a:rPr>
                             </m:ctrlPr>
@@ -20018,7 +20238,7 @@
                                 <a:solidFill>
                                   <a:schemeClr val="tx1"/>
                                 </a:solidFill>
-                                <a:latin typeface="Times New Roman" panose="02020603050405020304" pitchFamily="18" charset="0"/>
+                                <a:latin typeface="Cambria Math" panose="02040503050406030204" pitchFamily="18" charset="0"/>
                                 <a:cs typeface="Times New Roman" panose="02020603050405020304" pitchFamily="18" charset="0"/>
                               </a:rPr>
                               <m:t>∙</m:t>
@@ -20039,7 +20259,7 @@
               </p:txBody>
             </p:sp>
           </mc:Choice>
-          <mc:Fallback>
+          <mc:Fallback xmlns="">
             <p:sp>
               <p:nvSpPr>
                 <p:cNvPr id="331" name="Rectangle 330"/>
@@ -20083,8 +20303,8 @@
             </p:sp>
           </mc:Fallback>
         </mc:AlternateContent>
-        <mc:AlternateContent xmlns:mc="http://schemas.openxmlformats.org/markup-compatibility/2006">
-          <mc:Choice xmlns:a14="http://schemas.microsoft.com/office/drawing/2010/main" Requires="a14">
+        <mc:AlternateContent xmlns:mc="http://schemas.openxmlformats.org/markup-compatibility/2006" xmlns:a14="http://schemas.microsoft.com/office/drawing/2010/main">
+          <mc:Choice Requires="a14">
             <p:sp>
               <p:nvSpPr>
                 <p:cNvPr id="332" name="Rectangle 331"/>
@@ -20143,11 +20363,11 @@
                         <m:sSub>
                           <m:sSubPr>
                             <m:ctrlPr>
-                              <a:rPr lang="en-US" sz="1600">
+                              <a:rPr lang="en-US" sz="1600" i="1">
                                 <a:solidFill>
                                   <a:schemeClr val="tx1"/>
                                 </a:solidFill>
-                                <a:latin typeface="Times New Roman" panose="02020603050405020304" pitchFamily="18" charset="0"/>
+                                <a:latin typeface="Cambria Math" panose="02040503050406030204" pitchFamily="18" charset="0"/>
                                 <a:cs typeface="Times New Roman" panose="02020603050405020304" pitchFamily="18" charset="0"/>
                               </a:rPr>
                             </m:ctrlPr>
@@ -20158,7 +20378,7 @@
                                 <a:solidFill>
                                   <a:schemeClr val="tx1"/>
                                 </a:solidFill>
-                                <a:latin typeface="Times New Roman" panose="02020603050405020304" pitchFamily="18" charset="0"/>
+                                <a:latin typeface="Cambria Math" panose="02040503050406030204" pitchFamily="18" charset="0"/>
                                 <a:cs typeface="Times New Roman" panose="02020603050405020304" pitchFamily="18" charset="0"/>
                               </a:rPr>
                               <m:t>𝑓</m:t>
@@ -20170,7 +20390,7 @@
                                 <a:solidFill>
                                   <a:schemeClr val="tx1"/>
                                 </a:solidFill>
-                                <a:latin typeface="Times New Roman" panose="02020603050405020304" pitchFamily="18" charset="0"/>
+                                <a:latin typeface="Cambria Math" panose="02040503050406030204" pitchFamily="18" charset="0"/>
                                 <a:cs typeface="Times New Roman" panose="02020603050405020304" pitchFamily="18" charset="0"/>
                               </a:rPr>
                               <m:t>0</m:t>
@@ -20180,11 +20400,11 @@
                         <m:d>
                           <m:dPr>
                             <m:ctrlPr>
-                              <a:rPr lang="en-US" sz="1600">
+                              <a:rPr lang="en-US" sz="1600" i="1">
                                 <a:solidFill>
                                   <a:schemeClr val="tx1"/>
                                 </a:solidFill>
-                                <a:latin typeface="Times New Roman" panose="02020603050405020304" pitchFamily="18" charset="0"/>
+                                <a:latin typeface="Cambria Math" panose="02040503050406030204" pitchFamily="18" charset="0"/>
                                 <a:cs typeface="Times New Roman" panose="02020603050405020304" pitchFamily="18" charset="0"/>
                               </a:rPr>
                             </m:ctrlPr>
@@ -20195,7 +20415,7 @@
                                 <a:solidFill>
                                   <a:schemeClr val="tx1"/>
                                 </a:solidFill>
-                                <a:latin typeface="Times New Roman" panose="02020603050405020304" pitchFamily="18" charset="0"/>
+                                <a:latin typeface="Cambria Math" panose="02040503050406030204" pitchFamily="18" charset="0"/>
                                 <a:cs typeface="Times New Roman" panose="02020603050405020304" pitchFamily="18" charset="0"/>
                               </a:rPr>
                               <m:t>∙</m:t>
@@ -20216,7 +20436,7 @@
               </p:txBody>
             </p:sp>
           </mc:Choice>
-          <mc:Fallback>
+          <mc:Fallback xmlns="">
             <p:sp>
               <p:nvSpPr>
                 <p:cNvPr id="332" name="Rectangle 331"/>
@@ -20260,8 +20480,8 @@
             </p:sp>
           </mc:Fallback>
         </mc:AlternateContent>
-        <mc:AlternateContent xmlns:mc="http://schemas.openxmlformats.org/markup-compatibility/2006">
-          <mc:Choice xmlns:a14="http://schemas.microsoft.com/office/drawing/2010/main" Requires="a14">
+        <mc:AlternateContent xmlns:mc="http://schemas.openxmlformats.org/markup-compatibility/2006" xmlns:a14="http://schemas.microsoft.com/office/drawing/2010/main">
+          <mc:Choice Requires="a14">
             <p:sp>
               <p:nvSpPr>
                 <p:cNvPr id="333" name="Oval 332"/>
@@ -20322,7 +20542,7 @@
                             <a:solidFill>
                               <a:schemeClr val="tx1"/>
                             </a:solidFill>
-                            <a:latin typeface="Times New Roman" panose="02020603050405020304" pitchFamily="18" charset="0"/>
+                            <a:latin typeface="Cambria Math" panose="02040503050406030204" pitchFamily="18" charset="0"/>
                             <a:cs typeface="Times New Roman" panose="02020603050405020304" pitchFamily="18" charset="0"/>
                           </a:rPr>
                           <m:t>𝑝</m:t>
@@ -20341,7 +20561,7 @@
               </p:txBody>
             </p:sp>
           </mc:Choice>
-          <mc:Fallback>
+          <mc:Fallback xmlns="">
             <p:sp>
               <p:nvSpPr>
                 <p:cNvPr id="333" name="Oval 332"/>
@@ -20470,8 +20690,8 @@
             </a:fontRef>
           </p:style>
         </p:cxnSp>
-        <mc:AlternateContent xmlns:mc="http://schemas.openxmlformats.org/markup-compatibility/2006">
-          <mc:Choice xmlns:a14="http://schemas.microsoft.com/office/drawing/2010/main" Requires="a14">
+        <mc:AlternateContent xmlns:mc="http://schemas.openxmlformats.org/markup-compatibility/2006" xmlns:a14="http://schemas.microsoft.com/office/drawing/2010/main">
+          <mc:Choice Requires="a14">
             <p:sp>
               <p:nvSpPr>
                 <p:cNvPr id="336" name="Oval 335"/>
@@ -20532,7 +20752,7 @@
                             <a:solidFill>
                               <a:schemeClr val="tx1"/>
                             </a:solidFill>
-                            <a:latin typeface="Times New Roman" panose="02020603050405020304" pitchFamily="18" charset="0"/>
+                            <a:latin typeface="Cambria Math" panose="02040503050406030204" pitchFamily="18" charset="0"/>
                             <a:cs typeface="Times New Roman" panose="02020603050405020304" pitchFamily="18" charset="0"/>
                           </a:rPr>
                           <m:t>𝑝</m:t>
@@ -20551,7 +20771,7 @@
               </p:txBody>
             </p:sp>
           </mc:Choice>
-          <mc:Fallback>
+          <mc:Fallback xmlns="">
             <p:sp>
               <p:nvSpPr>
                 <p:cNvPr id="336" name="Oval 335"/>
@@ -20638,7 +20858,6 @@
                 <a:rPr lang="en-US" dirty="0"/>
                 <a:t>abs-layer</a:t>
               </a:r>
-              <a:endParaRPr lang="en-US" dirty="0"/>
             </a:p>
           </p:txBody>
         </p:sp>
@@ -21072,8 +21291,8 @@
             </a:fontRef>
           </p:style>
         </p:cxnSp>
-        <mc:AlternateContent xmlns:mc="http://schemas.openxmlformats.org/markup-compatibility/2006">
-          <mc:Choice xmlns:a14="http://schemas.microsoft.com/office/drawing/2010/main" Requires="a14">
+        <mc:AlternateContent xmlns:mc="http://schemas.openxmlformats.org/markup-compatibility/2006" xmlns:a14="http://schemas.microsoft.com/office/drawing/2010/main">
+          <mc:Choice Requires="a14">
             <p:sp>
               <p:nvSpPr>
                 <p:cNvPr id="362" name="Oval 361"/>
@@ -21134,7 +21353,7 @@
                             <a:solidFill>
                               <a:schemeClr val="tx1"/>
                             </a:solidFill>
-                            <a:latin typeface="Times New Roman" panose="02020603050405020304" pitchFamily="18" charset="0"/>
+                            <a:latin typeface="Cambria Math" panose="02040503050406030204" pitchFamily="18" charset="0"/>
                             <a:cs typeface="Times New Roman" panose="02020603050405020304" pitchFamily="18" charset="0"/>
                           </a:rPr>
                           <m:t>𝑡</m:t>
@@ -21153,7 +21372,7 @@
               </p:txBody>
             </p:sp>
           </mc:Choice>
-          <mc:Fallback>
+          <mc:Fallback xmlns="">
             <p:sp>
               <p:nvSpPr>
                 <p:cNvPr id="362" name="Oval 361"/>
@@ -21197,8 +21416,8 @@
             </p:sp>
           </mc:Fallback>
         </mc:AlternateContent>
-        <mc:AlternateContent xmlns:mc="http://schemas.openxmlformats.org/markup-compatibility/2006">
-          <mc:Choice xmlns:a14="http://schemas.microsoft.com/office/drawing/2010/main" Requires="a14">
+        <mc:AlternateContent xmlns:mc="http://schemas.openxmlformats.org/markup-compatibility/2006" xmlns:a14="http://schemas.microsoft.com/office/drawing/2010/main">
+          <mc:Choice Requires="a14">
             <p:sp>
               <p:nvSpPr>
                 <p:cNvPr id="363" name="Oval 362"/>
@@ -21259,7 +21478,7 @@
                             <a:solidFill>
                               <a:schemeClr val="tx1"/>
                             </a:solidFill>
-                            <a:latin typeface="Times New Roman" panose="02020603050405020304" pitchFamily="18" charset="0"/>
+                            <a:latin typeface="Cambria Math" panose="02040503050406030204" pitchFamily="18" charset="0"/>
                             <a:cs typeface="Times New Roman" panose="02020603050405020304" pitchFamily="18" charset="0"/>
                           </a:rPr>
                           <m:t>𝑡</m:t>
@@ -21278,7 +21497,7 @@
               </p:txBody>
             </p:sp>
           </mc:Choice>
-          <mc:Fallback>
+          <mc:Fallback xmlns="">
             <p:sp>
               <p:nvSpPr>
                 <p:cNvPr id="363" name="Oval 362"/>
@@ -21408,8 +21627,8 @@
             </a:fontRef>
           </p:style>
         </p:cxnSp>
-        <mc:AlternateContent xmlns:mc="http://schemas.openxmlformats.org/markup-compatibility/2006">
-          <mc:Choice xmlns:a14="http://schemas.microsoft.com/office/drawing/2010/main" Requires="a14">
+        <mc:AlternateContent xmlns:mc="http://schemas.openxmlformats.org/markup-compatibility/2006" xmlns:a14="http://schemas.microsoft.com/office/drawing/2010/main">
+          <mc:Choice Requires="a14">
             <p:sp>
               <p:nvSpPr>
                 <p:cNvPr id="373" name="TextBox 372"/>
@@ -21442,6 +21661,7 @@
                   </a:lvl1pPr>
                 </a:lstStyle>
                 <a:p>
+                  <a:pPr/>
                   <a14:m>
                     <m:oMathPara xmlns:m="http://schemas.openxmlformats.org/officeDocument/2006/math">
                       <m:oMathParaPr>
@@ -21451,18 +21671,24 @@
                         <m:sSub>
                           <m:sSubPr>
                             <m:ctrlPr>
-                              <a:rPr lang="en-US"/>
+                              <a:rPr lang="en-US" i="1">
+                                <a:latin typeface="Cambria Math" panose="02040503050406030204" pitchFamily="18" charset="0"/>
+                              </a:rPr>
                             </m:ctrlPr>
                           </m:sSubPr>
                           <m:e>
                             <m:r>
-                              <a:rPr lang="en-US"/>
+                              <a:rPr lang="en-US">
+                                <a:latin typeface="Cambria Math" panose="02040503050406030204" pitchFamily="18" charset="0"/>
+                              </a:rPr>
                               <m:t>𝑥</m:t>
                             </m:r>
                           </m:e>
                           <m:sub>
                             <m:r>
-                              <a:rPr lang="en-US"/>
+                              <a:rPr lang="en-US">
+                                <a:latin typeface="Cambria Math" panose="02040503050406030204" pitchFamily="18" charset="0"/>
+                              </a:rPr>
                               <m:t>0</m:t>
                             </m:r>
                           </m:sub>
@@ -21475,7 +21701,7 @@
               </p:txBody>
             </p:sp>
           </mc:Choice>
-          <mc:Fallback>
+          <mc:Fallback xmlns="">
             <p:sp>
               <p:nvSpPr>
                 <p:cNvPr id="373" name="TextBox 372"/>
@@ -21514,8 +21740,8 @@
             </p:sp>
           </mc:Fallback>
         </mc:AlternateContent>
-        <mc:AlternateContent xmlns:mc="http://schemas.openxmlformats.org/markup-compatibility/2006">
-          <mc:Choice xmlns:a14="http://schemas.microsoft.com/office/drawing/2010/main" Requires="a14">
+        <mc:AlternateContent xmlns:mc="http://schemas.openxmlformats.org/markup-compatibility/2006" xmlns:a14="http://schemas.microsoft.com/office/drawing/2010/main">
+          <mc:Choice Requires="a14">
             <p:sp>
               <p:nvSpPr>
                 <p:cNvPr id="392" name="TextBox 391"/>
@@ -21548,6 +21774,7 @@
                   </a:lvl1pPr>
                 </a:lstStyle>
                 <a:p>
+                  <a:pPr/>
                   <a14:m>
                     <m:oMathPara xmlns:m="http://schemas.openxmlformats.org/officeDocument/2006/math">
                       <m:oMathParaPr>
@@ -21557,18 +21784,24 @@
                         <m:sSub>
                           <m:sSubPr>
                             <m:ctrlPr>
-                              <a:rPr lang="en-US"/>
+                              <a:rPr lang="en-US" i="1">
+                                <a:latin typeface="Cambria Math" panose="02040503050406030204" pitchFamily="18" charset="0"/>
+                              </a:rPr>
                             </m:ctrlPr>
                           </m:sSubPr>
                           <m:e>
                             <m:r>
-                              <a:rPr lang="en-US"/>
+                              <a:rPr lang="en-US">
+                                <a:latin typeface="Cambria Math" panose="02040503050406030204" pitchFamily="18" charset="0"/>
+                              </a:rPr>
                               <m:t>𝑥</m:t>
                             </m:r>
                           </m:e>
                           <m:sub>
                             <m:r>
-                              <a:rPr lang="en-US"/>
+                              <a:rPr lang="en-US">
+                                <a:latin typeface="Cambria Math" panose="02040503050406030204" pitchFamily="18" charset="0"/>
+                              </a:rPr>
                               <m:t>10</m:t>
                             </m:r>
                           </m:sub>
@@ -21581,7 +21814,7 @@
               </p:txBody>
             </p:sp>
           </mc:Choice>
-          <mc:Fallback>
+          <mc:Fallback xmlns="">
             <p:sp>
               <p:nvSpPr>
                 <p:cNvPr id="392" name="TextBox 391"/>
@@ -21620,8 +21853,8 @@
             </p:sp>
           </mc:Fallback>
         </mc:AlternateContent>
-        <mc:AlternateContent xmlns:mc="http://schemas.openxmlformats.org/markup-compatibility/2006">
-          <mc:Choice xmlns:a14="http://schemas.microsoft.com/office/drawing/2010/main" Requires="a14">
+        <mc:AlternateContent xmlns:mc="http://schemas.openxmlformats.org/markup-compatibility/2006" xmlns:a14="http://schemas.microsoft.com/office/drawing/2010/main">
+          <mc:Choice Requires="a14">
             <p:sp>
               <p:nvSpPr>
                 <p:cNvPr id="398" name="TextBox 397"/>
@@ -21654,6 +21887,7 @@
                   </a:lvl1pPr>
                 </a:lstStyle>
                 <a:p>
+                  <a:pPr/>
                   <a14:m>
                     <m:oMathPara xmlns:m="http://schemas.openxmlformats.org/officeDocument/2006/math">
                       <m:oMathParaPr>
@@ -21663,18 +21897,24 @@
                         <m:sSub>
                           <m:sSubPr>
                             <m:ctrlPr>
-                              <a:rPr lang="en-US"/>
+                              <a:rPr lang="en-US" i="1">
+                                <a:latin typeface="Cambria Math" panose="02040503050406030204" pitchFamily="18" charset="0"/>
+                              </a:rPr>
                             </m:ctrlPr>
                           </m:sSubPr>
                           <m:e>
                             <m:r>
-                              <a:rPr lang="en-US"/>
+                              <a:rPr lang="en-US">
+                                <a:latin typeface="Cambria Math" panose="02040503050406030204" pitchFamily="18" charset="0"/>
+                              </a:rPr>
                               <m:t>𝑜</m:t>
                             </m:r>
                           </m:e>
                           <m:sub>
                             <m:r>
-                              <a:rPr lang="en-US"/>
+                              <a:rPr lang="en-US">
+                                <a:latin typeface="Cambria Math" panose="02040503050406030204" pitchFamily="18" charset="0"/>
+                              </a:rPr>
                               <m:t>1</m:t>
                             </m:r>
                           </m:sub>
@@ -21687,7 +21927,7 @@
               </p:txBody>
             </p:sp>
           </mc:Choice>
-          <mc:Fallback>
+          <mc:Fallback xmlns="">
             <p:sp>
               <p:nvSpPr>
                 <p:cNvPr id="398" name="TextBox 397"/>
@@ -21987,8 +22227,8 @@
             </a:p>
           </p:txBody>
         </p:sp>
-        <mc:AlternateContent xmlns:mc="http://schemas.openxmlformats.org/markup-compatibility/2006">
-          <mc:Choice xmlns:a14="http://schemas.microsoft.com/office/drawing/2010/main" Requires="a14">
+        <mc:AlternateContent xmlns:mc="http://schemas.openxmlformats.org/markup-compatibility/2006" xmlns:a14="http://schemas.microsoft.com/office/drawing/2010/main">
+          <mc:Choice Requires="a14">
             <p:sp>
               <p:nvSpPr>
                 <p:cNvPr id="69" name="Rectangle 68"/>
@@ -22047,11 +22287,11 @@
                         <m:sSub>
                           <m:sSubPr>
                             <m:ctrlPr>
-                              <a:rPr lang="en-US" sz="1600">
+                              <a:rPr lang="en-US" sz="1600" i="1">
                                 <a:solidFill>
                                   <a:schemeClr val="tx1"/>
                                 </a:solidFill>
-                                <a:latin typeface="Times New Roman" panose="02020603050405020304" pitchFamily="18" charset="0"/>
+                                <a:latin typeface="Cambria Math" panose="02040503050406030204" pitchFamily="18" charset="0"/>
                                 <a:cs typeface="Times New Roman" panose="02020603050405020304" pitchFamily="18" charset="0"/>
                               </a:rPr>
                             </m:ctrlPr>
@@ -22062,7 +22302,7 @@
                                 <a:solidFill>
                                   <a:schemeClr val="tx1"/>
                                 </a:solidFill>
-                                <a:latin typeface="Times New Roman" panose="02020603050405020304" pitchFamily="18" charset="0"/>
+                                <a:latin typeface="Cambria Math" panose="02040503050406030204" pitchFamily="18" charset="0"/>
                                 <a:cs typeface="Times New Roman" panose="02020603050405020304" pitchFamily="18" charset="0"/>
                               </a:rPr>
                               <m:t>𝑓</m:t>
@@ -22074,7 +22314,7 @@
                                 <a:solidFill>
                                   <a:schemeClr val="tx1"/>
                                 </a:solidFill>
-                                <a:latin typeface="Times New Roman" panose="02020603050405020304" pitchFamily="18" charset="0"/>
+                                <a:latin typeface="Cambria Math" panose="02040503050406030204" pitchFamily="18" charset="0"/>
                                 <a:cs typeface="Times New Roman" panose="02020603050405020304" pitchFamily="18" charset="0"/>
                               </a:rPr>
                               <m:t>𝑏</m:t>
@@ -22084,11 +22324,11 @@
                         <m:d>
                           <m:dPr>
                             <m:ctrlPr>
-                              <a:rPr lang="en-US" sz="1600">
+                              <a:rPr lang="en-US" sz="1600" i="1">
                                 <a:solidFill>
                                   <a:schemeClr val="tx1"/>
                                 </a:solidFill>
-                                <a:latin typeface="Times New Roman" panose="02020603050405020304" pitchFamily="18" charset="0"/>
+                                <a:latin typeface="Cambria Math" panose="02040503050406030204" pitchFamily="18" charset="0"/>
                                 <a:cs typeface="Times New Roman" panose="02020603050405020304" pitchFamily="18" charset="0"/>
                               </a:rPr>
                             </m:ctrlPr>
@@ -22099,7 +22339,7 @@
                                 <a:solidFill>
                                   <a:schemeClr val="tx1"/>
                                 </a:solidFill>
-                                <a:latin typeface="Times New Roman" panose="02020603050405020304" pitchFamily="18" charset="0"/>
+                                <a:latin typeface="Cambria Math" panose="02040503050406030204" pitchFamily="18" charset="0"/>
                                 <a:cs typeface="Times New Roman" panose="02020603050405020304" pitchFamily="18" charset="0"/>
                               </a:rPr>
                               <m:t>∙</m:t>
@@ -22120,7 +22360,7 @@
               </p:txBody>
             </p:sp>
           </mc:Choice>
-          <mc:Fallback>
+          <mc:Fallback xmlns="">
             <p:sp>
               <p:nvSpPr>
                 <p:cNvPr id="69" name="Rectangle 68"/>
@@ -22164,8 +22404,8 @@
             </p:sp>
           </mc:Fallback>
         </mc:AlternateContent>
-        <mc:AlternateContent xmlns:mc="http://schemas.openxmlformats.org/markup-compatibility/2006">
-          <mc:Choice xmlns:a14="http://schemas.microsoft.com/office/drawing/2010/main" Requires="a14">
+        <mc:AlternateContent xmlns:mc="http://schemas.openxmlformats.org/markup-compatibility/2006" xmlns:a14="http://schemas.microsoft.com/office/drawing/2010/main">
+          <mc:Choice Requires="a14">
             <p:sp>
               <p:nvSpPr>
                 <p:cNvPr id="70" name="Oval 69"/>
@@ -22226,7 +22466,7 @@
                             <a:solidFill>
                               <a:schemeClr val="tx1"/>
                             </a:solidFill>
-                            <a:latin typeface="Times New Roman" panose="02020603050405020304" pitchFamily="18" charset="0"/>
+                            <a:latin typeface="Cambria Math" panose="02040503050406030204" pitchFamily="18" charset="0"/>
                             <a:cs typeface="Times New Roman" panose="02020603050405020304" pitchFamily="18" charset="0"/>
                           </a:rPr>
                           <m:t>1</m:t>
@@ -22245,7 +22485,7 @@
               </p:txBody>
             </p:sp>
           </mc:Choice>
-          <mc:Fallback>
+          <mc:Fallback xmlns="">
             <p:sp>
               <p:nvSpPr>
                 <p:cNvPr id="70" name="Oval 69"/>
@@ -22498,8 +22738,8 @@
             </a:fontRef>
           </p:style>
         </p:cxnSp>
-        <mc:AlternateContent xmlns:mc="http://schemas.openxmlformats.org/markup-compatibility/2006">
-          <mc:Choice xmlns:a14="http://schemas.microsoft.com/office/drawing/2010/main" Requires="a14">
+        <mc:AlternateContent xmlns:mc="http://schemas.openxmlformats.org/markup-compatibility/2006" xmlns:a14="http://schemas.microsoft.com/office/drawing/2010/main">
+          <mc:Choice Requires="a14">
             <p:sp>
               <p:nvSpPr>
                 <p:cNvPr id="77" name="TextBox 76"/>
@@ -22532,6 +22772,7 @@
                   </a:lvl1pPr>
                 </a:lstStyle>
                 <a:p>
+                  <a:pPr/>
                   <a14:m>
                     <m:oMathPara xmlns:m="http://schemas.openxmlformats.org/officeDocument/2006/math">
                       <m:oMathParaPr>
@@ -22541,18 +22782,24 @@
                         <m:sSub>
                           <m:sSubPr>
                             <m:ctrlPr>
-                              <a:rPr lang="en-US"/>
+                              <a:rPr lang="en-US" i="1">
+                                <a:latin typeface="Cambria Math" panose="02040503050406030204" pitchFamily="18" charset="0"/>
+                              </a:rPr>
                             </m:ctrlPr>
                           </m:sSubPr>
                           <m:e>
                             <m:r>
-                              <a:rPr lang="en-US"/>
+                              <a:rPr lang="en-US">
+                                <a:latin typeface="Cambria Math" panose="02040503050406030204" pitchFamily="18" charset="0"/>
+                              </a:rPr>
                               <m:t>𝑥</m:t>
                             </m:r>
                           </m:e>
                           <m:sub>
                             <m:r>
-                              <a:rPr lang="en-US"/>
+                              <a:rPr lang="en-US">
+                                <a:latin typeface="Cambria Math" panose="02040503050406030204" pitchFamily="18" charset="0"/>
+                              </a:rPr>
                               <m:t>𝑏</m:t>
                             </m:r>
                           </m:sub>
@@ -22565,7 +22812,7 @@
               </p:txBody>
             </p:sp>
           </mc:Choice>
-          <mc:Fallback>
+          <mc:Fallback xmlns="">
             <p:sp>
               <p:nvSpPr>
                 <p:cNvPr id="77" name="TextBox 76"/>
@@ -22663,8 +22910,8 @@
             </a:p>
           </p:txBody>
         </p:sp>
-        <mc:AlternateContent xmlns:mc="http://schemas.openxmlformats.org/markup-compatibility/2006">
-          <mc:Choice xmlns:a14="http://schemas.microsoft.com/office/drawing/2010/main" Requires="a14">
+        <mc:AlternateContent xmlns:mc="http://schemas.openxmlformats.org/markup-compatibility/2006" xmlns:a14="http://schemas.microsoft.com/office/drawing/2010/main">
+          <mc:Choice Requires="a14">
             <p:sp>
               <p:nvSpPr>
                 <p:cNvPr id="79" name="Rectangle 78"/>
@@ -22723,11 +22970,11 @@
                         <m:sSub>
                           <m:sSubPr>
                             <m:ctrlPr>
-                              <a:rPr lang="en-US" sz="1600">
+                              <a:rPr lang="en-US" sz="1600" i="1">
                                 <a:solidFill>
                                   <a:schemeClr val="tx1"/>
                                 </a:solidFill>
-                                <a:latin typeface="Times New Roman" panose="02020603050405020304" pitchFamily="18" charset="0"/>
+                                <a:latin typeface="Cambria Math" panose="02040503050406030204" pitchFamily="18" charset="0"/>
                                 <a:cs typeface="Times New Roman" panose="02020603050405020304" pitchFamily="18" charset="0"/>
                               </a:rPr>
                             </m:ctrlPr>
@@ -22738,7 +22985,7 @@
                                 <a:solidFill>
                                   <a:schemeClr val="tx1"/>
                                 </a:solidFill>
-                                <a:latin typeface="Times New Roman" panose="02020603050405020304" pitchFamily="18" charset="0"/>
+                                <a:latin typeface="Cambria Math" panose="02040503050406030204" pitchFamily="18" charset="0"/>
                                 <a:cs typeface="Times New Roman" panose="02020603050405020304" pitchFamily="18" charset="0"/>
                               </a:rPr>
                               <m:t>𝑓</m:t>
@@ -22750,7 +22997,7 @@
                                 <a:solidFill>
                                   <a:schemeClr val="tx1"/>
                                 </a:solidFill>
-                                <a:latin typeface="Times New Roman" panose="02020603050405020304" pitchFamily="18" charset="0"/>
+                                <a:latin typeface="Cambria Math" panose="02040503050406030204" pitchFamily="18" charset="0"/>
                                 <a:cs typeface="Times New Roman" panose="02020603050405020304" pitchFamily="18" charset="0"/>
                               </a:rPr>
                               <m:t>1</m:t>
@@ -22760,7 +23007,7 @@
                                 <a:solidFill>
                                   <a:schemeClr val="tx1"/>
                                 </a:solidFill>
-                                <a:latin typeface="Times New Roman" panose="02020603050405020304" pitchFamily="18" charset="0"/>
+                                <a:latin typeface="Cambria Math" panose="02040503050406030204" pitchFamily="18" charset="0"/>
                                 <a:cs typeface="Times New Roman" panose="02020603050405020304" pitchFamily="18" charset="0"/>
                               </a:rPr>
                               <m:t>𝑏</m:t>
@@ -22770,11 +23017,11 @@
                         <m:d>
                           <m:dPr>
                             <m:ctrlPr>
-                              <a:rPr lang="en-US" sz="1600">
+                              <a:rPr lang="en-US" sz="1600" i="1">
                                 <a:solidFill>
                                   <a:schemeClr val="tx1"/>
                                 </a:solidFill>
-                                <a:latin typeface="Times New Roman" panose="02020603050405020304" pitchFamily="18" charset="0"/>
+                                <a:latin typeface="Cambria Math" panose="02040503050406030204" pitchFamily="18" charset="0"/>
                                 <a:cs typeface="Times New Roman" panose="02020603050405020304" pitchFamily="18" charset="0"/>
                               </a:rPr>
                             </m:ctrlPr>
@@ -22785,7 +23032,7 @@
                                 <a:solidFill>
                                   <a:schemeClr val="tx1"/>
                                 </a:solidFill>
-                                <a:latin typeface="Times New Roman" panose="02020603050405020304" pitchFamily="18" charset="0"/>
+                                <a:latin typeface="Cambria Math" panose="02040503050406030204" pitchFamily="18" charset="0"/>
                                 <a:cs typeface="Times New Roman" panose="02020603050405020304" pitchFamily="18" charset="0"/>
                               </a:rPr>
                               <m:t>∙</m:t>
@@ -22806,7 +23053,7 @@
               </p:txBody>
             </p:sp>
           </mc:Choice>
-          <mc:Fallback>
+          <mc:Fallback xmlns="">
             <p:sp>
               <p:nvSpPr>
                 <p:cNvPr id="79" name="Rectangle 78"/>
@@ -22850,8 +23097,8 @@
             </p:sp>
           </mc:Fallback>
         </mc:AlternateContent>
-        <mc:AlternateContent xmlns:mc="http://schemas.openxmlformats.org/markup-compatibility/2006">
-          <mc:Choice xmlns:a14="http://schemas.microsoft.com/office/drawing/2010/main" Requires="a14">
+        <mc:AlternateContent xmlns:mc="http://schemas.openxmlformats.org/markup-compatibility/2006" xmlns:a14="http://schemas.microsoft.com/office/drawing/2010/main">
+          <mc:Choice Requires="a14">
             <p:sp>
               <p:nvSpPr>
                 <p:cNvPr id="80" name="Rectangle 79"/>
@@ -22910,11 +23157,11 @@
                         <m:sSub>
                           <m:sSubPr>
                             <m:ctrlPr>
-                              <a:rPr lang="en-US" sz="1600">
+                              <a:rPr lang="en-US" sz="1600" i="1">
                                 <a:solidFill>
                                   <a:schemeClr val="tx1"/>
                                 </a:solidFill>
-                                <a:latin typeface="Times New Roman" panose="02020603050405020304" pitchFamily="18" charset="0"/>
+                                <a:latin typeface="Cambria Math" panose="02040503050406030204" pitchFamily="18" charset="0"/>
                                 <a:cs typeface="Times New Roman" panose="02020603050405020304" pitchFamily="18" charset="0"/>
                               </a:rPr>
                             </m:ctrlPr>
@@ -22925,7 +23172,7 @@
                                 <a:solidFill>
                                   <a:schemeClr val="tx1"/>
                                 </a:solidFill>
-                                <a:latin typeface="Times New Roman" panose="02020603050405020304" pitchFamily="18" charset="0"/>
+                                <a:latin typeface="Cambria Math" panose="02040503050406030204" pitchFamily="18" charset="0"/>
                                 <a:cs typeface="Times New Roman" panose="02020603050405020304" pitchFamily="18" charset="0"/>
                               </a:rPr>
                               <m:t>𝑓</m:t>
@@ -22937,7 +23184,7 @@
                                 <a:solidFill>
                                   <a:schemeClr val="tx1"/>
                                 </a:solidFill>
-                                <a:latin typeface="Times New Roman" panose="02020603050405020304" pitchFamily="18" charset="0"/>
+                                <a:latin typeface="Cambria Math" panose="02040503050406030204" pitchFamily="18" charset="0"/>
                                 <a:cs typeface="Times New Roman" panose="02020603050405020304" pitchFamily="18" charset="0"/>
                               </a:rPr>
                               <m:t>1</m:t>
@@ -22947,7 +23194,7 @@
                                 <a:solidFill>
                                   <a:schemeClr val="tx1"/>
                                 </a:solidFill>
-                                <a:latin typeface="Times New Roman" panose="02020603050405020304" pitchFamily="18" charset="0"/>
+                                <a:latin typeface="Cambria Math" panose="02040503050406030204" pitchFamily="18" charset="0"/>
                                 <a:cs typeface="Times New Roman" panose="02020603050405020304" pitchFamily="18" charset="0"/>
                               </a:rPr>
                               <m:t>𝑏</m:t>
@@ -22957,11 +23204,11 @@
                         <m:d>
                           <m:dPr>
                             <m:ctrlPr>
-                              <a:rPr lang="en-US" sz="1600">
+                              <a:rPr lang="en-US" sz="1600" i="1">
                                 <a:solidFill>
                                   <a:schemeClr val="tx1"/>
                                 </a:solidFill>
-                                <a:latin typeface="Times New Roman" panose="02020603050405020304" pitchFamily="18" charset="0"/>
+                                <a:latin typeface="Cambria Math" panose="02040503050406030204" pitchFamily="18" charset="0"/>
                                 <a:cs typeface="Times New Roman" panose="02020603050405020304" pitchFamily="18" charset="0"/>
                               </a:rPr>
                             </m:ctrlPr>
@@ -22972,7 +23219,7 @@
                                 <a:solidFill>
                                   <a:schemeClr val="tx1"/>
                                 </a:solidFill>
-                                <a:latin typeface="Times New Roman" panose="02020603050405020304" pitchFamily="18" charset="0"/>
+                                <a:latin typeface="Cambria Math" panose="02040503050406030204" pitchFamily="18" charset="0"/>
                                 <a:cs typeface="Times New Roman" panose="02020603050405020304" pitchFamily="18" charset="0"/>
                               </a:rPr>
                               <m:t>∙</m:t>
@@ -22993,7 +23240,7 @@
               </p:txBody>
             </p:sp>
           </mc:Choice>
-          <mc:Fallback>
+          <mc:Fallback xmlns="">
             <p:sp>
               <p:nvSpPr>
                 <p:cNvPr id="80" name="Rectangle 79"/>
@@ -23071,11 +23318,7 @@
             <a:p>
               <a:r>
                 <a:rPr lang="en-US" dirty="0"/>
-                <a:t>w</a:t>
-              </a:r>
-              <a:r>
-                <a:rPr lang="en-US" dirty="0"/>
-                <a:t>eight</a:t>
+                <a:t>weight</a:t>
               </a:r>
               <a:br>
                 <a:rPr lang="en-US" dirty="0"/>
@@ -23084,7 +23327,6 @@
                 <a:rPr lang="en-US" dirty="0"/>
                 <a:t>abs-layer</a:t>
               </a:r>
-              <a:endParaRPr lang="en-US" dirty="0"/>
             </a:p>
           </p:txBody>
         </p:sp>
@@ -23174,8 +23416,8 @@
             </a:fontRef>
           </p:style>
         </p:cxnSp>
-        <mc:AlternateContent xmlns:mc="http://schemas.openxmlformats.org/markup-compatibility/2006">
-          <mc:Choice xmlns:a14="http://schemas.microsoft.com/office/drawing/2010/main" Requires="a14">
+        <mc:AlternateContent xmlns:mc="http://schemas.openxmlformats.org/markup-compatibility/2006" xmlns:a14="http://schemas.microsoft.com/office/drawing/2010/main">
+          <mc:Choice Requires="a14">
             <p:sp>
               <p:nvSpPr>
                 <p:cNvPr id="102" name="TextBox 101"/>
@@ -23208,6 +23450,7 @@
                   </a:lvl1pPr>
                 </a:lstStyle>
                 <a:p>
+                  <a:pPr/>
                   <a14:m>
                     <m:oMathPara xmlns:m="http://schemas.openxmlformats.org/officeDocument/2006/math">
                       <m:oMathParaPr>
@@ -23217,22 +23460,30 @@
                         <m:sSub>
                           <m:sSubPr>
                             <m:ctrlPr>
-                              <a:rPr lang="en-US"/>
+                              <a:rPr lang="en-US" i="1">
+                                <a:latin typeface="Cambria Math" panose="02040503050406030204" pitchFamily="18" charset="0"/>
+                              </a:rPr>
                             </m:ctrlPr>
                           </m:sSubPr>
                           <m:e>
                             <m:r>
-                              <a:rPr lang="en-US"/>
+                              <a:rPr lang="en-US">
+                                <a:latin typeface="Cambria Math" panose="02040503050406030204" pitchFamily="18" charset="0"/>
+                              </a:rPr>
                               <m:t>𝛿</m:t>
                             </m:r>
                           </m:e>
                           <m:sub>
                             <m:r>
-                              <a:rPr lang="en-US"/>
+                              <a:rPr lang="en-US">
+                                <a:latin typeface="Cambria Math" panose="02040503050406030204" pitchFamily="18" charset="0"/>
+                              </a:rPr>
                               <m:t>1</m:t>
                             </m:r>
                             <m:r>
-                              <a:rPr lang="en-US"/>
+                              <a:rPr lang="en-US">
+                                <a:latin typeface="Cambria Math" panose="02040503050406030204" pitchFamily="18" charset="0"/>
+                              </a:rPr>
                               <m:t>𝑏</m:t>
                             </m:r>
                           </m:sub>
@@ -23245,7 +23496,7 @@
               </p:txBody>
             </p:sp>
           </mc:Choice>
-          <mc:Fallback>
+          <mc:Fallback xmlns="">
             <p:sp>
               <p:nvSpPr>
                 <p:cNvPr id="102" name="TextBox 101"/>
@@ -23284,8 +23535,8 @@
             </p:sp>
           </mc:Fallback>
         </mc:AlternateContent>
-        <mc:AlternateContent xmlns:mc="http://schemas.openxmlformats.org/markup-compatibility/2006">
-          <mc:Choice xmlns:a14="http://schemas.microsoft.com/office/drawing/2010/main" Requires="a14">
+        <mc:AlternateContent xmlns:mc="http://schemas.openxmlformats.org/markup-compatibility/2006" xmlns:a14="http://schemas.microsoft.com/office/drawing/2010/main">
+          <mc:Choice Requires="a14">
             <p:sp>
               <p:nvSpPr>
                 <p:cNvPr id="103" name="TextBox 102"/>
@@ -23318,6 +23569,7 @@
                   </a:lvl1pPr>
                 </a:lstStyle>
                 <a:p>
+                  <a:pPr/>
                   <a14:m>
                     <m:oMathPara xmlns:m="http://schemas.openxmlformats.org/officeDocument/2006/math">
                       <m:oMathParaPr>
@@ -23327,22 +23579,30 @@
                         <m:sSub>
                           <m:sSubPr>
                             <m:ctrlPr>
-                              <a:rPr lang="en-US"/>
+                              <a:rPr lang="en-US" i="1">
+                                <a:latin typeface="Cambria Math" panose="02040503050406030204" pitchFamily="18" charset="0"/>
+                              </a:rPr>
                             </m:ctrlPr>
                           </m:sSubPr>
                           <m:e>
                             <m:r>
-                              <a:rPr lang="en-US"/>
+                              <a:rPr lang="en-US">
+                                <a:latin typeface="Cambria Math" panose="02040503050406030204" pitchFamily="18" charset="0"/>
+                              </a:rPr>
                               <m:t>𝑥</m:t>
                             </m:r>
                           </m:e>
                           <m:sub>
                             <m:r>
-                              <a:rPr lang="en-US"/>
+                              <a:rPr lang="en-US">
+                                <a:latin typeface="Cambria Math" panose="02040503050406030204" pitchFamily="18" charset="0"/>
+                              </a:rPr>
                               <m:t>1</m:t>
                             </m:r>
                             <m:r>
-                              <a:rPr lang="en-US"/>
+                              <a:rPr lang="en-US">
+                                <a:latin typeface="Cambria Math" panose="02040503050406030204" pitchFamily="18" charset="0"/>
+                              </a:rPr>
                               <m:t>𝑏</m:t>
                             </m:r>
                           </m:sub>
@@ -23355,7 +23615,7 @@
               </p:txBody>
             </p:sp>
           </mc:Choice>
-          <mc:Fallback>
+          <mc:Fallback xmlns="">
             <p:sp>
               <p:nvSpPr>
                 <p:cNvPr id="103" name="TextBox 102"/>
@@ -23510,7 +23770,6 @@
                 <a:rPr lang="en-US" dirty="0"/>
                 <a:t>classic layer without abstraction</a:t>
               </a:r>
-              <a:endParaRPr lang="en-US" dirty="0"/>
             </a:p>
           </p:txBody>
         </p:sp>
@@ -23924,7 +24183,6 @@
                 <a:rPr lang="en-US" dirty="0"/>
                 <a:t>detach</a:t>
               </a:r>
-              <a:endParaRPr lang="en-US" dirty="0"/>
             </a:p>
           </p:txBody>
         </p:sp>
@@ -23964,7 +24222,6 @@
                 <a:rPr lang="en-US" dirty="0"/>
                 <a:t>attach</a:t>
               </a:r>
-              <a:endParaRPr lang="en-US" dirty="0"/>
             </a:p>
           </p:txBody>
         </p:sp>
@@ -24004,7 +24261,6 @@
                 <a:rPr lang="en-US" dirty="0"/>
                 <a:t>replace</a:t>
               </a:r>
-              <a:endParaRPr lang="en-US" dirty="0"/>
             </a:p>
           </p:txBody>
         </p:sp>
@@ -24044,7 +24300,6 @@
                 <a:rPr lang="en-US" dirty="0"/>
                 <a:t>replace</a:t>
               </a:r>
-              <a:endParaRPr lang="en-US" dirty="0"/>
             </a:p>
           </p:txBody>
         </p:sp>
@@ -24082,13 +24337,8 @@
             <a:p>
               <a:r>
                 <a:rPr lang="en-US" dirty="0"/>
-                <a:t>r</a:t>
+                <a:t>recurrent NN</a:t>
               </a:r>
-              <a:r>
-                <a:rPr lang="en-US" dirty="0"/>
-                <a:t>ecurrent NN</a:t>
-              </a:r>
-              <a:endParaRPr lang="en-US" dirty="0"/>
             </a:p>
           </p:txBody>
         </p:sp>
@@ -24126,13 +24376,8 @@
             <a:p>
               <a:r>
                 <a:rPr lang="en-US" dirty="0"/>
-                <a:t>1</a:t>
+                <a:t>1-layer NN</a:t>
               </a:r>
-              <a:r>
-                <a:rPr lang="en-US" dirty="0"/>
-                <a:t>-layer NN</a:t>
-              </a:r>
-              <a:endParaRPr lang="en-US" dirty="0"/>
             </a:p>
           </p:txBody>
         </p:sp>
@@ -24193,17 +24438,7 @@
                   <a:latin typeface="Times New Roman" panose="02020603050405020304" pitchFamily="18" charset="0"/>
                   <a:cs typeface="Times New Roman" panose="02020603050405020304" pitchFamily="18" charset="0"/>
                 </a:rPr>
-                <a:t>n</a:t>
-              </a:r>
-              <a:r>
-                <a:rPr lang="en-US" sz="1600" dirty="0">
-                  <a:solidFill>
-                    <a:schemeClr val="tx1"/>
-                  </a:solidFill>
-                  <a:latin typeface="Times New Roman" panose="02020603050405020304" pitchFamily="18" charset="0"/>
-                  <a:cs typeface="Times New Roman" panose="02020603050405020304" pitchFamily="18" charset="0"/>
-                </a:rPr>
-                <a:t>euron</a:t>
+                <a:t>neuron</a:t>
               </a:r>
               <a:br>
                 <a:rPr lang="en-US" sz="1600" dirty="0">
@@ -24302,13 +24537,6 @@
                 </a:rPr>
                 <a:t>linear</a:t>
               </a:r>
-              <a:endParaRPr lang="en-US" sz="1600" dirty="0">
-                <a:solidFill>
-                  <a:schemeClr val="tx1"/>
-                </a:solidFill>
-                <a:latin typeface="Times New Roman" panose="02020603050405020304" pitchFamily="18" charset="0"/>
-                <a:cs typeface="Times New Roman" panose="02020603050405020304" pitchFamily="18" charset="0"/>
-              </a:endParaRPr>
             </a:p>
           </p:txBody>
         </p:sp>
@@ -24468,13 +24696,6 @@
                 </a:rPr>
                 <a:t>LM</a:t>
               </a:r>
-              <a:endParaRPr lang="en-US" sz="1600" dirty="0">
-                <a:solidFill>
-                  <a:schemeClr val="tx1"/>
-                </a:solidFill>
-                <a:latin typeface="Times New Roman" panose="02020603050405020304" pitchFamily="18" charset="0"/>
-                <a:cs typeface="Times New Roman" panose="02020603050405020304" pitchFamily="18" charset="0"/>
-              </a:endParaRPr>
             </a:p>
           </p:txBody>
         </p:sp>
@@ -24680,13 +24901,6 @@
                 </a:rPr>
                 <a:t>abs-layer</a:t>
               </a:r>
-              <a:endParaRPr lang="en-US" sz="1600" dirty="0">
-                <a:solidFill>
-                  <a:schemeClr val="tx1"/>
-                </a:solidFill>
-                <a:latin typeface="Times New Roman" panose="02020603050405020304" pitchFamily="18" charset="0"/>
-                <a:cs typeface="Times New Roman" panose="02020603050405020304" pitchFamily="18" charset="0"/>
-              </a:endParaRPr>
             </a:p>
           </p:txBody>
         </p:sp>
@@ -24787,13 +25001,6 @@
                 </a:rPr>
                 <a:t>abs-layer</a:t>
               </a:r>
-              <a:endParaRPr lang="en-US" sz="1600" dirty="0">
-                <a:solidFill>
-                  <a:schemeClr val="tx1"/>
-                </a:solidFill>
-                <a:latin typeface="Times New Roman" panose="02020603050405020304" pitchFamily="18" charset="0"/>
-                <a:cs typeface="Times New Roman" panose="02020603050405020304" pitchFamily="18" charset="0"/>
-              </a:endParaRPr>
             </a:p>
           </p:txBody>
         </p:sp>
@@ -24856,13 +25063,6 @@
                 </a:rPr>
                 <a:t>BP</a:t>
               </a:r>
-              <a:endParaRPr lang="en-US" sz="1600" dirty="0">
-                <a:solidFill>
-                  <a:schemeClr val="tx1"/>
-                </a:solidFill>
-                <a:latin typeface="Times New Roman" panose="02020603050405020304" pitchFamily="18" charset="0"/>
-                <a:cs typeface="Times New Roman" panose="02020603050405020304" pitchFamily="18" charset="0"/>
-              </a:endParaRPr>
             </a:p>
           </p:txBody>
         </p:sp>
@@ -24923,17 +25123,7 @@
                   <a:latin typeface="Times New Roman" panose="02020603050405020304" pitchFamily="18" charset="0"/>
                   <a:cs typeface="Times New Roman" panose="02020603050405020304" pitchFamily="18" charset="0"/>
                 </a:rPr>
-                <a:t>n</a:t>
-              </a:r>
-              <a:r>
-                <a:rPr lang="en-US" sz="1600" dirty="0">
-                  <a:solidFill>
-                    <a:schemeClr val="tx1"/>
-                  </a:solidFill>
-                  <a:latin typeface="Times New Roman" panose="02020603050405020304" pitchFamily="18" charset="0"/>
-                  <a:cs typeface="Times New Roman" panose="02020603050405020304" pitchFamily="18" charset="0"/>
-                </a:rPr>
-                <a:t>euron</a:t>
+                <a:t>neuron</a:t>
               </a:r>
               <a:br>
                 <a:rPr lang="en-US" sz="1600" dirty="0">
@@ -25030,25 +25220,8 @@
                   <a:latin typeface="Times New Roman" panose="02020603050405020304" pitchFamily="18" charset="0"/>
                   <a:cs typeface="Times New Roman" panose="02020603050405020304" pitchFamily="18" charset="0"/>
                 </a:rPr>
-                <a:t>l</a:t>
+                <a:t>log-sig</a:t>
               </a:r>
-              <a:r>
-                <a:rPr lang="en-US" sz="1600" dirty="0">
-                  <a:solidFill>
-                    <a:schemeClr val="tx1"/>
-                  </a:solidFill>
-                  <a:latin typeface="Times New Roman" panose="02020603050405020304" pitchFamily="18" charset="0"/>
-                  <a:cs typeface="Times New Roman" panose="02020603050405020304" pitchFamily="18" charset="0"/>
-                </a:rPr>
-                <a:t>og-sig</a:t>
-              </a:r>
-              <a:endParaRPr lang="en-US" sz="1600" dirty="0">
-                <a:solidFill>
-                  <a:schemeClr val="tx1"/>
-                </a:solidFill>
-                <a:latin typeface="Times New Roman" panose="02020603050405020304" pitchFamily="18" charset="0"/>
-                <a:cs typeface="Times New Roman" panose="02020603050405020304" pitchFamily="18" charset="0"/>
-              </a:endParaRPr>
             </a:p>
           </p:txBody>
         </p:sp>
@@ -25130,13 +25303,6 @@
                 </a:rPr>
                 <a:t>abs-layer</a:t>
               </a:r>
-              <a:endParaRPr lang="en-US" sz="1600" dirty="0">
-                <a:solidFill>
-                  <a:schemeClr val="tx1"/>
-                </a:solidFill>
-                <a:latin typeface="Times New Roman" panose="02020603050405020304" pitchFamily="18" charset="0"/>
-                <a:cs typeface="Times New Roman" panose="02020603050405020304" pitchFamily="18" charset="0"/>
-              </a:endParaRPr>
             </a:p>
           </p:txBody>
         </p:sp>
@@ -25218,13 +25384,6 @@
                 </a:rPr>
                 <a:t>abs-layer</a:t>
               </a:r>
-              <a:endParaRPr lang="en-US" sz="1600" dirty="0">
-                <a:solidFill>
-                  <a:schemeClr val="tx1"/>
-                </a:solidFill>
-                <a:latin typeface="Times New Roman" panose="02020603050405020304" pitchFamily="18" charset="0"/>
-                <a:cs typeface="Times New Roman" panose="02020603050405020304" pitchFamily="18" charset="0"/>
-              </a:endParaRPr>
             </a:p>
           </p:txBody>
         </p:sp>
@@ -25384,13 +25543,6 @@
                 </a:rPr>
                 <a:t>BP</a:t>
               </a:r>
-              <a:endParaRPr lang="en-US" sz="1600" dirty="0">
-                <a:solidFill>
-                  <a:schemeClr val="tx1"/>
-                </a:solidFill>
-                <a:latin typeface="Times New Roman" panose="02020603050405020304" pitchFamily="18" charset="0"/>
-                <a:cs typeface="Times New Roman" panose="02020603050405020304" pitchFamily="18" charset="0"/>
-              </a:endParaRPr>
             </a:p>
           </p:txBody>
         </p:sp>
@@ -25930,8 +26082,8 @@
             </a:p>
           </p:txBody>
         </p:sp>
-        <mc:AlternateContent xmlns:mc="http://schemas.openxmlformats.org/markup-compatibility/2006">
-          <mc:Choice xmlns:a14="http://schemas.microsoft.com/office/drawing/2010/main" Requires="a14">
+        <mc:AlternateContent xmlns:mc="http://schemas.openxmlformats.org/markup-compatibility/2006" xmlns:a14="http://schemas.microsoft.com/office/drawing/2010/main">
+          <mc:Choice Requires="a14">
             <p:sp>
               <p:nvSpPr>
                 <p:cNvPr id="101" name="Rounded Rectangle 100"/>
@@ -25994,7 +26146,7 @@
                             <a:solidFill>
                               <a:schemeClr val="tx1"/>
                             </a:solidFill>
-                            <a:latin typeface="Times New Roman" panose="02020603050405020304" pitchFamily="18" charset="0"/>
+                            <a:latin typeface="Cambria Math" panose="02040503050406030204" pitchFamily="18" charset="0"/>
                             <a:cs typeface="Times New Roman" panose="02020603050405020304" pitchFamily="18" charset="0"/>
                           </a:rPr>
                           <m:t>  </m:t>
@@ -26007,7 +26159,7 @@
                             <a:solidFill>
                               <a:schemeClr val="tx1"/>
                             </a:solidFill>
-                            <a:latin typeface="Times New Roman" panose="02020603050405020304" pitchFamily="18" charset="0"/>
+                            <a:latin typeface="Cambria Math" panose="02040503050406030204" pitchFamily="18" charset="0"/>
                             <a:cs typeface="Times New Roman" panose="02020603050405020304" pitchFamily="18" charset="0"/>
                           </a:rPr>
                           <m:t>Σ</m:t>
@@ -26026,7 +26178,7 @@
               </p:txBody>
             </p:sp>
           </mc:Choice>
-          <mc:Fallback>
+          <mc:Fallback xmlns="">
             <p:sp>
               <p:nvSpPr>
                 <p:cNvPr id="101" name="Rounded Rectangle 100"/>
@@ -26133,18 +26285,11 @@
                 </a:rPr>
                 <a:t>output</a:t>
               </a:r>
-              <a:endParaRPr lang="en-US" sz="1600" dirty="0">
-                <a:solidFill>
-                  <a:schemeClr val="tx1"/>
-                </a:solidFill>
-                <a:latin typeface="Times New Roman" panose="02020603050405020304" pitchFamily="18" charset="0"/>
-                <a:cs typeface="Times New Roman" panose="02020603050405020304" pitchFamily="18" charset="0"/>
-              </a:endParaRPr>
             </a:p>
           </p:txBody>
         </p:sp>
-        <mc:AlternateContent xmlns:mc="http://schemas.openxmlformats.org/markup-compatibility/2006">
-          <mc:Choice xmlns:a14="http://schemas.microsoft.com/office/drawing/2010/main" Requires="a14">
+        <mc:AlternateContent xmlns:mc="http://schemas.openxmlformats.org/markup-compatibility/2006" xmlns:a14="http://schemas.microsoft.com/office/drawing/2010/main">
+          <mc:Choice Requires="a14">
             <p:sp>
               <p:nvSpPr>
                 <p:cNvPr id="63" name="Rounded Rectangle 62"/>
@@ -26210,7 +26355,7 @@
                             <a:solidFill>
                               <a:schemeClr val="tx1"/>
                             </a:solidFill>
-                            <a:latin typeface="Times New Roman" panose="02020603050405020304" pitchFamily="18" charset="0"/>
+                            <a:latin typeface="Cambria Math" panose="02040503050406030204" pitchFamily="18" charset="0"/>
                             <a:cs typeface="Times New Roman" panose="02020603050405020304" pitchFamily="18" charset="0"/>
                           </a:rPr>
                           <m:t>Σ</m:t>
@@ -26229,7 +26374,7 @@
               </p:txBody>
             </p:sp>
           </mc:Choice>
-          <mc:Fallback>
+          <mc:Fallback xmlns="">
             <p:sp>
               <p:nvSpPr>
                 <p:cNvPr id="63" name="Rounded Rectangle 62"/>
@@ -26336,18 +26481,11 @@
                 </a:rPr>
                 <a:t>output</a:t>
               </a:r>
-              <a:endParaRPr lang="en-US" sz="1600" dirty="0">
-                <a:solidFill>
-                  <a:schemeClr val="tx1"/>
-                </a:solidFill>
-                <a:latin typeface="Times New Roman" panose="02020603050405020304" pitchFamily="18" charset="0"/>
-                <a:cs typeface="Times New Roman" panose="02020603050405020304" pitchFamily="18" charset="0"/>
-              </a:endParaRPr>
             </a:p>
           </p:txBody>
         </p:sp>
-        <mc:AlternateContent xmlns:mc="http://schemas.openxmlformats.org/markup-compatibility/2006">
-          <mc:Choice xmlns:a14="http://schemas.microsoft.com/office/drawing/2010/main" Requires="a14">
+        <mc:AlternateContent xmlns:mc="http://schemas.openxmlformats.org/markup-compatibility/2006" xmlns:a14="http://schemas.microsoft.com/office/drawing/2010/main">
+          <mc:Choice Requires="a14">
             <p:sp>
               <p:nvSpPr>
                 <p:cNvPr id="4" name="Rectangle 3"/>
@@ -26408,7 +26546,7 @@
                             <a:solidFill>
                               <a:schemeClr val="tx1"/>
                             </a:solidFill>
-                            <a:latin typeface="Times New Roman" panose="02020603050405020304" pitchFamily="18" charset="0"/>
+                            <a:latin typeface="Cambria Math" panose="02040503050406030204" pitchFamily="18" charset="0"/>
                             <a:cs typeface="Times New Roman" panose="02020603050405020304" pitchFamily="18" charset="0"/>
                           </a:rPr>
                           <m:t>𝑓</m:t>
@@ -26416,11 +26554,11 @@
                         <m:d>
                           <m:dPr>
                             <m:ctrlPr>
-                              <a:rPr lang="en-US" sz="1600">
+                              <a:rPr lang="en-US" sz="1600" i="1">
                                 <a:solidFill>
                                   <a:schemeClr val="tx1"/>
                                 </a:solidFill>
-                                <a:latin typeface="Times New Roman" panose="02020603050405020304" pitchFamily="18" charset="0"/>
+                                <a:latin typeface="Cambria Math" panose="02040503050406030204" pitchFamily="18" charset="0"/>
                                 <a:cs typeface="Times New Roman" panose="02020603050405020304" pitchFamily="18" charset="0"/>
                               </a:rPr>
                             </m:ctrlPr>
@@ -26431,7 +26569,7 @@
                                 <a:solidFill>
                                   <a:schemeClr val="tx1"/>
                                 </a:solidFill>
-                                <a:latin typeface="Times New Roman" panose="02020603050405020304" pitchFamily="18" charset="0"/>
+                                <a:latin typeface="Cambria Math" panose="02040503050406030204" pitchFamily="18" charset="0"/>
                                 <a:cs typeface="Times New Roman" panose="02020603050405020304" pitchFamily="18" charset="0"/>
                               </a:rPr>
                               <m:t>∙</m:t>
@@ -26452,7 +26590,7 @@
               </p:txBody>
             </p:sp>
           </mc:Choice>
-          <mc:Fallback>
+          <mc:Fallback xmlns="">
             <p:sp>
               <p:nvSpPr>
                 <p:cNvPr id="4" name="Rectangle 3"/>
@@ -26496,8 +26634,8 @@
             </p:sp>
           </mc:Fallback>
         </mc:AlternateContent>
-        <mc:AlternateContent xmlns:mc="http://schemas.openxmlformats.org/markup-compatibility/2006">
-          <mc:Choice xmlns:a14="http://schemas.microsoft.com/office/drawing/2010/main" Requires="a14">
+        <mc:AlternateContent xmlns:mc="http://schemas.openxmlformats.org/markup-compatibility/2006" xmlns:a14="http://schemas.microsoft.com/office/drawing/2010/main">
+          <mc:Choice Requires="a14">
             <p:sp>
               <p:nvSpPr>
                 <p:cNvPr id="5" name="Rectangle 4"/>
@@ -26556,11 +26694,11 @@
                         <m:sSup>
                           <m:sSupPr>
                             <m:ctrlPr>
-                              <a:rPr lang="en-US" sz="1600">
+                              <a:rPr lang="en-US" sz="1600" i="1">
                                 <a:solidFill>
                                   <a:schemeClr val="tx1"/>
                                 </a:solidFill>
-                                <a:latin typeface="Times New Roman" panose="02020603050405020304" pitchFamily="18" charset="0"/>
+                                <a:latin typeface="Cambria Math" panose="02040503050406030204" pitchFamily="18" charset="0"/>
                                 <a:cs typeface="Times New Roman" panose="02020603050405020304" pitchFamily="18" charset="0"/>
                               </a:rPr>
                             </m:ctrlPr>
@@ -26571,7 +26709,7 @@
                                 <a:solidFill>
                                   <a:schemeClr val="tx1"/>
                                 </a:solidFill>
-                                <a:latin typeface="Times New Roman" panose="02020603050405020304" pitchFamily="18" charset="0"/>
+                                <a:latin typeface="Cambria Math" panose="02040503050406030204" pitchFamily="18" charset="0"/>
                                 <a:cs typeface="Times New Roman" panose="02020603050405020304" pitchFamily="18" charset="0"/>
                               </a:rPr>
                               <m:t>𝑓</m:t>
@@ -26583,7 +26721,7 @@
                                 <a:solidFill>
                                   <a:schemeClr val="tx1"/>
                                 </a:solidFill>
-                                <a:latin typeface="Times New Roman" panose="02020603050405020304" pitchFamily="18" charset="0"/>
+                                <a:latin typeface="Cambria Math" panose="02040503050406030204" pitchFamily="18" charset="0"/>
                                 <a:cs typeface="Times New Roman" panose="02020603050405020304" pitchFamily="18" charset="0"/>
                               </a:rPr>
                               <m:t>′</m:t>
@@ -26593,11 +26731,11 @@
                         <m:d>
                           <m:dPr>
                             <m:ctrlPr>
-                              <a:rPr lang="en-US" sz="1600">
+                              <a:rPr lang="en-US" sz="1600" i="1">
                                 <a:solidFill>
                                   <a:schemeClr val="tx1"/>
                                 </a:solidFill>
-                                <a:latin typeface="Times New Roman" panose="02020603050405020304" pitchFamily="18" charset="0"/>
+                                <a:latin typeface="Cambria Math" panose="02040503050406030204" pitchFamily="18" charset="0"/>
                                 <a:cs typeface="Times New Roman" panose="02020603050405020304" pitchFamily="18" charset="0"/>
                               </a:rPr>
                             </m:ctrlPr>
@@ -26608,7 +26746,7 @@
                                 <a:solidFill>
                                   <a:schemeClr val="tx1"/>
                                 </a:solidFill>
-                                <a:latin typeface="Times New Roman" panose="02020603050405020304" pitchFamily="18" charset="0"/>
+                                <a:latin typeface="Cambria Math" panose="02040503050406030204" pitchFamily="18" charset="0"/>
                                 <a:cs typeface="Times New Roman" panose="02020603050405020304" pitchFamily="18" charset="0"/>
                               </a:rPr>
                               <m:t>∙</m:t>
@@ -26629,7 +26767,7 @@
               </p:txBody>
             </p:sp>
           </mc:Choice>
-          <mc:Fallback>
+          <mc:Fallback xmlns="">
             <p:sp>
               <p:nvSpPr>
                 <p:cNvPr id="5" name="Rectangle 4"/>
@@ -26988,25 +27126,8 @@
                   <a:latin typeface="Times New Roman" panose="02020603050405020304" pitchFamily="18" charset="0"/>
                   <a:cs typeface="Times New Roman" panose="02020603050405020304" pitchFamily="18" charset="0"/>
                 </a:rPr>
-                <a:t>i</a:t>
+                <a:t>input</a:t>
               </a:r>
-              <a:r>
-                <a:rPr lang="en-US" sz="1600" dirty="0">
-                  <a:solidFill>
-                    <a:schemeClr val="tx1"/>
-                  </a:solidFill>
-                  <a:latin typeface="Times New Roman" panose="02020603050405020304" pitchFamily="18" charset="0"/>
-                  <a:cs typeface="Times New Roman" panose="02020603050405020304" pitchFamily="18" charset="0"/>
-                </a:rPr>
-                <a:t>nput</a:t>
-              </a:r>
-              <a:endParaRPr lang="en-US" sz="1600" dirty="0">
-                <a:solidFill>
-                  <a:schemeClr val="tx1"/>
-                </a:solidFill>
-                <a:latin typeface="Times New Roman" panose="02020603050405020304" pitchFamily="18" charset="0"/>
-                <a:cs typeface="Times New Roman" panose="02020603050405020304" pitchFamily="18" charset="0"/>
-              </a:endParaRPr>
             </a:p>
           </p:txBody>
         </p:sp>
@@ -27069,13 +27190,6 @@
                 </a:rPr>
                 <a:t>input</a:t>
               </a:r>
-              <a:endParaRPr lang="en-US" sz="1600" dirty="0">
-                <a:solidFill>
-                  <a:schemeClr val="tx1"/>
-                </a:solidFill>
-                <a:latin typeface="Times New Roman" panose="02020603050405020304" pitchFamily="18" charset="0"/>
-                <a:cs typeface="Times New Roman" panose="02020603050405020304" pitchFamily="18" charset="0"/>
-              </a:endParaRPr>
             </a:p>
           </p:txBody>
         </p:sp>
@@ -27115,7 +27229,6 @@
                 <a:rPr lang="en-US" dirty="0"/>
                 <a:t>feed-forward</a:t>
               </a:r>
-              <a:endParaRPr lang="en-US" dirty="0"/>
             </a:p>
           </p:txBody>
         </p:sp>
@@ -27193,13 +27306,8 @@
             <a:p>
               <a:r>
                 <a:rPr lang="en-US" dirty="0"/>
-                <a:t>b</a:t>
+                <a:t>back-propagation</a:t>
               </a:r>
-              <a:r>
-                <a:rPr lang="en-US" dirty="0"/>
-                <a:t>ack-propagation</a:t>
-              </a:r>
-              <a:endParaRPr lang="en-US" dirty="0"/>
             </a:p>
           </p:txBody>
         </p:sp>
@@ -27302,25 +27410,8 @@
                   <a:latin typeface="Times New Roman" panose="02020603050405020304" pitchFamily="18" charset="0"/>
                   <a:cs typeface="Times New Roman" panose="02020603050405020304" pitchFamily="18" charset="0"/>
                 </a:rPr>
-                <a:t>   </a:t>
+                <a:t>   output</a:t>
               </a:r>
-              <a:r>
-                <a:rPr lang="en-US" sz="1600" dirty="0">
-                  <a:solidFill>
-                    <a:schemeClr val="tx1"/>
-                  </a:solidFill>
-                  <a:latin typeface="Times New Roman" panose="02020603050405020304" pitchFamily="18" charset="0"/>
-                  <a:cs typeface="Times New Roman" panose="02020603050405020304" pitchFamily="18" charset="0"/>
-                </a:rPr>
-                <a:t>output</a:t>
-              </a:r>
-              <a:endParaRPr lang="en-US" sz="1600" dirty="0">
-                <a:solidFill>
-                  <a:schemeClr val="tx1"/>
-                </a:solidFill>
-                <a:latin typeface="Times New Roman" panose="02020603050405020304" pitchFamily="18" charset="0"/>
-                <a:cs typeface="Times New Roman" panose="02020603050405020304" pitchFamily="18" charset="0"/>
-              </a:endParaRPr>
             </a:p>
           </p:txBody>
         </p:sp>
@@ -27383,25 +27474,8 @@
                   <a:latin typeface="Times New Roman" panose="02020603050405020304" pitchFamily="18" charset="0"/>
                   <a:cs typeface="Times New Roman" panose="02020603050405020304" pitchFamily="18" charset="0"/>
                 </a:rPr>
-                <a:t>   </a:t>
+                <a:t>   output</a:t>
               </a:r>
-              <a:r>
-                <a:rPr lang="en-US" sz="1600" dirty="0">
-                  <a:solidFill>
-                    <a:schemeClr val="tx1"/>
-                  </a:solidFill>
-                  <a:latin typeface="Times New Roman" panose="02020603050405020304" pitchFamily="18" charset="0"/>
-                  <a:cs typeface="Times New Roman" panose="02020603050405020304" pitchFamily="18" charset="0"/>
-                </a:rPr>
-                <a:t>output</a:t>
-              </a:r>
-              <a:endParaRPr lang="en-US" sz="1600" dirty="0">
-                <a:solidFill>
-                  <a:schemeClr val="tx1"/>
-                </a:solidFill>
-                <a:latin typeface="Times New Roman" panose="02020603050405020304" pitchFamily="18" charset="0"/>
-                <a:cs typeface="Times New Roman" panose="02020603050405020304" pitchFamily="18" charset="0"/>
-              </a:endParaRPr>
             </a:p>
           </p:txBody>
         </p:sp>
@@ -27464,25 +27538,8 @@
                   <a:latin typeface="Times New Roman" panose="02020603050405020304" pitchFamily="18" charset="0"/>
                   <a:cs typeface="Times New Roman" panose="02020603050405020304" pitchFamily="18" charset="0"/>
                 </a:rPr>
-                <a:t>   </a:t>
+                <a:t>   output</a:t>
               </a:r>
-              <a:r>
-                <a:rPr lang="en-US" sz="1600" dirty="0">
-                  <a:solidFill>
-                    <a:schemeClr val="tx1"/>
-                  </a:solidFill>
-                  <a:latin typeface="Times New Roman" panose="02020603050405020304" pitchFamily="18" charset="0"/>
-                  <a:cs typeface="Times New Roman" panose="02020603050405020304" pitchFamily="18" charset="0"/>
-                </a:rPr>
-                <a:t>output</a:t>
-              </a:r>
-              <a:endParaRPr lang="en-US" sz="1600" dirty="0">
-                <a:solidFill>
-                  <a:schemeClr val="tx1"/>
-                </a:solidFill>
-                <a:latin typeface="Times New Roman" panose="02020603050405020304" pitchFamily="18" charset="0"/>
-                <a:cs typeface="Times New Roman" panose="02020603050405020304" pitchFamily="18" charset="0"/>
-              </a:endParaRPr>
             </a:p>
           </p:txBody>
         </p:sp>
@@ -27545,13 +27602,6 @@
                 </a:rPr>
                 <a:t>output</a:t>
               </a:r>
-              <a:endParaRPr lang="en-US" sz="1600" dirty="0">
-                <a:solidFill>
-                  <a:schemeClr val="tx1"/>
-                </a:solidFill>
-                <a:latin typeface="Times New Roman" panose="02020603050405020304" pitchFamily="18" charset="0"/>
-                <a:cs typeface="Times New Roman" panose="02020603050405020304" pitchFamily="18" charset="0"/>
-              </a:endParaRPr>
             </a:p>
           </p:txBody>
         </p:sp>
@@ -27614,13 +27664,6 @@
                 </a:rPr>
                 <a:t>output</a:t>
               </a:r>
-              <a:endParaRPr lang="en-US" sz="1600" dirty="0">
-                <a:solidFill>
-                  <a:schemeClr val="tx1"/>
-                </a:solidFill>
-                <a:latin typeface="Times New Roman" panose="02020603050405020304" pitchFamily="18" charset="0"/>
-                <a:cs typeface="Times New Roman" panose="02020603050405020304" pitchFamily="18" charset="0"/>
-              </a:endParaRPr>
             </a:p>
           </p:txBody>
         </p:sp>
@@ -27683,13 +27726,6 @@
                 </a:rPr>
                 <a:t>output</a:t>
               </a:r>
-              <a:endParaRPr lang="en-US" sz="1600" dirty="0">
-                <a:solidFill>
-                  <a:schemeClr val="tx1"/>
-                </a:solidFill>
-                <a:latin typeface="Times New Roman" panose="02020603050405020304" pitchFamily="18" charset="0"/>
-                <a:cs typeface="Times New Roman" panose="02020603050405020304" pitchFamily="18" charset="0"/>
-              </a:endParaRPr>
             </a:p>
           </p:txBody>
         </p:sp>
@@ -27921,8 +27957,8 @@
             </a:fontRef>
           </p:style>
         </p:cxnSp>
-        <mc:AlternateContent xmlns:mc="http://schemas.openxmlformats.org/markup-compatibility/2006">
-          <mc:Choice xmlns:a14="http://schemas.microsoft.com/office/drawing/2010/main" Requires="a14">
+        <mc:AlternateContent xmlns:mc="http://schemas.openxmlformats.org/markup-compatibility/2006" xmlns:a14="http://schemas.microsoft.com/office/drawing/2010/main">
+          <mc:Choice Requires="a14">
             <p:sp>
               <p:nvSpPr>
                 <p:cNvPr id="47" name="Rounded Rectangle 46"/>
@@ -27988,7 +28024,7 @@
                             <a:solidFill>
                               <a:schemeClr val="tx1"/>
                             </a:solidFill>
-                            <a:latin typeface="Times New Roman" panose="02020603050405020304" pitchFamily="18" charset="0"/>
+                            <a:latin typeface="Cambria Math" panose="02040503050406030204" pitchFamily="18" charset="0"/>
                             <a:cs typeface="Times New Roman" panose="02020603050405020304" pitchFamily="18" charset="0"/>
                           </a:rPr>
                           <m:t>Σ</m:t>
@@ -28007,7 +28043,7 @@
               </p:txBody>
             </p:sp>
           </mc:Choice>
-          <mc:Fallback>
+          <mc:Fallback xmlns="">
             <p:sp>
               <p:nvSpPr>
                 <p:cNvPr id="47" name="Rounded Rectangle 46"/>
@@ -28112,18 +28148,11 @@
                 </a:rPr>
                 <a:t>input</a:t>
               </a:r>
-              <a:endParaRPr lang="en-US" sz="1600" dirty="0">
-                <a:solidFill>
-                  <a:schemeClr val="tx1"/>
-                </a:solidFill>
-                <a:latin typeface="Times New Roman" panose="02020603050405020304" pitchFamily="18" charset="0"/>
-                <a:cs typeface="Times New Roman" panose="02020603050405020304" pitchFamily="18" charset="0"/>
-              </a:endParaRPr>
             </a:p>
           </p:txBody>
         </p:sp>
-        <mc:AlternateContent xmlns:mc="http://schemas.openxmlformats.org/markup-compatibility/2006">
-          <mc:Choice xmlns:a14="http://schemas.microsoft.com/office/drawing/2010/main" Requires="a14">
+        <mc:AlternateContent xmlns:mc="http://schemas.openxmlformats.org/markup-compatibility/2006" xmlns:a14="http://schemas.microsoft.com/office/drawing/2010/main">
+          <mc:Choice Requires="a14">
             <p:sp>
               <p:nvSpPr>
                 <p:cNvPr id="49" name="Rounded Rectangle 48"/>
@@ -28189,7 +28218,7 @@
                             <a:solidFill>
                               <a:schemeClr val="tx1"/>
                             </a:solidFill>
-                            <a:latin typeface="Times New Roman" panose="02020603050405020304" pitchFamily="18" charset="0"/>
+                            <a:latin typeface="Cambria Math" panose="02040503050406030204" pitchFamily="18" charset="0"/>
                             <a:cs typeface="Times New Roman" panose="02020603050405020304" pitchFamily="18" charset="0"/>
                           </a:rPr>
                           <m:t>Σ</m:t>
@@ -28208,7 +28237,7 @@
               </p:txBody>
             </p:sp>
           </mc:Choice>
-          <mc:Fallback>
+          <mc:Fallback xmlns="">
             <p:sp>
               <p:nvSpPr>
                 <p:cNvPr id="49" name="Rounded Rectangle 48"/>
@@ -28313,18 +28342,11 @@
                 </a:rPr>
                 <a:t>input</a:t>
               </a:r>
-              <a:endParaRPr lang="en-US" sz="1600" dirty="0">
-                <a:solidFill>
-                  <a:schemeClr val="tx1"/>
-                </a:solidFill>
-                <a:latin typeface="Times New Roman" panose="02020603050405020304" pitchFamily="18" charset="0"/>
-                <a:cs typeface="Times New Roman" panose="02020603050405020304" pitchFamily="18" charset="0"/>
-              </a:endParaRPr>
             </a:p>
           </p:txBody>
         </p:sp>
-        <mc:AlternateContent xmlns:mc="http://schemas.openxmlformats.org/markup-compatibility/2006">
-          <mc:Choice xmlns:a14="http://schemas.microsoft.com/office/drawing/2010/main" Requires="a14">
+        <mc:AlternateContent xmlns:mc="http://schemas.openxmlformats.org/markup-compatibility/2006" xmlns:a14="http://schemas.microsoft.com/office/drawing/2010/main">
+          <mc:Choice Requires="a14">
             <p:sp>
               <p:nvSpPr>
                 <p:cNvPr id="53" name="Rounded Rectangle 52"/>
@@ -28390,7 +28412,7 @@
                             <a:solidFill>
                               <a:schemeClr val="tx1"/>
                             </a:solidFill>
-                            <a:latin typeface="Times New Roman" panose="02020603050405020304" pitchFamily="18" charset="0"/>
+                            <a:latin typeface="Cambria Math" panose="02040503050406030204" pitchFamily="18" charset="0"/>
                             <a:cs typeface="Times New Roman" panose="02020603050405020304" pitchFamily="18" charset="0"/>
                           </a:rPr>
                           <m:t>Σ</m:t>
@@ -28409,7 +28431,7 @@
               </p:txBody>
             </p:sp>
           </mc:Choice>
-          <mc:Fallback>
+          <mc:Fallback xmlns="">
             <p:sp>
               <p:nvSpPr>
                 <p:cNvPr id="53" name="Rounded Rectangle 52"/>
@@ -28514,13 +28536,6 @@
                 </a:rPr>
                 <a:t>input</a:t>
               </a:r>
-              <a:endParaRPr lang="en-US" sz="1600" dirty="0">
-                <a:solidFill>
-                  <a:schemeClr val="tx1"/>
-                </a:solidFill>
-                <a:latin typeface="Times New Roman" panose="02020603050405020304" pitchFamily="18" charset="0"/>
-                <a:cs typeface="Times New Roman" panose="02020603050405020304" pitchFamily="18" charset="0"/>
-              </a:endParaRPr>
             </a:p>
           </p:txBody>
         </p:sp>
@@ -28710,8 +28725,8 @@
             </a:p>
           </p:txBody>
         </p:sp>
-        <mc:AlternateContent xmlns:mc="http://schemas.openxmlformats.org/markup-compatibility/2006">
-          <mc:Choice xmlns:a14="http://schemas.microsoft.com/office/drawing/2010/main" Requires="a14">
+        <mc:AlternateContent xmlns:mc="http://schemas.openxmlformats.org/markup-compatibility/2006" xmlns:a14="http://schemas.microsoft.com/office/drawing/2010/main">
+          <mc:Choice Requires="a14">
             <p:sp>
               <p:nvSpPr>
                 <p:cNvPr id="68" name="Rounded Rectangle 67"/>
@@ -28774,7 +28789,7 @@
                             <a:solidFill>
                               <a:schemeClr val="tx1"/>
                             </a:solidFill>
-                            <a:latin typeface="Times New Roman" panose="02020603050405020304" pitchFamily="18" charset="0"/>
+                            <a:latin typeface="Cambria Math" panose="02040503050406030204" pitchFamily="18" charset="0"/>
                             <a:cs typeface="Times New Roman" panose="02020603050405020304" pitchFamily="18" charset="0"/>
                           </a:rPr>
                           <m:t>  </m:t>
@@ -28787,7 +28802,7 @@
                             <a:solidFill>
                               <a:schemeClr val="tx1"/>
                             </a:solidFill>
-                            <a:latin typeface="Times New Roman" panose="02020603050405020304" pitchFamily="18" charset="0"/>
+                            <a:latin typeface="Cambria Math" panose="02040503050406030204" pitchFamily="18" charset="0"/>
                             <a:cs typeface="Times New Roman" panose="02020603050405020304" pitchFamily="18" charset="0"/>
                           </a:rPr>
                           <m:t>Σ</m:t>
@@ -28806,7 +28821,7 @@
               </p:txBody>
             </p:sp>
           </mc:Choice>
-          <mc:Fallback>
+          <mc:Fallback xmlns="">
             <p:sp>
               <p:nvSpPr>
                 <p:cNvPr id="68" name="Rounded Rectangle 67"/>
@@ -28911,18 +28926,11 @@
                 </a:rPr>
                 <a:t>input</a:t>
               </a:r>
-              <a:endParaRPr lang="en-US" sz="1600" dirty="0">
-                <a:solidFill>
-                  <a:schemeClr val="tx1"/>
-                </a:solidFill>
-                <a:latin typeface="Times New Roman" panose="02020603050405020304" pitchFamily="18" charset="0"/>
-                <a:cs typeface="Times New Roman" panose="02020603050405020304" pitchFamily="18" charset="0"/>
-              </a:endParaRPr>
             </a:p>
           </p:txBody>
         </p:sp>
-        <mc:AlternateContent xmlns:mc="http://schemas.openxmlformats.org/markup-compatibility/2006">
-          <mc:Choice xmlns:a14="http://schemas.microsoft.com/office/drawing/2010/main" Requires="a14">
+        <mc:AlternateContent xmlns:mc="http://schemas.openxmlformats.org/markup-compatibility/2006" xmlns:a14="http://schemas.microsoft.com/office/drawing/2010/main">
+          <mc:Choice Requires="a14">
             <p:sp>
               <p:nvSpPr>
                 <p:cNvPr id="71" name="Rounded Rectangle 70"/>
@@ -28985,7 +28993,7 @@
                             <a:solidFill>
                               <a:schemeClr val="tx1"/>
                             </a:solidFill>
-                            <a:latin typeface="Times New Roman" panose="02020603050405020304" pitchFamily="18" charset="0"/>
+                            <a:latin typeface="Cambria Math" panose="02040503050406030204" pitchFamily="18" charset="0"/>
                             <a:cs typeface="Times New Roman" panose="02020603050405020304" pitchFamily="18" charset="0"/>
                           </a:rPr>
                           <m:t>  </m:t>
@@ -28998,7 +29006,7 @@
                             <a:solidFill>
                               <a:schemeClr val="tx1"/>
                             </a:solidFill>
-                            <a:latin typeface="Times New Roman" panose="02020603050405020304" pitchFamily="18" charset="0"/>
+                            <a:latin typeface="Cambria Math" panose="02040503050406030204" pitchFamily="18" charset="0"/>
                             <a:cs typeface="Times New Roman" panose="02020603050405020304" pitchFamily="18" charset="0"/>
                           </a:rPr>
                           <m:t>Σ</m:t>
@@ -29017,7 +29025,7 @@
               </p:txBody>
             </p:sp>
           </mc:Choice>
-          <mc:Fallback>
+          <mc:Fallback xmlns="">
             <p:sp>
               <p:nvSpPr>
                 <p:cNvPr id="71" name="Rounded Rectangle 70"/>
@@ -29122,18 +29130,11 @@
                 </a:rPr>
                 <a:t>input</a:t>
               </a:r>
-              <a:endParaRPr lang="en-US" sz="1600" dirty="0">
-                <a:solidFill>
-                  <a:schemeClr val="tx1"/>
-                </a:solidFill>
-                <a:latin typeface="Times New Roman" panose="02020603050405020304" pitchFamily="18" charset="0"/>
-                <a:cs typeface="Times New Roman" panose="02020603050405020304" pitchFamily="18" charset="0"/>
-              </a:endParaRPr>
             </a:p>
           </p:txBody>
         </p:sp>
-        <mc:AlternateContent xmlns:mc="http://schemas.openxmlformats.org/markup-compatibility/2006">
-          <mc:Choice xmlns:a14="http://schemas.microsoft.com/office/drawing/2010/main" Requires="a14">
+        <mc:AlternateContent xmlns:mc="http://schemas.openxmlformats.org/markup-compatibility/2006" xmlns:a14="http://schemas.microsoft.com/office/drawing/2010/main">
+          <mc:Choice Requires="a14">
             <p:sp>
               <p:nvSpPr>
                 <p:cNvPr id="73" name="Rounded Rectangle 72"/>
@@ -29196,7 +29197,7 @@
                             <a:solidFill>
                               <a:schemeClr val="tx1"/>
                             </a:solidFill>
-                            <a:latin typeface="Times New Roman" panose="02020603050405020304" pitchFamily="18" charset="0"/>
+                            <a:latin typeface="Cambria Math" panose="02040503050406030204" pitchFamily="18" charset="0"/>
                             <a:cs typeface="Times New Roman" panose="02020603050405020304" pitchFamily="18" charset="0"/>
                           </a:rPr>
                           <m:t>  </m:t>
@@ -29209,7 +29210,7 @@
                             <a:solidFill>
                               <a:schemeClr val="tx1"/>
                             </a:solidFill>
-                            <a:latin typeface="Times New Roman" panose="02020603050405020304" pitchFamily="18" charset="0"/>
+                            <a:latin typeface="Cambria Math" panose="02040503050406030204" pitchFamily="18" charset="0"/>
                             <a:cs typeface="Times New Roman" panose="02020603050405020304" pitchFamily="18" charset="0"/>
                           </a:rPr>
                           <m:t>Σ</m:t>
@@ -29228,7 +29229,7 @@
               </p:txBody>
             </p:sp>
           </mc:Choice>
-          <mc:Fallback>
+          <mc:Fallback xmlns="">
             <p:sp>
               <p:nvSpPr>
                 <p:cNvPr id="73" name="Rounded Rectangle 72"/>
@@ -29333,13 +29334,6 @@
                 </a:rPr>
                 <a:t>input</a:t>
               </a:r>
-              <a:endParaRPr lang="en-US" sz="1600" dirty="0">
-                <a:solidFill>
-                  <a:schemeClr val="tx1"/>
-                </a:solidFill>
-                <a:latin typeface="Times New Roman" panose="02020603050405020304" pitchFamily="18" charset="0"/>
-                <a:cs typeface="Times New Roman" panose="02020603050405020304" pitchFamily="18" charset="0"/>
-              </a:endParaRPr>
             </a:p>
           </p:txBody>
         </p:sp>
@@ -29629,7 +29623,6 @@
                 <a:rPr lang="en-US" dirty="0"/>
                 <a:t>node</a:t>
               </a:r>
-              <a:endParaRPr lang="en-US" dirty="0"/>
             </a:p>
           </p:txBody>
         </p:sp>
@@ -29837,17 +29830,7 @@
                   <a:latin typeface="Times New Roman" panose="02020603050405020304" pitchFamily="18" charset="0"/>
                   <a:cs typeface="Times New Roman" panose="02020603050405020304" pitchFamily="18" charset="0"/>
                 </a:rPr>
-                <a:t>d</a:t>
-              </a:r>
-              <a:r>
-                <a:rPr lang="en-US" sz="1600" dirty="0">
-                  <a:solidFill>
-                    <a:schemeClr val="tx1"/>
-                  </a:solidFill>
-                  <a:latin typeface="Times New Roman" panose="02020603050405020304" pitchFamily="18" charset="0"/>
-                  <a:cs typeface="Times New Roman" panose="02020603050405020304" pitchFamily="18" charset="0"/>
-                </a:rPr>
-                <a:t>educe type</a:t>
+                <a:t>deduce type</a:t>
               </a:r>
               <a:br>
                 <a:rPr lang="en-US" sz="1600" dirty="0">
@@ -29866,27 +29849,7 @@
                   <a:latin typeface="Times New Roman" panose="02020603050405020304" pitchFamily="18" charset="0"/>
                   <a:cs typeface="Times New Roman" panose="02020603050405020304" pitchFamily="18" charset="0"/>
                 </a:rPr>
-                <a:t>(learning</a:t>
-              </a:r>
-              <a:r>
-                <a:rPr lang="en-US" sz="1600" dirty="0">
-                  <a:solidFill>
-                    <a:schemeClr val="tx1"/>
-                  </a:solidFill>
-                  <a:latin typeface="Times New Roman" panose="02020603050405020304" pitchFamily="18" charset="0"/>
-                  <a:cs typeface="Times New Roman" panose="02020603050405020304" pitchFamily="18" charset="0"/>
-                </a:rPr>
-                <a:t> </a:t>
-              </a:r>
-              <a:r>
-                <a:rPr lang="en-US" sz="1600" dirty="0">
-                  <a:solidFill>
-                    <a:schemeClr val="tx1"/>
-                  </a:solidFill>
-                  <a:latin typeface="Times New Roman" panose="02020603050405020304" pitchFamily="18" charset="0"/>
-                  <a:cs typeface="Times New Roman" panose="02020603050405020304" pitchFamily="18" charset="0"/>
-                </a:rPr>
-                <a:t>algorithm,</a:t>
+                <a:t>(learning algorithm,</a:t>
               </a:r>
               <a:br>
                 <a:rPr lang="en-US" sz="1600" dirty="0">
@@ -29945,13 +29908,6 @@
                 </a:rPr>
                 <a:t>network topology)</a:t>
               </a:r>
-              <a:endParaRPr lang="en-US" sz="1600" dirty="0">
-                <a:solidFill>
-                  <a:schemeClr val="tx1"/>
-                </a:solidFill>
-                <a:latin typeface="Times New Roman" panose="02020603050405020304" pitchFamily="18" charset="0"/>
-                <a:cs typeface="Times New Roman" panose="02020603050405020304" pitchFamily="18" charset="0"/>
-              </a:endParaRPr>
             </a:p>
           </p:txBody>
         </p:sp>
@@ -30012,13 +29968,6 @@
                 </a:rPr>
                 <a:t>compile code</a:t>
               </a:r>
-              <a:endParaRPr lang="en-US" sz="1600" dirty="0">
-                <a:solidFill>
-                  <a:schemeClr val="tx1"/>
-                </a:solidFill>
-                <a:latin typeface="Times New Roman" panose="02020603050405020304" pitchFamily="18" charset="0"/>
-                <a:cs typeface="Times New Roman" panose="02020603050405020304" pitchFamily="18" charset="0"/>
-              </a:endParaRPr>
             </a:p>
           </p:txBody>
         </p:sp>
@@ -30336,13 +30285,6 @@
                 </a:rPr>
                 <a:t>compile code</a:t>
               </a:r>
-              <a:endParaRPr lang="en-US" sz="1600" dirty="0">
-                <a:solidFill>
-                  <a:schemeClr val="tx1"/>
-                </a:solidFill>
-                <a:latin typeface="Times New Roman" panose="02020603050405020304" pitchFamily="18" charset="0"/>
-                <a:cs typeface="Times New Roman" panose="02020603050405020304" pitchFamily="18" charset="0"/>
-              </a:endParaRPr>
             </a:p>
           </p:txBody>
         </p:sp>
@@ -30401,17 +30343,7 @@
                   <a:latin typeface="Times New Roman" panose="02020603050405020304" pitchFamily="18" charset="0"/>
                   <a:cs typeface="Times New Roman" panose="02020603050405020304" pitchFamily="18" charset="0"/>
                 </a:rPr>
-                <a:t>d</a:t>
-              </a:r>
-              <a:r>
-                <a:rPr lang="en-US" sz="1600" dirty="0">
-                  <a:solidFill>
-                    <a:schemeClr val="tx1"/>
-                  </a:solidFill>
-                  <a:latin typeface="Times New Roman" panose="02020603050405020304" pitchFamily="18" charset="0"/>
-                  <a:cs typeface="Times New Roman" panose="02020603050405020304" pitchFamily="18" charset="0"/>
-                </a:rPr>
-                <a:t>educe type</a:t>
+                <a:t>deduce type</a:t>
               </a:r>
               <a:br>
                 <a:rPr lang="en-US" sz="1600" dirty="0">
@@ -30499,13 +30431,6 @@
                 </a:rPr>
                 <a:t>network topology)</a:t>
               </a:r>
-              <a:endParaRPr lang="en-US" sz="1600" dirty="0">
-                <a:solidFill>
-                  <a:schemeClr val="tx1"/>
-                </a:solidFill>
-                <a:latin typeface="Times New Roman" panose="02020603050405020304" pitchFamily="18" charset="0"/>
-                <a:cs typeface="Times New Roman" panose="02020603050405020304" pitchFamily="18" charset="0"/>
-              </a:endParaRPr>
             </a:p>
           </p:txBody>
         </p:sp>
@@ -30564,25 +30489,8 @@
                   <a:latin typeface="Times New Roman" panose="02020603050405020304" pitchFamily="18" charset="0"/>
                   <a:cs typeface="Times New Roman" panose="02020603050405020304" pitchFamily="18" charset="0"/>
                 </a:rPr>
-                <a:t>r</a:t>
+                <a:t>run code</a:t>
               </a:r>
-              <a:r>
-                <a:rPr lang="en-US" sz="1600" dirty="0">
-                  <a:solidFill>
-                    <a:schemeClr val="tx1"/>
-                  </a:solidFill>
-                  <a:latin typeface="Times New Roman" panose="02020603050405020304" pitchFamily="18" charset="0"/>
-                  <a:cs typeface="Times New Roman" panose="02020603050405020304" pitchFamily="18" charset="0"/>
-                </a:rPr>
-                <a:t>un code</a:t>
-              </a:r>
-              <a:endParaRPr lang="en-US" sz="1600" dirty="0">
-                <a:solidFill>
-                  <a:schemeClr val="tx1"/>
-                </a:solidFill>
-                <a:latin typeface="Times New Roman" panose="02020603050405020304" pitchFamily="18" charset="0"/>
-                <a:cs typeface="Times New Roman" panose="02020603050405020304" pitchFamily="18" charset="0"/>
-              </a:endParaRPr>
             </a:p>
           </p:txBody>
         </p:sp>
@@ -30643,13 +30551,6 @@
                 </a:rPr>
                 <a:t>run code</a:t>
               </a:r>
-              <a:endParaRPr lang="en-US" sz="1600" dirty="0">
-                <a:solidFill>
-                  <a:schemeClr val="tx1"/>
-                </a:solidFill>
-                <a:latin typeface="Times New Roman" panose="02020603050405020304" pitchFamily="18" charset="0"/>
-                <a:cs typeface="Times New Roman" panose="02020603050405020304" pitchFamily="18" charset="0"/>
-              </a:endParaRPr>
             </a:p>
           </p:txBody>
         </p:sp>
@@ -30786,8 +30687,8 @@
             </a:fontRef>
           </p:style>
         </p:cxnSp>
-        <mc:AlternateContent xmlns:mc="http://schemas.openxmlformats.org/markup-compatibility/2006">
-          <mc:Choice xmlns:a14="http://schemas.microsoft.com/office/drawing/2010/main" Requires="a14">
+        <mc:AlternateContent xmlns:mc="http://schemas.openxmlformats.org/markup-compatibility/2006" xmlns:a14="http://schemas.microsoft.com/office/drawing/2010/main">
+          <mc:Choice Requires="a14">
             <p:sp>
               <p:nvSpPr>
                 <p:cNvPr id="195" name="TextBox 194"/>
@@ -30834,7 +30735,9 @@
                   <a14:m>
                     <m:oMath xmlns:m="http://schemas.openxmlformats.org/officeDocument/2006/math">
                       <m:r>
-                        <a:rPr lang="en-US"/>
+                        <a:rPr lang="en-US">
+                          <a:latin typeface="Cambria Math" panose="02040503050406030204" pitchFamily="18" charset="0"/>
+                        </a:rPr>
                         <m:t>𝑛</m:t>
                       </m:r>
                     </m:oMath>
@@ -30844,7 +30747,7 @@
               </p:txBody>
             </p:sp>
           </mc:Choice>
-          <mc:Fallback>
+          <mc:Fallback xmlns="">
             <p:sp>
               <p:nvSpPr>
                 <p:cNvPr id="195" name="TextBox 194"/>
@@ -30883,8 +30786,8 @@
             </p:sp>
           </mc:Fallback>
         </mc:AlternateContent>
-        <mc:AlternateContent xmlns:mc="http://schemas.openxmlformats.org/markup-compatibility/2006">
-          <mc:Choice xmlns:a14="http://schemas.microsoft.com/office/drawing/2010/main" Requires="a14">
+        <mc:AlternateContent xmlns:mc="http://schemas.openxmlformats.org/markup-compatibility/2006" xmlns:a14="http://schemas.microsoft.com/office/drawing/2010/main">
+          <mc:Choice Requires="a14">
             <p:sp>
               <p:nvSpPr>
                 <p:cNvPr id="200" name="TextBox 199"/>
@@ -30931,7 +30834,9 @@
                   <a14:m>
                     <m:oMath xmlns:m="http://schemas.openxmlformats.org/officeDocument/2006/math">
                       <m:r>
-                        <a:rPr lang="en-US"/>
+                        <a:rPr lang="en-US">
+                          <a:latin typeface="Cambria Math" panose="02040503050406030204" pitchFamily="18" charset="0"/>
+                        </a:rPr>
                         <m:t>𝑚</m:t>
                       </m:r>
                     </m:oMath>
@@ -30941,7 +30846,7 @@
               </p:txBody>
             </p:sp>
           </mc:Choice>
-          <mc:Fallback>
+          <mc:Fallback xmlns="">
             <p:sp>
               <p:nvSpPr>
                 <p:cNvPr id="200" name="TextBox 199"/>
@@ -31070,8 +30975,8 @@
             </a:fontRef>
           </p:style>
         </p:cxnSp>
-        <mc:AlternateContent xmlns:mc="http://schemas.openxmlformats.org/markup-compatibility/2006">
-          <mc:Choice xmlns:a14="http://schemas.microsoft.com/office/drawing/2010/main" Requires="a14">
+        <mc:AlternateContent xmlns:mc="http://schemas.openxmlformats.org/markup-compatibility/2006" xmlns:a14="http://schemas.microsoft.com/office/drawing/2010/main">
+          <mc:Choice Requires="a14">
             <p:sp>
               <p:nvSpPr>
                 <p:cNvPr id="209" name="TextBox 208"/>
@@ -31118,7 +31023,9 @@
                   <a14:m>
                     <m:oMath xmlns:m="http://schemas.openxmlformats.org/officeDocument/2006/math">
                       <m:r>
-                        <a:rPr lang="en-US"/>
+                        <a:rPr lang="en-US">
+                          <a:latin typeface="Cambria Math" panose="02040503050406030204" pitchFamily="18" charset="0"/>
+                        </a:rPr>
                         <m:t>𝑛</m:t>
                       </m:r>
                     </m:oMath>
@@ -31128,7 +31035,7 @@
               </p:txBody>
             </p:sp>
           </mc:Choice>
-          <mc:Fallback>
+          <mc:Fallback xmlns="">
             <p:sp>
               <p:nvSpPr>
                 <p:cNvPr id="209" name="TextBox 208"/>
@@ -31167,8 +31074,8 @@
             </p:sp>
           </mc:Fallback>
         </mc:AlternateContent>
-        <mc:AlternateContent xmlns:mc="http://schemas.openxmlformats.org/markup-compatibility/2006">
-          <mc:Choice xmlns:a14="http://schemas.microsoft.com/office/drawing/2010/main" Requires="a14">
+        <mc:AlternateContent xmlns:mc="http://schemas.openxmlformats.org/markup-compatibility/2006" xmlns:a14="http://schemas.microsoft.com/office/drawing/2010/main">
+          <mc:Choice Requires="a14">
             <p:sp>
               <p:nvSpPr>
                 <p:cNvPr id="210" name="TextBox 209"/>
@@ -31215,7 +31122,9 @@
                   <a14:m>
                     <m:oMath xmlns:m="http://schemas.openxmlformats.org/officeDocument/2006/math">
                       <m:r>
-                        <a:rPr lang="en-US"/>
+                        <a:rPr lang="en-US">
+                          <a:latin typeface="Cambria Math" panose="02040503050406030204" pitchFamily="18" charset="0"/>
+                        </a:rPr>
                         <m:t>𝑚</m:t>
                       </m:r>
                     </m:oMath>
@@ -31225,7 +31134,7 @@
               </p:txBody>
             </p:sp>
           </mc:Choice>
-          <mc:Fallback>
+          <mc:Fallback xmlns="">
             <p:sp>
               <p:nvSpPr>
                 <p:cNvPr id="210" name="TextBox 209"/>

</xml_diff>